<commit_message>
upload Excel & PowerBI versions of the project to the repository
</commit_message>
<xml_diff>
--- a/2025-06-30 CAH.pptx
+++ b/2025-06-30 CAH.pptx
@@ -5,7 +5,7 @@
     <p:sldMasterId id="2147483738" r:id="rId1"/>
   </p:sldMasterIdLst>
   <p:notesMasterIdLst>
-    <p:notesMasterId r:id="rId9"/>
+    <p:notesMasterId r:id="rId10"/>
   </p:notesMasterIdLst>
   <p:sldIdLst>
     <p:sldId id="256" r:id="rId2"/>
@@ -15,6 +15,7 @@
     <p:sldId id="261" r:id="rId6"/>
     <p:sldId id="259" r:id="rId7"/>
     <p:sldId id="262" r:id="rId8"/>
+    <p:sldId id="263" r:id="rId9"/>
   </p:sldIdLst>
   <p:sldSz cx="12192000" cy="6858000"/>
   <p:notesSz cx="6858000" cy="9144000"/>
@@ -803,6 +804,277 @@
     <p:extLst>
       <p:ext uri="{BB962C8B-B14F-4D97-AF65-F5344CB8AC3E}">
         <p14:creationId xmlns:p14="http://schemas.microsoft.com/office/powerpoint/2010/main" val="2429561332"/>
+      </p:ext>
+    </p:extLst>
+  </p:cSld>
+  <p:clrMapOvr>
+    <a:masterClrMapping/>
+  </p:clrMapOvr>
+</p:notes>
+</file>
+
+<file path=ppt/notesSlides/notesSlide4.xml><?xml version="1.0" encoding="utf-8"?>
+<p:notes xmlns:a="http://schemas.openxmlformats.org/drawingml/2006/main" xmlns:r="http://schemas.openxmlformats.org/officeDocument/2006/relationships" xmlns:p="http://schemas.openxmlformats.org/presentationml/2006/main">
+  <p:cSld>
+    <p:spTree>
+      <p:nvGrpSpPr>
+        <p:cNvPr id="1" name=""/>
+        <p:cNvGrpSpPr/>
+        <p:nvPr/>
+      </p:nvGrpSpPr>
+      <p:grpSpPr>
+        <a:xfrm>
+          <a:off x="0" y="0"/>
+          <a:ext cx="0" cy="0"/>
+          <a:chOff x="0" y="0"/>
+          <a:chExt cx="0" cy="0"/>
+        </a:xfrm>
+      </p:grpSpPr>
+      <p:sp>
+        <p:nvSpPr>
+          <p:cNvPr id="2" name="Slide Image Placeholder 1"/>
+          <p:cNvSpPr>
+            <a:spLocks noGrp="1" noRot="1" noChangeAspect="1"/>
+          </p:cNvSpPr>
+          <p:nvPr>
+            <p:ph type="sldImg"/>
+          </p:nvPr>
+        </p:nvSpPr>
+        <p:spPr/>
+      </p:sp>
+      <p:sp>
+        <p:nvSpPr>
+          <p:cNvPr id="3" name="Notes Placeholder 2"/>
+          <p:cNvSpPr>
+            <a:spLocks noGrp="1"/>
+          </p:cNvSpPr>
+          <p:nvPr>
+            <p:ph type="body" idx="1"/>
+          </p:nvPr>
+        </p:nvSpPr>
+        <p:spPr/>
+        <p:txBody>
+          <a:bodyPr/>
+          <a:lstStyle/>
+          <a:p>
+            <a:pPr marL="171450" indent="-171450">
+              <a:buFont typeface="Arial" panose="020B0604020202020204" pitchFamily="34" charset="0"/>
+              <a:buChar char="•"/>
+            </a:pPr>
+            <a:r>
+              <a:rPr lang="en-US" dirty="0"/>
+              <a:t>Save task files to local repository (i.e., the relevant folder created in My Documents folder).</a:t>
+            </a:r>
+          </a:p>
+          <a:p>
+            <a:pPr marL="171450" indent="-171450">
+              <a:buFont typeface="Arial" panose="020B0604020202020204" pitchFamily="34" charset="0"/>
+              <a:buChar char="•"/>
+            </a:pPr>
+            <a:r>
+              <a:rPr lang="en-US" dirty="0"/>
+              <a:t>In the Git window, select changes to Commit (or save).</a:t>
+            </a:r>
+          </a:p>
+          <a:p>
+            <a:pPr marL="171450" indent="-171450">
+              <a:buFont typeface="Arial" panose="020B0604020202020204" pitchFamily="34" charset="0"/>
+              <a:buChar char="•"/>
+            </a:pPr>
+            <a:r>
+              <a:rPr lang="en-US" dirty="0"/>
+              <a:t>Describe changes, Commit changes, and Push changes to GitHub.</a:t>
+            </a:r>
+          </a:p>
+          <a:p>
+            <a:pPr marL="171450" indent="-171450">
+              <a:buFont typeface="Arial" panose="020B0604020202020204" pitchFamily="34" charset="0"/>
+              <a:buChar char="•"/>
+            </a:pPr>
+            <a:endParaRPr lang="en-US" dirty="0"/>
+          </a:p>
+          <a:p>
+            <a:pPr marL="171450" indent="-171450">
+              <a:buFont typeface="Arial" panose="020B0604020202020204" pitchFamily="34" charset="0"/>
+              <a:buChar char="•"/>
+            </a:pPr>
+            <a:endParaRPr lang="en-US" dirty="0"/>
+          </a:p>
+        </p:txBody>
+      </p:sp>
+      <p:sp>
+        <p:nvSpPr>
+          <p:cNvPr id="4" name="Slide Number Placeholder 3"/>
+          <p:cNvSpPr>
+            <a:spLocks noGrp="1"/>
+          </p:cNvSpPr>
+          <p:nvPr>
+            <p:ph type="sldNum" sz="quarter" idx="5"/>
+          </p:nvPr>
+        </p:nvSpPr>
+        <p:spPr/>
+        <p:txBody>
+          <a:bodyPr/>
+          <a:lstStyle/>
+          <a:p>
+            <a:fld id="{B7B3E9D7-7C42-42C9-B073-01B263BBC5B6}" type="slidenum">
+              <a:rPr lang="en-US" smtClean="0"/>
+              <a:t>7</a:t>
+            </a:fld>
+            <a:endParaRPr lang="en-US"/>
+          </a:p>
+        </p:txBody>
+      </p:sp>
+    </p:spTree>
+    <p:extLst>
+      <p:ext uri="{BB962C8B-B14F-4D97-AF65-F5344CB8AC3E}">
+        <p14:creationId xmlns:p14="http://schemas.microsoft.com/office/powerpoint/2010/main" val="2591061018"/>
+      </p:ext>
+    </p:extLst>
+  </p:cSld>
+  <p:clrMapOvr>
+    <a:masterClrMapping/>
+  </p:clrMapOvr>
+</p:notes>
+</file>
+
+<file path=ppt/notesSlides/notesSlide5.xml><?xml version="1.0" encoding="utf-8"?>
+<p:notes xmlns:a="http://schemas.openxmlformats.org/drawingml/2006/main" xmlns:r="http://schemas.openxmlformats.org/officeDocument/2006/relationships" xmlns:p="http://schemas.openxmlformats.org/presentationml/2006/main">
+  <p:cSld>
+    <p:spTree>
+      <p:nvGrpSpPr>
+        <p:cNvPr id="1" name=""/>
+        <p:cNvGrpSpPr/>
+        <p:nvPr/>
+      </p:nvGrpSpPr>
+      <p:grpSpPr>
+        <a:xfrm>
+          <a:off x="0" y="0"/>
+          <a:ext cx="0" cy="0"/>
+          <a:chOff x="0" y="0"/>
+          <a:chExt cx="0" cy="0"/>
+        </a:xfrm>
+      </p:grpSpPr>
+      <p:sp>
+        <p:nvSpPr>
+          <p:cNvPr id="2" name="Slide Image Placeholder 1"/>
+          <p:cNvSpPr>
+            <a:spLocks noGrp="1" noRot="1" noChangeAspect="1"/>
+          </p:cNvSpPr>
+          <p:nvPr>
+            <p:ph type="sldImg"/>
+          </p:nvPr>
+        </p:nvSpPr>
+        <p:spPr/>
+      </p:sp>
+      <p:sp>
+        <p:nvSpPr>
+          <p:cNvPr id="3" name="Notes Placeholder 2"/>
+          <p:cNvSpPr>
+            <a:spLocks noGrp="1"/>
+          </p:cNvSpPr>
+          <p:nvPr>
+            <p:ph type="body" idx="1"/>
+          </p:nvPr>
+        </p:nvSpPr>
+        <p:spPr/>
+        <p:txBody>
+          <a:bodyPr/>
+          <a:lstStyle/>
+          <a:p>
+            <a:pPr marL="171450" indent="-171450">
+              <a:buFont typeface="Arial" panose="020B0604020202020204" pitchFamily="34" charset="0"/>
+              <a:buChar char="•"/>
+            </a:pPr>
+            <a:r>
+              <a:rPr lang="en-US" dirty="0" err="1"/>
+              <a:t>PowerBI</a:t>
+            </a:r>
+            <a:r>
+              <a:rPr lang="en-US" dirty="0"/>
+              <a:t>: Get data from other sources</a:t>
+            </a:r>
+          </a:p>
+          <a:p>
+            <a:pPr marL="628650" lvl="1" indent="-171450">
+              <a:buFont typeface="Arial" panose="020B0604020202020204" pitchFamily="34" charset="0"/>
+              <a:buChar char="•"/>
+            </a:pPr>
+            <a:r>
+              <a:rPr lang="en-US" dirty="0"/>
+              <a:t>GitHub: </a:t>
+            </a:r>
+          </a:p>
+          <a:p>
+            <a:pPr marL="1085850" lvl="2" indent="-171450">
+              <a:buFont typeface="Arial" panose="020B0604020202020204" pitchFamily="34" charset="0"/>
+              <a:buChar char="•"/>
+            </a:pPr>
+            <a:r>
+              <a:rPr lang="en-US" dirty="0"/>
+              <a:t>Enter username for Owner and Repository Name.</a:t>
+            </a:r>
+          </a:p>
+          <a:p>
+            <a:pPr marL="1085850" lvl="2" indent="-171450">
+              <a:buFont typeface="Arial" panose="020B0604020202020204" pitchFamily="34" charset="0"/>
+              <a:buChar char="•"/>
+            </a:pPr>
+            <a:r>
+              <a:rPr lang="en-US" dirty="0"/>
+              <a:t>Sign in.</a:t>
+            </a:r>
+          </a:p>
+          <a:p>
+            <a:pPr marL="1085850" lvl="2" indent="-171450">
+              <a:buFont typeface="Arial" panose="020B0604020202020204" pitchFamily="34" charset="0"/>
+              <a:buChar char="•"/>
+            </a:pPr>
+            <a:r>
+              <a:rPr lang="en-US" dirty="0"/>
+              <a:t>Authorize.</a:t>
+            </a:r>
+          </a:p>
+          <a:p>
+            <a:pPr marL="1085850" lvl="2" indent="-171450">
+              <a:buFont typeface="Arial" panose="020B0604020202020204" pitchFamily="34" charset="0"/>
+              <a:buChar char="•"/>
+            </a:pPr>
+            <a:r>
+              <a:rPr lang="en-US"/>
+              <a:t>Connect.</a:t>
+            </a:r>
+            <a:endParaRPr lang="en-US" dirty="0"/>
+          </a:p>
+        </p:txBody>
+      </p:sp>
+      <p:sp>
+        <p:nvSpPr>
+          <p:cNvPr id="4" name="Slide Number Placeholder 3"/>
+          <p:cNvSpPr>
+            <a:spLocks noGrp="1"/>
+          </p:cNvSpPr>
+          <p:nvPr>
+            <p:ph type="sldNum" sz="quarter" idx="5"/>
+          </p:nvPr>
+        </p:nvSpPr>
+        <p:spPr/>
+        <p:txBody>
+          <a:bodyPr/>
+          <a:lstStyle/>
+          <a:p>
+            <a:fld id="{B7B3E9D7-7C42-42C9-B073-01B263BBC5B6}" type="slidenum">
+              <a:rPr lang="en-US" smtClean="0"/>
+              <a:t>8</a:t>
+            </a:fld>
+            <a:endParaRPr lang="en-US"/>
+          </a:p>
+        </p:txBody>
+      </p:sp>
+    </p:spTree>
+    <p:extLst>
+      <p:ext uri="{BB962C8B-B14F-4D97-AF65-F5344CB8AC3E}">
+        <p14:creationId xmlns:p14="http://schemas.microsoft.com/office/powerpoint/2010/main" val="1377252040"/>
       </p:ext>
     </p:extLst>
   </p:cSld>
@@ -8069,10 +8341,846 @@
           <a:chExt cx="0" cy="0"/>
         </a:xfrm>
       </p:grpSpPr>
+      <p:grpSp>
+        <p:nvGrpSpPr>
+          <p:cNvPr id="14" name="Group 13">
+            <a:extLst>
+              <a:ext uri="{FF2B5EF4-FFF2-40B4-BE49-F238E27FC236}">
+                <a16:creationId xmlns:a16="http://schemas.microsoft.com/office/drawing/2014/main" id="{B1604F3F-ECCD-504B-DA6C-EA134CA06F61}"/>
+              </a:ext>
+            </a:extLst>
+          </p:cNvPr>
+          <p:cNvGrpSpPr/>
+          <p:nvPr/>
+        </p:nvGrpSpPr>
+        <p:grpSpPr>
+          <a:xfrm>
+            <a:off x="381000" y="0"/>
+            <a:ext cx="11430000" cy="6858000"/>
+            <a:chOff x="381000" y="0"/>
+            <a:chExt cx="11430000" cy="6858000"/>
+          </a:xfrm>
+        </p:grpSpPr>
+        <p:grpSp>
+          <p:nvGrpSpPr>
+            <p:cNvPr id="6" name="Group 5">
+              <a:extLst>
+                <a:ext uri="{FF2B5EF4-FFF2-40B4-BE49-F238E27FC236}">
+                  <a16:creationId xmlns:a16="http://schemas.microsoft.com/office/drawing/2014/main" id="{26091ABF-D024-801B-DF60-FFF7C4B1B5A5}"/>
+                </a:ext>
+              </a:extLst>
+            </p:cNvPr>
+            <p:cNvGrpSpPr/>
+            <p:nvPr/>
+          </p:nvGrpSpPr>
+          <p:grpSpPr>
+            <a:xfrm>
+              <a:off x="381000" y="0"/>
+              <a:ext cx="11430000" cy="6858000"/>
+              <a:chOff x="381000" y="0"/>
+              <a:chExt cx="11430000" cy="6858000"/>
+            </a:xfrm>
+          </p:grpSpPr>
+          <p:pic>
+            <p:nvPicPr>
+              <p:cNvPr id="3" name="Picture 2">
+                <a:extLst>
+                  <a:ext uri="{FF2B5EF4-FFF2-40B4-BE49-F238E27FC236}">
+                    <a16:creationId xmlns:a16="http://schemas.microsoft.com/office/drawing/2014/main" id="{CAD1155F-81D4-1062-6436-4CE748FACE77}"/>
+                  </a:ext>
+                </a:extLst>
+              </p:cNvPr>
+              <p:cNvPicPr>
+                <a:picLocks noChangeAspect="1"/>
+              </p:cNvPicPr>
+              <p:nvPr/>
+            </p:nvPicPr>
+            <p:blipFill>
+              <a:blip r:embed="rId3"/>
+              <a:stretch>
+                <a:fillRect/>
+              </a:stretch>
+            </p:blipFill>
+            <p:spPr>
+              <a:xfrm>
+                <a:off x="381000" y="0"/>
+                <a:ext cx="11430000" cy="6858000"/>
+              </a:xfrm>
+              <a:prstGeom prst="rect">
+                <a:avLst/>
+              </a:prstGeom>
+              <a:ln>
+                <a:solidFill>
+                  <a:schemeClr val="tx1"/>
+                </a:solidFill>
+              </a:ln>
+            </p:spPr>
+          </p:pic>
+          <p:sp>
+            <p:nvSpPr>
+              <p:cNvPr id="4" name="Rectangle: Rounded Corners 3">
+                <a:extLst>
+                  <a:ext uri="{FF2B5EF4-FFF2-40B4-BE49-F238E27FC236}">
+                    <a16:creationId xmlns:a16="http://schemas.microsoft.com/office/drawing/2014/main" id="{17898F10-7E2A-4ED1-7B98-CFED0BAD7E29}"/>
+                  </a:ext>
+                </a:extLst>
+              </p:cNvPr>
+              <p:cNvSpPr/>
+              <p:nvPr/>
+            </p:nvSpPr>
+            <p:spPr>
+              <a:xfrm>
+                <a:off x="8107528" y="841639"/>
+                <a:ext cx="228600" cy="914400"/>
+              </a:xfrm>
+              <a:prstGeom prst="roundRect">
+                <a:avLst>
+                  <a:gd name="adj" fmla="val 9370"/>
+                </a:avLst>
+              </a:prstGeom>
+              <a:noFill/>
+              <a:ln w="38100">
+                <a:solidFill>
+                  <a:srgbClr val="FFC000"/>
+                </a:solidFill>
+              </a:ln>
+            </p:spPr>
+            <p:style>
+              <a:lnRef idx="2">
+                <a:schemeClr val="accent1">
+                  <a:shade val="15000"/>
+                </a:schemeClr>
+              </a:lnRef>
+              <a:fillRef idx="1">
+                <a:schemeClr val="accent1"/>
+              </a:fillRef>
+              <a:effectRef idx="0">
+                <a:schemeClr val="accent1"/>
+              </a:effectRef>
+              <a:fontRef idx="minor">
+                <a:schemeClr val="lt1"/>
+              </a:fontRef>
+            </p:style>
+            <p:txBody>
+              <a:bodyPr rtlCol="0" anchor="ctr"/>
+              <a:lstStyle/>
+              <a:p>
+                <a:pPr algn="ctr"/>
+                <a:endParaRPr lang="en-US"/>
+              </a:p>
+            </p:txBody>
+          </p:sp>
+          <p:sp>
+            <p:nvSpPr>
+              <p:cNvPr id="5" name="Rectangle: Rounded Corners 4">
+                <a:extLst>
+                  <a:ext uri="{FF2B5EF4-FFF2-40B4-BE49-F238E27FC236}">
+                    <a16:creationId xmlns:a16="http://schemas.microsoft.com/office/drawing/2014/main" id="{27179A49-DD3F-233E-C840-581F1696771A}"/>
+                  </a:ext>
+                </a:extLst>
+              </p:cNvPr>
+              <p:cNvSpPr/>
+              <p:nvPr/>
+            </p:nvSpPr>
+            <p:spPr>
+              <a:xfrm>
+                <a:off x="8411951" y="592607"/>
+                <a:ext cx="455824" cy="182880"/>
+              </a:xfrm>
+              <a:prstGeom prst="roundRect">
+                <a:avLst>
+                  <a:gd name="adj" fmla="val 9370"/>
+                </a:avLst>
+              </a:prstGeom>
+              <a:noFill/>
+              <a:ln w="38100">
+                <a:solidFill>
+                  <a:srgbClr val="FFC000"/>
+                </a:solidFill>
+              </a:ln>
+            </p:spPr>
+            <p:style>
+              <a:lnRef idx="2">
+                <a:schemeClr val="accent1">
+                  <a:shade val="15000"/>
+                </a:schemeClr>
+              </a:lnRef>
+              <a:fillRef idx="1">
+                <a:schemeClr val="accent1"/>
+              </a:fillRef>
+              <a:effectRef idx="0">
+                <a:schemeClr val="accent1"/>
+              </a:effectRef>
+              <a:fontRef idx="minor">
+                <a:schemeClr val="lt1"/>
+              </a:fontRef>
+            </p:style>
+            <p:txBody>
+              <a:bodyPr rtlCol="0" anchor="ctr"/>
+              <a:lstStyle/>
+              <a:p>
+                <a:pPr algn="ctr"/>
+                <a:endParaRPr lang="en-US"/>
+              </a:p>
+            </p:txBody>
+          </p:sp>
+        </p:grpSp>
+        <p:sp>
+          <p:nvSpPr>
+            <p:cNvPr id="13" name="Rectangle: Rounded Corners 12">
+              <a:extLst>
+                <a:ext uri="{FF2B5EF4-FFF2-40B4-BE49-F238E27FC236}">
+                  <a16:creationId xmlns:a16="http://schemas.microsoft.com/office/drawing/2014/main" id="{752DECC6-BA0F-24FE-AD76-2BA37BCC6E1F}"/>
+                </a:ext>
+              </a:extLst>
+            </p:cNvPr>
+            <p:cNvSpPr/>
+            <p:nvPr/>
+          </p:nvSpPr>
+          <p:spPr>
+            <a:xfrm>
+              <a:off x="9402551" y="482117"/>
+              <a:ext cx="228600" cy="137160"/>
+            </a:xfrm>
+            <a:prstGeom prst="roundRect">
+              <a:avLst>
+                <a:gd name="adj" fmla="val 9370"/>
+              </a:avLst>
+            </a:prstGeom>
+            <a:noFill/>
+            <a:ln w="38100">
+              <a:solidFill>
+                <a:srgbClr val="FFC000"/>
+              </a:solidFill>
+            </a:ln>
+          </p:spPr>
+          <p:style>
+            <a:lnRef idx="2">
+              <a:schemeClr val="accent1">
+                <a:shade val="15000"/>
+              </a:schemeClr>
+            </a:lnRef>
+            <a:fillRef idx="1">
+              <a:schemeClr val="accent1"/>
+            </a:fillRef>
+            <a:effectRef idx="0">
+              <a:schemeClr val="accent1"/>
+            </a:effectRef>
+            <a:fontRef idx="minor">
+              <a:schemeClr val="lt1"/>
+            </a:fontRef>
+          </p:style>
+          <p:txBody>
+            <a:bodyPr rtlCol="0" anchor="ctr"/>
+            <a:lstStyle/>
+            <a:p>
+              <a:pPr algn="ctr"/>
+              <a:endParaRPr lang="en-US"/>
+            </a:p>
+          </p:txBody>
+        </p:sp>
+      </p:grpSp>
+      <p:grpSp>
+        <p:nvGrpSpPr>
+          <p:cNvPr id="12" name="Group 11">
+            <a:extLst>
+              <a:ext uri="{FF2B5EF4-FFF2-40B4-BE49-F238E27FC236}">
+                <a16:creationId xmlns:a16="http://schemas.microsoft.com/office/drawing/2014/main" id="{078C30C6-75A8-C4F6-9E77-F0C0FADFDD43}"/>
+              </a:ext>
+            </a:extLst>
+          </p:cNvPr>
+          <p:cNvGrpSpPr/>
+          <p:nvPr/>
+        </p:nvGrpSpPr>
+        <p:grpSpPr>
+          <a:xfrm>
+            <a:off x="1430957" y="841639"/>
+            <a:ext cx="6403398" cy="6858000"/>
+            <a:chOff x="1430957" y="209550"/>
+            <a:chExt cx="6403398" cy="6858000"/>
+          </a:xfrm>
+        </p:grpSpPr>
+        <p:pic>
+          <p:nvPicPr>
+            <p:cNvPr id="8" name="Picture 7" descr="A screenshot of a computer&#10;&#10;AI-generated content may be incorrect.">
+              <a:extLst>
+                <a:ext uri="{FF2B5EF4-FFF2-40B4-BE49-F238E27FC236}">
+                  <a16:creationId xmlns:a16="http://schemas.microsoft.com/office/drawing/2014/main" id="{15A75C0E-B7C1-5E17-7BF9-449A3AE20DE2}"/>
+                </a:ext>
+              </a:extLst>
+            </p:cNvPr>
+            <p:cNvPicPr>
+              <a:picLocks noChangeAspect="1"/>
+            </p:cNvPicPr>
+            <p:nvPr/>
+          </p:nvPicPr>
+          <p:blipFill>
+            <a:blip r:embed="rId4">
+              <a:extLst>
+                <a:ext uri="{28A0092B-C50C-407E-A947-70E740481C1C}">
+                  <a14:useLocalDpi xmlns:a14="http://schemas.microsoft.com/office/drawing/2010/main" val="0"/>
+                </a:ext>
+              </a:extLst>
+            </a:blip>
+            <a:stretch>
+              <a:fillRect/>
+            </a:stretch>
+          </p:blipFill>
+          <p:spPr>
+            <a:xfrm>
+              <a:off x="1430957" y="209550"/>
+              <a:ext cx="6403398" cy="6858000"/>
+            </a:xfrm>
+            <a:prstGeom prst="rect">
+              <a:avLst/>
+            </a:prstGeom>
+          </p:spPr>
+        </p:pic>
+        <p:sp>
+          <p:nvSpPr>
+            <p:cNvPr id="9" name="Rectangle: Rounded Corners 8">
+              <a:extLst>
+                <a:ext uri="{FF2B5EF4-FFF2-40B4-BE49-F238E27FC236}">
+                  <a16:creationId xmlns:a16="http://schemas.microsoft.com/office/drawing/2014/main" id="{B5B731DC-AAA7-68E4-93F6-146D897D3624}"/>
+                </a:ext>
+              </a:extLst>
+            </p:cNvPr>
+            <p:cNvSpPr/>
+            <p:nvPr/>
+          </p:nvSpPr>
+          <p:spPr>
+            <a:xfrm>
+              <a:off x="5249650" y="704850"/>
+              <a:ext cx="2560320" cy="954186"/>
+            </a:xfrm>
+            <a:prstGeom prst="roundRect">
+              <a:avLst>
+                <a:gd name="adj" fmla="val 9370"/>
+              </a:avLst>
+            </a:prstGeom>
+            <a:noFill/>
+            <a:ln w="38100">
+              <a:solidFill>
+                <a:srgbClr val="FFC000"/>
+              </a:solidFill>
+            </a:ln>
+          </p:spPr>
+          <p:style>
+            <a:lnRef idx="2">
+              <a:schemeClr val="accent1">
+                <a:shade val="15000"/>
+              </a:schemeClr>
+            </a:lnRef>
+            <a:fillRef idx="1">
+              <a:schemeClr val="accent1"/>
+            </a:fillRef>
+            <a:effectRef idx="0">
+              <a:schemeClr val="accent1"/>
+            </a:effectRef>
+            <a:fontRef idx="minor">
+              <a:schemeClr val="lt1"/>
+            </a:fontRef>
+          </p:style>
+          <p:txBody>
+            <a:bodyPr rtlCol="0" anchor="ctr"/>
+            <a:lstStyle/>
+            <a:p>
+              <a:pPr algn="ctr"/>
+              <a:endParaRPr lang="en-US"/>
+            </a:p>
+          </p:txBody>
+        </p:sp>
+        <p:sp>
+          <p:nvSpPr>
+            <p:cNvPr id="10" name="Rectangle: Rounded Corners 9">
+              <a:extLst>
+                <a:ext uri="{FF2B5EF4-FFF2-40B4-BE49-F238E27FC236}">
+                  <a16:creationId xmlns:a16="http://schemas.microsoft.com/office/drawing/2014/main" id="{84334FAB-0928-6510-4AC4-1F7AAADEADDD}"/>
+                </a:ext>
+              </a:extLst>
+            </p:cNvPr>
+            <p:cNvSpPr/>
+            <p:nvPr/>
+          </p:nvSpPr>
+          <p:spPr>
+            <a:xfrm>
+              <a:off x="7296149" y="1727462"/>
+              <a:ext cx="504295" cy="137160"/>
+            </a:xfrm>
+            <a:prstGeom prst="roundRect">
+              <a:avLst>
+                <a:gd name="adj" fmla="val 9370"/>
+              </a:avLst>
+            </a:prstGeom>
+            <a:noFill/>
+            <a:ln w="38100">
+              <a:solidFill>
+                <a:srgbClr val="FFC000"/>
+              </a:solidFill>
+            </a:ln>
+          </p:spPr>
+          <p:style>
+            <a:lnRef idx="2">
+              <a:schemeClr val="accent1">
+                <a:shade val="15000"/>
+              </a:schemeClr>
+            </a:lnRef>
+            <a:fillRef idx="1">
+              <a:schemeClr val="accent1"/>
+            </a:fillRef>
+            <a:effectRef idx="0">
+              <a:schemeClr val="accent1"/>
+            </a:effectRef>
+            <a:fontRef idx="minor">
+              <a:schemeClr val="lt1"/>
+            </a:fontRef>
+          </p:style>
+          <p:txBody>
+            <a:bodyPr rtlCol="0" anchor="ctr"/>
+            <a:lstStyle/>
+            <a:p>
+              <a:pPr algn="ctr"/>
+              <a:endParaRPr lang="en-US"/>
+            </a:p>
+          </p:txBody>
+        </p:sp>
+        <p:sp>
+          <p:nvSpPr>
+            <p:cNvPr id="11" name="Rectangle: Rounded Corners 10">
+              <a:extLst>
+                <a:ext uri="{FF2B5EF4-FFF2-40B4-BE49-F238E27FC236}">
+                  <a16:creationId xmlns:a16="http://schemas.microsoft.com/office/drawing/2014/main" id="{9C9AD86D-3305-5C77-1262-EB1967562D56}"/>
+                </a:ext>
+              </a:extLst>
+            </p:cNvPr>
+            <p:cNvSpPr/>
+            <p:nvPr/>
+          </p:nvSpPr>
+          <p:spPr>
+            <a:xfrm>
+              <a:off x="7447597" y="424519"/>
+              <a:ext cx="365760" cy="182880"/>
+            </a:xfrm>
+            <a:prstGeom prst="roundRect">
+              <a:avLst>
+                <a:gd name="adj" fmla="val 9370"/>
+              </a:avLst>
+            </a:prstGeom>
+            <a:noFill/>
+            <a:ln w="38100">
+              <a:solidFill>
+                <a:srgbClr val="FFC000"/>
+              </a:solidFill>
+            </a:ln>
+          </p:spPr>
+          <p:style>
+            <a:lnRef idx="2">
+              <a:schemeClr val="accent1">
+                <a:shade val="15000"/>
+              </a:schemeClr>
+            </a:lnRef>
+            <a:fillRef idx="1">
+              <a:schemeClr val="accent1"/>
+            </a:fillRef>
+            <a:effectRef idx="0">
+              <a:schemeClr val="accent1"/>
+            </a:effectRef>
+            <a:fontRef idx="minor">
+              <a:schemeClr val="lt1"/>
+            </a:fontRef>
+          </p:style>
+          <p:txBody>
+            <a:bodyPr rtlCol="0" anchor="ctr"/>
+            <a:lstStyle/>
+            <a:p>
+              <a:pPr algn="ctr"/>
+              <a:endParaRPr lang="en-US"/>
+            </a:p>
+          </p:txBody>
+        </p:sp>
+      </p:grpSp>
     </p:spTree>
     <p:extLst>
       <p:ext uri="{BB962C8B-B14F-4D97-AF65-F5344CB8AC3E}">
         <p14:creationId xmlns:p14="http://schemas.microsoft.com/office/powerpoint/2010/main" val="680315991"/>
+      </p:ext>
+    </p:extLst>
+  </p:cSld>
+  <p:clrMapOvr>
+    <a:masterClrMapping/>
+  </p:clrMapOvr>
+</p:sld>
+</file>
+
+<file path=ppt/slides/slide8.xml><?xml version="1.0" encoding="utf-8"?>
+<p:sld xmlns:a="http://schemas.openxmlformats.org/drawingml/2006/main" xmlns:r="http://schemas.openxmlformats.org/officeDocument/2006/relationships" xmlns:p="http://schemas.openxmlformats.org/presentationml/2006/main">
+  <p:cSld>
+    <p:spTree>
+      <p:nvGrpSpPr>
+        <p:cNvPr id="1" name=""/>
+        <p:cNvGrpSpPr/>
+        <p:nvPr/>
+      </p:nvGrpSpPr>
+      <p:grpSpPr>
+        <a:xfrm>
+          <a:off x="0" y="0"/>
+          <a:ext cx="0" cy="0"/>
+          <a:chOff x="0" y="0"/>
+          <a:chExt cx="0" cy="0"/>
+        </a:xfrm>
+      </p:grpSpPr>
+      <p:pic>
+        <p:nvPicPr>
+          <p:cNvPr id="3" name="Picture 2">
+            <a:extLst>
+              <a:ext uri="{FF2B5EF4-FFF2-40B4-BE49-F238E27FC236}">
+                <a16:creationId xmlns:a16="http://schemas.microsoft.com/office/drawing/2014/main" id="{5BE50E12-A6A3-3A84-CD82-0B6545999E3F}"/>
+              </a:ext>
+            </a:extLst>
+          </p:cNvPr>
+          <p:cNvPicPr>
+            <a:picLocks noChangeAspect="1"/>
+          </p:cNvPicPr>
+          <p:nvPr/>
+        </p:nvPicPr>
+        <p:blipFill>
+          <a:blip r:embed="rId3"/>
+          <a:stretch>
+            <a:fillRect/>
+          </a:stretch>
+        </p:blipFill>
+        <p:spPr>
+          <a:xfrm>
+            <a:off x="0" y="23673"/>
+            <a:ext cx="12192000" cy="6810654"/>
+          </a:xfrm>
+          <a:prstGeom prst="rect">
+            <a:avLst/>
+          </a:prstGeom>
+        </p:spPr>
+      </p:pic>
+      <p:sp>
+        <p:nvSpPr>
+          <p:cNvPr id="8" name="Rectangle: Rounded Corners 7">
+            <a:extLst>
+              <a:ext uri="{FF2B5EF4-FFF2-40B4-BE49-F238E27FC236}">
+                <a16:creationId xmlns:a16="http://schemas.microsoft.com/office/drawing/2014/main" id="{DB1EE21F-F0E4-77EB-F9BC-D0D67A0CCF89}"/>
+              </a:ext>
+            </a:extLst>
+          </p:cNvPr>
+          <p:cNvSpPr/>
+          <p:nvPr/>
+        </p:nvSpPr>
+        <p:spPr>
+          <a:xfrm>
+            <a:off x="7174078" y="1226011"/>
+            <a:ext cx="931697" cy="926639"/>
+          </a:xfrm>
+          <a:prstGeom prst="roundRect">
+            <a:avLst>
+              <a:gd name="adj" fmla="val 9370"/>
+            </a:avLst>
+          </a:prstGeom>
+          <a:noFill/>
+          <a:ln w="38100">
+            <a:solidFill>
+              <a:srgbClr val="FFC000"/>
+            </a:solidFill>
+          </a:ln>
+        </p:spPr>
+        <p:style>
+          <a:lnRef idx="2">
+            <a:schemeClr val="accent1">
+              <a:shade val="15000"/>
+            </a:schemeClr>
+          </a:lnRef>
+          <a:fillRef idx="1">
+            <a:schemeClr val="accent1"/>
+          </a:fillRef>
+          <a:effectRef idx="0">
+            <a:schemeClr val="accent1"/>
+          </a:effectRef>
+          <a:fontRef idx="minor">
+            <a:schemeClr val="lt1"/>
+          </a:fontRef>
+        </p:style>
+        <p:txBody>
+          <a:bodyPr rtlCol="0" anchor="ctr"/>
+          <a:lstStyle/>
+          <a:p>
+            <a:pPr algn="ctr"/>
+            <a:endParaRPr lang="en-US"/>
+          </a:p>
+        </p:txBody>
+      </p:sp>
+      <p:grpSp>
+        <p:nvGrpSpPr>
+          <p:cNvPr id="10" name="Group 9">
+            <a:extLst>
+              <a:ext uri="{FF2B5EF4-FFF2-40B4-BE49-F238E27FC236}">
+                <a16:creationId xmlns:a16="http://schemas.microsoft.com/office/drawing/2014/main" id="{DACE6CDD-449C-79CC-1C54-129B74AD7AD9}"/>
+              </a:ext>
+            </a:extLst>
+          </p:cNvPr>
+          <p:cNvGrpSpPr/>
+          <p:nvPr/>
+        </p:nvGrpSpPr>
+        <p:grpSpPr>
+          <a:xfrm>
+            <a:off x="4609658" y="2402370"/>
+            <a:ext cx="6496957" cy="6306430"/>
+            <a:chOff x="4219133" y="2402370"/>
+            <a:chExt cx="6496957" cy="6306430"/>
+          </a:xfrm>
+        </p:grpSpPr>
+        <p:pic>
+          <p:nvPicPr>
+            <p:cNvPr id="5" name="Picture 4">
+              <a:extLst>
+                <a:ext uri="{FF2B5EF4-FFF2-40B4-BE49-F238E27FC236}">
+                  <a16:creationId xmlns:a16="http://schemas.microsoft.com/office/drawing/2014/main" id="{89917392-2F52-5E30-A1B5-B269B20F3F56}"/>
+                </a:ext>
+              </a:extLst>
+            </p:cNvPr>
+            <p:cNvPicPr>
+              <a:picLocks noChangeAspect="1"/>
+            </p:cNvPicPr>
+            <p:nvPr/>
+          </p:nvPicPr>
+          <p:blipFill>
+            <a:blip r:embed="rId4"/>
+            <a:stretch>
+              <a:fillRect/>
+            </a:stretch>
+          </p:blipFill>
+          <p:spPr>
+            <a:xfrm>
+              <a:off x="4219133" y="2402370"/>
+              <a:ext cx="6496957" cy="6306430"/>
+            </a:xfrm>
+            <a:prstGeom prst="rect">
+              <a:avLst/>
+            </a:prstGeom>
+          </p:spPr>
+        </p:pic>
+        <p:sp>
+          <p:nvSpPr>
+            <p:cNvPr id="9" name="Rectangle: Rounded Corners 8">
+              <a:extLst>
+                <a:ext uri="{FF2B5EF4-FFF2-40B4-BE49-F238E27FC236}">
+                  <a16:creationId xmlns:a16="http://schemas.microsoft.com/office/drawing/2014/main" id="{7046E04E-C1AB-BD1D-8B79-D0DC8E2EE822}"/>
+                </a:ext>
+              </a:extLst>
+            </p:cNvPr>
+            <p:cNvSpPr/>
+            <p:nvPr/>
+          </p:nvSpPr>
+          <p:spPr>
+            <a:xfrm>
+              <a:off x="6364453" y="3597963"/>
+              <a:ext cx="3874922" cy="231088"/>
+            </a:xfrm>
+            <a:prstGeom prst="roundRect">
+              <a:avLst>
+                <a:gd name="adj" fmla="val 9370"/>
+              </a:avLst>
+            </a:prstGeom>
+            <a:noFill/>
+            <a:ln w="38100">
+              <a:solidFill>
+                <a:srgbClr val="FFC000"/>
+              </a:solidFill>
+            </a:ln>
+          </p:spPr>
+          <p:style>
+            <a:lnRef idx="2">
+              <a:schemeClr val="accent1">
+                <a:shade val="15000"/>
+              </a:schemeClr>
+            </a:lnRef>
+            <a:fillRef idx="1">
+              <a:schemeClr val="accent1"/>
+            </a:fillRef>
+            <a:effectRef idx="0">
+              <a:schemeClr val="accent1"/>
+            </a:effectRef>
+            <a:fontRef idx="minor">
+              <a:schemeClr val="lt1"/>
+            </a:fontRef>
+          </p:style>
+          <p:txBody>
+            <a:bodyPr rtlCol="0" anchor="ctr"/>
+            <a:lstStyle/>
+            <a:p>
+              <a:pPr algn="ctr"/>
+              <a:endParaRPr lang="en-US"/>
+            </a:p>
+          </p:txBody>
+        </p:sp>
+      </p:grpSp>
+      <p:grpSp>
+        <p:nvGrpSpPr>
+          <p:cNvPr id="13" name="Group 12">
+            <a:extLst>
+              <a:ext uri="{FF2B5EF4-FFF2-40B4-BE49-F238E27FC236}">
+                <a16:creationId xmlns:a16="http://schemas.microsoft.com/office/drawing/2014/main" id="{DF14C7BC-F790-8858-2B20-C18E955B15E5}"/>
+              </a:ext>
+            </a:extLst>
+          </p:cNvPr>
+          <p:cNvGrpSpPr/>
+          <p:nvPr/>
+        </p:nvGrpSpPr>
+        <p:grpSpPr>
+          <a:xfrm>
+            <a:off x="5348697" y="4402899"/>
+            <a:ext cx="6687483" cy="2305372"/>
+            <a:chOff x="5314496" y="4313506"/>
+            <a:chExt cx="6687483" cy="2305372"/>
+          </a:xfrm>
+        </p:grpSpPr>
+        <p:pic>
+          <p:nvPicPr>
+            <p:cNvPr id="7" name="Picture 6">
+              <a:extLst>
+                <a:ext uri="{FF2B5EF4-FFF2-40B4-BE49-F238E27FC236}">
+                  <a16:creationId xmlns:a16="http://schemas.microsoft.com/office/drawing/2014/main" id="{7F201D97-7538-6388-414D-A19BDA82FCEA}"/>
+                </a:ext>
+              </a:extLst>
+            </p:cNvPr>
+            <p:cNvPicPr>
+              <a:picLocks noChangeAspect="1"/>
+            </p:cNvPicPr>
+            <p:nvPr/>
+          </p:nvPicPr>
+          <p:blipFill>
+            <a:blip r:embed="rId5"/>
+            <a:stretch>
+              <a:fillRect/>
+            </a:stretch>
+          </p:blipFill>
+          <p:spPr>
+            <a:xfrm>
+              <a:off x="5314496" y="4313506"/>
+              <a:ext cx="6687483" cy="2305372"/>
+            </a:xfrm>
+            <a:prstGeom prst="rect">
+              <a:avLst/>
+            </a:prstGeom>
+          </p:spPr>
+        </p:pic>
+        <p:sp>
+          <p:nvSpPr>
+            <p:cNvPr id="11" name="Rectangle: Rounded Corners 10">
+              <a:extLst>
+                <a:ext uri="{FF2B5EF4-FFF2-40B4-BE49-F238E27FC236}">
+                  <a16:creationId xmlns:a16="http://schemas.microsoft.com/office/drawing/2014/main" id="{0BEA05E1-E351-EDBF-ECC4-0AF3A7A0A6BE}"/>
+                </a:ext>
+              </a:extLst>
+            </p:cNvPr>
+            <p:cNvSpPr/>
+            <p:nvPr/>
+          </p:nvSpPr>
+          <p:spPr>
+            <a:xfrm>
+              <a:off x="5629275" y="5076772"/>
+              <a:ext cx="3809999" cy="247703"/>
+            </a:xfrm>
+            <a:prstGeom prst="roundRect">
+              <a:avLst>
+                <a:gd name="adj" fmla="val 9370"/>
+              </a:avLst>
+            </a:prstGeom>
+            <a:noFill/>
+            <a:ln w="38100">
+              <a:solidFill>
+                <a:srgbClr val="FFC000"/>
+              </a:solidFill>
+            </a:ln>
+          </p:spPr>
+          <p:style>
+            <a:lnRef idx="2">
+              <a:schemeClr val="accent1">
+                <a:shade val="15000"/>
+              </a:schemeClr>
+            </a:lnRef>
+            <a:fillRef idx="1">
+              <a:schemeClr val="accent1"/>
+            </a:fillRef>
+            <a:effectRef idx="0">
+              <a:schemeClr val="accent1"/>
+            </a:effectRef>
+            <a:fontRef idx="minor">
+              <a:schemeClr val="lt1"/>
+            </a:fontRef>
+          </p:style>
+          <p:txBody>
+            <a:bodyPr rtlCol="0" anchor="ctr"/>
+            <a:lstStyle/>
+            <a:p>
+              <a:pPr algn="ctr"/>
+              <a:endParaRPr lang="en-US"/>
+            </a:p>
+          </p:txBody>
+        </p:sp>
+        <p:sp>
+          <p:nvSpPr>
+            <p:cNvPr id="12" name="Rectangle: Rounded Corners 11">
+              <a:extLst>
+                <a:ext uri="{FF2B5EF4-FFF2-40B4-BE49-F238E27FC236}">
+                  <a16:creationId xmlns:a16="http://schemas.microsoft.com/office/drawing/2014/main" id="{3A399F6A-A4A7-DD62-8CF7-04CC4868BD9C}"/>
+                </a:ext>
+              </a:extLst>
+            </p:cNvPr>
+            <p:cNvSpPr/>
+            <p:nvPr/>
+          </p:nvSpPr>
+          <p:spPr>
+            <a:xfrm>
+              <a:off x="5629274" y="5555145"/>
+              <a:ext cx="3809999" cy="247703"/>
+            </a:xfrm>
+            <a:prstGeom prst="roundRect">
+              <a:avLst>
+                <a:gd name="adj" fmla="val 9370"/>
+              </a:avLst>
+            </a:prstGeom>
+            <a:noFill/>
+            <a:ln w="38100">
+              <a:solidFill>
+                <a:srgbClr val="FFC000"/>
+              </a:solidFill>
+            </a:ln>
+          </p:spPr>
+          <p:style>
+            <a:lnRef idx="2">
+              <a:schemeClr val="accent1">
+                <a:shade val="15000"/>
+              </a:schemeClr>
+            </a:lnRef>
+            <a:fillRef idx="1">
+              <a:schemeClr val="accent1"/>
+            </a:fillRef>
+            <a:effectRef idx="0">
+              <a:schemeClr val="accent1"/>
+            </a:effectRef>
+            <a:fontRef idx="minor">
+              <a:schemeClr val="lt1"/>
+            </a:fontRef>
+          </p:style>
+          <p:txBody>
+            <a:bodyPr rtlCol="0" anchor="ctr"/>
+            <a:lstStyle/>
+            <a:p>
+              <a:pPr algn="ctr"/>
+              <a:endParaRPr lang="en-US"/>
+            </a:p>
+          </p:txBody>
+        </p:sp>
+      </p:grpSp>
+    </p:spTree>
+    <p:extLst>
+      <p:ext uri="{BB962C8B-B14F-4D97-AF65-F5344CB8AC3E}">
+        <p14:creationId xmlns:p14="http://schemas.microsoft.com/office/powerpoint/2010/main" val="758911715"/>
       </p:ext>
     </p:extLst>
   </p:cSld>

</xml_diff>

<commit_message>
ran chi square in Excel, updated how-to.pptx
</commit_message>
<xml_diff>
--- a/2025-06-30 CAH.pptx
+++ b/2025-06-30 CAH.pptx
@@ -5,33 +5,35 @@
     <p:sldMasterId id="2147483738" r:id="rId1"/>
   </p:sldMasterIdLst>
   <p:notesMasterIdLst>
-    <p:notesMasterId r:id="rId26"/>
+    <p:notesMasterId r:id="rId28"/>
   </p:notesMasterIdLst>
   <p:sldIdLst>
     <p:sldId id="256" r:id="rId2"/>
-    <p:sldId id="265" r:id="rId3"/>
-    <p:sldId id="291" r:id="rId4"/>
-    <p:sldId id="258" r:id="rId5"/>
-    <p:sldId id="257" r:id="rId6"/>
-    <p:sldId id="290" r:id="rId7"/>
-    <p:sldId id="259" r:id="rId8"/>
-    <p:sldId id="262" r:id="rId9"/>
-    <p:sldId id="264" r:id="rId10"/>
-    <p:sldId id="263" r:id="rId11"/>
-    <p:sldId id="266" r:id="rId12"/>
-    <p:sldId id="289" r:id="rId13"/>
-    <p:sldId id="276" r:id="rId14"/>
-    <p:sldId id="278" r:id="rId15"/>
-    <p:sldId id="283" r:id="rId16"/>
-    <p:sldId id="279" r:id="rId17"/>
-    <p:sldId id="280" r:id="rId18"/>
-    <p:sldId id="282" r:id="rId19"/>
-    <p:sldId id="284" r:id="rId20"/>
-    <p:sldId id="274" r:id="rId21"/>
-    <p:sldId id="286" r:id="rId22"/>
-    <p:sldId id="287" r:id="rId23"/>
-    <p:sldId id="288" r:id="rId24"/>
-    <p:sldId id="292" r:id="rId25"/>
+    <p:sldId id="293" r:id="rId3"/>
+    <p:sldId id="265" r:id="rId4"/>
+    <p:sldId id="291" r:id="rId5"/>
+    <p:sldId id="258" r:id="rId6"/>
+    <p:sldId id="257" r:id="rId7"/>
+    <p:sldId id="290" r:id="rId8"/>
+    <p:sldId id="259" r:id="rId9"/>
+    <p:sldId id="262" r:id="rId10"/>
+    <p:sldId id="264" r:id="rId11"/>
+    <p:sldId id="263" r:id="rId12"/>
+    <p:sldId id="266" r:id="rId13"/>
+    <p:sldId id="289" r:id="rId14"/>
+    <p:sldId id="276" r:id="rId15"/>
+    <p:sldId id="278" r:id="rId16"/>
+    <p:sldId id="283" r:id="rId17"/>
+    <p:sldId id="279" r:id="rId18"/>
+    <p:sldId id="280" r:id="rId19"/>
+    <p:sldId id="282" r:id="rId20"/>
+    <p:sldId id="284" r:id="rId21"/>
+    <p:sldId id="274" r:id="rId22"/>
+    <p:sldId id="286" r:id="rId23"/>
+    <p:sldId id="287" r:id="rId24"/>
+    <p:sldId id="288" r:id="rId25"/>
+    <p:sldId id="292" r:id="rId26"/>
+    <p:sldId id="294" r:id="rId27"/>
   </p:sldIdLst>
   <p:sldSz cx="12192000" cy="6858000"/>
   <p:notesSz cx="6858000" cy="9144000"/>
@@ -3548,114 +3550,6 @@
   <p:cSld>
     <p:spTree>
       <p:nvGrpSpPr>
-        <p:cNvPr id="1" name="">
-          <a:extLst>
-            <a:ext uri="{FF2B5EF4-FFF2-40B4-BE49-F238E27FC236}">
-              <a16:creationId xmlns:a16="http://schemas.microsoft.com/office/drawing/2014/main" id="{BEE36AFA-E265-E57A-BB7F-7411D766B0D9}"/>
-            </a:ext>
-          </a:extLst>
-        </p:cNvPr>
-        <p:cNvGrpSpPr/>
-        <p:nvPr/>
-      </p:nvGrpSpPr>
-      <p:grpSpPr>
-        <a:xfrm>
-          <a:off x="0" y="0"/>
-          <a:ext cx="0" cy="0"/>
-          <a:chOff x="0" y="0"/>
-          <a:chExt cx="0" cy="0"/>
-        </a:xfrm>
-      </p:grpSpPr>
-      <p:sp>
-        <p:nvSpPr>
-          <p:cNvPr id="2" name="Slide Image Placeholder 1">
-            <a:extLst>
-              <a:ext uri="{FF2B5EF4-FFF2-40B4-BE49-F238E27FC236}">
-                <a16:creationId xmlns:a16="http://schemas.microsoft.com/office/drawing/2014/main" id="{178B546C-E89A-B92A-1F60-D01679B2AE79}"/>
-              </a:ext>
-            </a:extLst>
-          </p:cNvPr>
-          <p:cNvSpPr>
-            <a:spLocks noGrp="1" noRot="1" noChangeAspect="1"/>
-          </p:cNvSpPr>
-          <p:nvPr>
-            <p:ph type="sldImg"/>
-          </p:nvPr>
-        </p:nvSpPr>
-        <p:spPr/>
-      </p:sp>
-      <p:sp>
-        <p:nvSpPr>
-          <p:cNvPr id="3" name="Notes Placeholder 2">
-            <a:extLst>
-              <a:ext uri="{FF2B5EF4-FFF2-40B4-BE49-F238E27FC236}">
-                <a16:creationId xmlns:a16="http://schemas.microsoft.com/office/drawing/2014/main" id="{DEE7C7E5-0C40-36A2-52AC-A6BFEC02510F}"/>
-              </a:ext>
-            </a:extLst>
-          </p:cNvPr>
-          <p:cNvSpPr>
-            <a:spLocks noGrp="1"/>
-          </p:cNvSpPr>
-          <p:nvPr>
-            <p:ph type="body" idx="1"/>
-          </p:nvPr>
-        </p:nvSpPr>
-        <p:spPr/>
-        <p:txBody>
-          <a:bodyPr/>
-          <a:lstStyle/>
-          <a:p>
-            <a:endParaRPr lang="en-US" dirty="0"/>
-          </a:p>
-        </p:txBody>
-      </p:sp>
-      <p:sp>
-        <p:nvSpPr>
-          <p:cNvPr id="4" name="Slide Number Placeholder 3">
-            <a:extLst>
-              <a:ext uri="{FF2B5EF4-FFF2-40B4-BE49-F238E27FC236}">
-                <a16:creationId xmlns:a16="http://schemas.microsoft.com/office/drawing/2014/main" id="{37C7E735-63C7-1A1F-85F8-052DAE0F1F4F}"/>
-              </a:ext>
-            </a:extLst>
-          </p:cNvPr>
-          <p:cNvSpPr>
-            <a:spLocks noGrp="1"/>
-          </p:cNvSpPr>
-          <p:nvPr>
-            <p:ph type="sldNum" sz="quarter" idx="5"/>
-          </p:nvPr>
-        </p:nvSpPr>
-        <p:spPr/>
-        <p:txBody>
-          <a:bodyPr/>
-          <a:lstStyle/>
-          <a:p>
-            <a:fld id="{B7B3E9D7-7C42-42C9-B073-01B263BBC5B6}" type="slidenum">
-              <a:rPr lang="en-US" smtClean="0"/>
-              <a:t>3</a:t>
-            </a:fld>
-            <a:endParaRPr lang="en-US"/>
-          </a:p>
-        </p:txBody>
-      </p:sp>
-    </p:spTree>
-    <p:extLst>
-      <p:ext uri="{BB962C8B-B14F-4D97-AF65-F5344CB8AC3E}">
-        <p14:creationId xmlns:p14="http://schemas.microsoft.com/office/powerpoint/2010/main" val="585274361"/>
-      </p:ext>
-    </p:extLst>
-  </p:cSld>
-  <p:clrMapOvr>
-    <a:masterClrMapping/>
-  </p:clrMapOvr>
-</p:notes>
-</file>
-
-<file path=ppt/notesSlides/notesSlide10.xml><?xml version="1.0" encoding="utf-8"?>
-<p:notes xmlns:a="http://schemas.openxmlformats.org/drawingml/2006/main" xmlns:r="http://schemas.openxmlformats.org/officeDocument/2006/relationships" xmlns:p="http://schemas.openxmlformats.org/presentationml/2006/main">
-  <p:cSld>
-    <p:spTree>
-      <p:nvGrpSpPr>
         <p:cNvPr id="1" name=""/>
         <p:cNvGrpSpPr/>
         <p:nvPr/>
@@ -3695,7 +3589,24 @@
           <a:bodyPr/>
           <a:lstStyle/>
           <a:p>
-            <a:endParaRPr lang="en-US" dirty="0"/>
+            <a:pPr marL="171450" indent="-171450">
+              <a:buFont typeface="Arial" panose="020B0604020202020204" pitchFamily="34" charset="0"/>
+              <a:buChar char="•"/>
+            </a:pPr>
+            <a:r>
+              <a:rPr lang="en-US" dirty="0"/>
+              <a:t>While RStudio is harder to set up initially (with GitHub), it’s better for transforming data and documenting a replicable process.</a:t>
+            </a:r>
+          </a:p>
+          <a:p>
+            <a:pPr marL="171450" indent="-171450">
+              <a:buFont typeface="Arial" panose="020B0604020202020204" pitchFamily="34" charset="0"/>
+              <a:buChar char="•"/>
+            </a:pPr>
+            <a:r>
+              <a:rPr lang="en-US" dirty="0"/>
+              <a:t>Excel is better for seeing the raw data (while Power BI is better at transforming it) and easier to manipulate the data viz options but is limited in statistical analyses.</a:t>
+            </a:r>
           </a:p>
         </p:txBody>
       </p:sp>
@@ -3716,7 +3627,7 @@
           <a:p>
             <a:fld id="{B7B3E9D7-7C42-42C9-B073-01B263BBC5B6}" type="slidenum">
               <a:rPr lang="en-US" smtClean="0"/>
-              <a:t>13</a:t>
+              <a:t>2</a:t>
             </a:fld>
             <a:endParaRPr lang="en-US"/>
           </a:p>
@@ -3725,7 +3636,115 @@
     </p:spTree>
     <p:extLst>
       <p:ext uri="{BB962C8B-B14F-4D97-AF65-F5344CB8AC3E}">
-        <p14:creationId xmlns:p14="http://schemas.microsoft.com/office/powerpoint/2010/main" val="1378391484"/>
+        <p14:creationId xmlns:p14="http://schemas.microsoft.com/office/powerpoint/2010/main" val="2196381331"/>
+      </p:ext>
+    </p:extLst>
+  </p:cSld>
+  <p:clrMapOvr>
+    <a:masterClrMapping/>
+  </p:clrMapOvr>
+</p:notes>
+</file>
+
+<file path=ppt/notesSlides/notesSlide10.xml><?xml version="1.0" encoding="utf-8"?>
+<p:notes xmlns:a="http://schemas.openxmlformats.org/drawingml/2006/main" xmlns:r="http://schemas.openxmlformats.org/officeDocument/2006/relationships" xmlns:p="http://schemas.openxmlformats.org/presentationml/2006/main">
+  <p:cSld>
+    <p:spTree>
+      <p:nvGrpSpPr>
+        <p:cNvPr id="1" name="">
+          <a:extLst>
+            <a:ext uri="{FF2B5EF4-FFF2-40B4-BE49-F238E27FC236}">
+              <a16:creationId xmlns:a16="http://schemas.microsoft.com/office/drawing/2014/main" id="{189F7BE7-857D-81DE-8F1C-041C44DB27DC}"/>
+            </a:ext>
+          </a:extLst>
+        </p:cNvPr>
+        <p:cNvGrpSpPr/>
+        <p:nvPr/>
+      </p:nvGrpSpPr>
+      <p:grpSpPr>
+        <a:xfrm>
+          <a:off x="0" y="0"/>
+          <a:ext cx="0" cy="0"/>
+          <a:chOff x="0" y="0"/>
+          <a:chExt cx="0" cy="0"/>
+        </a:xfrm>
+      </p:grpSpPr>
+      <p:sp>
+        <p:nvSpPr>
+          <p:cNvPr id="2" name="Slide Image Placeholder 1">
+            <a:extLst>
+              <a:ext uri="{FF2B5EF4-FFF2-40B4-BE49-F238E27FC236}">
+                <a16:creationId xmlns:a16="http://schemas.microsoft.com/office/drawing/2014/main" id="{4B6E823C-7693-479F-BDF3-0130A4DB4FDB}"/>
+              </a:ext>
+            </a:extLst>
+          </p:cNvPr>
+          <p:cNvSpPr>
+            <a:spLocks noGrp="1" noRot="1" noChangeAspect="1"/>
+          </p:cNvSpPr>
+          <p:nvPr>
+            <p:ph type="sldImg"/>
+          </p:nvPr>
+        </p:nvSpPr>
+        <p:spPr/>
+      </p:sp>
+      <p:sp>
+        <p:nvSpPr>
+          <p:cNvPr id="3" name="Notes Placeholder 2">
+            <a:extLst>
+              <a:ext uri="{FF2B5EF4-FFF2-40B4-BE49-F238E27FC236}">
+                <a16:creationId xmlns:a16="http://schemas.microsoft.com/office/drawing/2014/main" id="{2EB54F32-1D24-C118-2E37-FD9B1BF92285}"/>
+              </a:ext>
+            </a:extLst>
+          </p:cNvPr>
+          <p:cNvSpPr>
+            <a:spLocks noGrp="1"/>
+          </p:cNvSpPr>
+          <p:nvPr>
+            <p:ph type="body" idx="1"/>
+          </p:nvPr>
+        </p:nvSpPr>
+        <p:spPr/>
+        <p:txBody>
+          <a:bodyPr/>
+          <a:lstStyle/>
+          <a:p>
+            <a:endParaRPr lang="en-US" dirty="0"/>
+          </a:p>
+        </p:txBody>
+      </p:sp>
+      <p:sp>
+        <p:nvSpPr>
+          <p:cNvPr id="4" name="Slide Number Placeholder 3">
+            <a:extLst>
+              <a:ext uri="{FF2B5EF4-FFF2-40B4-BE49-F238E27FC236}">
+                <a16:creationId xmlns:a16="http://schemas.microsoft.com/office/drawing/2014/main" id="{642301A1-EAE1-F696-FDCA-78DD789AEE89}"/>
+              </a:ext>
+            </a:extLst>
+          </p:cNvPr>
+          <p:cNvSpPr>
+            <a:spLocks noGrp="1"/>
+          </p:cNvSpPr>
+          <p:nvPr>
+            <p:ph type="sldNum" sz="quarter" idx="5"/>
+          </p:nvPr>
+        </p:nvSpPr>
+        <p:spPr/>
+        <p:txBody>
+          <a:bodyPr/>
+          <a:lstStyle/>
+          <a:p>
+            <a:fld id="{B7B3E9D7-7C42-42C9-B073-01B263BBC5B6}" type="slidenum">
+              <a:rPr lang="en-US" smtClean="0"/>
+              <a:t>13</a:t>
+            </a:fld>
+            <a:endParaRPr lang="en-US"/>
+          </a:p>
+        </p:txBody>
+      </p:sp>
+    </p:spTree>
+    <p:extLst>
+      <p:ext uri="{BB962C8B-B14F-4D97-AF65-F5344CB8AC3E}">
+        <p14:creationId xmlns:p14="http://schemas.microsoft.com/office/powerpoint/2010/main" val="2540584262"/>
       </p:ext>
     </p:extLst>
   </p:cSld>
@@ -3779,29 +3798,6 @@
           <a:bodyPr/>
           <a:lstStyle/>
           <a:p>
-            <a:pPr marL="171450" marR="0" lvl="0" indent="-171450" algn="l" defTabSz="914400" rtl="0" eaLnBrk="1" fontAlgn="auto" latinLnBrk="0" hangingPunct="1">
-              <a:lnSpc>
-                <a:spcPct val="100000"/>
-              </a:lnSpc>
-              <a:spcBef>
-                <a:spcPts val="0"/>
-              </a:spcBef>
-              <a:spcAft>
-                <a:spcPts val="0"/>
-              </a:spcAft>
-              <a:buClrTx/>
-              <a:buSzTx/>
-              <a:buFont typeface="Arial" panose="020B0604020202020204" pitchFamily="34" charset="0"/>
-              <a:buChar char="•"/>
-              <a:tabLst/>
-              <a:defRPr/>
-            </a:pPr>
-            <a:r>
-              <a:rPr lang="en-US" dirty="0"/>
-              <a:t>Import additional data sets, or “queries”.</a:t>
-            </a:r>
-          </a:p>
-          <a:p>
             <a:endParaRPr lang="en-US" dirty="0"/>
           </a:p>
         </p:txBody>
@@ -3832,7 +3828,7 @@
     </p:spTree>
     <p:extLst>
       <p:ext uri="{BB962C8B-B14F-4D97-AF65-F5344CB8AC3E}">
-        <p14:creationId xmlns:p14="http://schemas.microsoft.com/office/powerpoint/2010/main" val="2435355357"/>
+        <p14:creationId xmlns:p14="http://schemas.microsoft.com/office/powerpoint/2010/main" val="1378391484"/>
       </p:ext>
     </p:extLst>
   </p:cSld>
@@ -3886,6 +3882,29 @@
           <a:bodyPr/>
           <a:lstStyle/>
           <a:p>
+            <a:pPr marL="171450" marR="0" lvl="0" indent="-171450" algn="l" defTabSz="914400" rtl="0" eaLnBrk="1" fontAlgn="auto" latinLnBrk="0" hangingPunct="1">
+              <a:lnSpc>
+                <a:spcPct val="100000"/>
+              </a:lnSpc>
+              <a:spcBef>
+                <a:spcPts val="0"/>
+              </a:spcBef>
+              <a:spcAft>
+                <a:spcPts val="0"/>
+              </a:spcAft>
+              <a:buClrTx/>
+              <a:buSzTx/>
+              <a:buFont typeface="Arial" panose="020B0604020202020204" pitchFamily="34" charset="0"/>
+              <a:buChar char="•"/>
+              <a:tabLst/>
+              <a:defRPr/>
+            </a:pPr>
+            <a:r>
+              <a:rPr lang="en-US" dirty="0"/>
+              <a:t>Import additional data sets, or “queries”.</a:t>
+            </a:r>
+          </a:p>
+          <a:p>
             <a:endParaRPr lang="en-US" dirty="0"/>
           </a:p>
         </p:txBody>
@@ -3916,7 +3935,7 @@
     </p:spTree>
     <p:extLst>
       <p:ext uri="{BB962C8B-B14F-4D97-AF65-F5344CB8AC3E}">
-        <p14:creationId xmlns:p14="http://schemas.microsoft.com/office/powerpoint/2010/main" val="2181038550"/>
+        <p14:creationId xmlns:p14="http://schemas.microsoft.com/office/powerpoint/2010/main" val="2435355357"/>
       </p:ext>
     </p:extLst>
   </p:cSld>
@@ -3970,30 +3989,7 @@
           <a:bodyPr/>
           <a:lstStyle/>
           <a:p>
-            <a:pPr marL="171450" indent="-171450">
-              <a:buFont typeface="Arial" panose="020B0604020202020204" pitchFamily="34" charset="0"/>
-              <a:buChar char="•"/>
-            </a:pPr>
-            <a:r>
-              <a:rPr lang="en-US" dirty="0"/>
-              <a:t>View column profile to reveal that this dummy variable, </a:t>
-            </a:r>
-            <a:r>
-              <a:rPr lang="en-US" dirty="0" err="1"/>
-              <a:t>increased_contribution</a:t>
-            </a:r>
-            <a:r>
-              <a:rPr lang="en-US" dirty="0"/>
-              <a:t>, actually has </a:t>
-            </a:r>
-            <a:r>
-              <a:rPr lang="en-US" dirty="0" err="1"/>
-              <a:t>catetgorical</a:t>
-            </a:r>
-            <a:r>
-              <a:rPr lang="en-US" dirty="0"/>
-              <a:t> (text) values, which is why “closed” were errors in a numeric data type.</a:t>
-            </a:r>
+            <a:endParaRPr lang="en-US" dirty="0"/>
           </a:p>
         </p:txBody>
       </p:sp>
@@ -4014,7 +4010,7 @@
           <a:p>
             <a:fld id="{B7B3E9D7-7C42-42C9-B073-01B263BBC5B6}" type="slidenum">
               <a:rPr lang="en-US" smtClean="0"/>
-              <a:t>17</a:t>
+              <a:t>16</a:t>
             </a:fld>
             <a:endParaRPr lang="en-US"/>
           </a:p>
@@ -4023,7 +4019,7 @@
     </p:spTree>
     <p:extLst>
       <p:ext uri="{BB962C8B-B14F-4D97-AF65-F5344CB8AC3E}">
-        <p14:creationId xmlns:p14="http://schemas.microsoft.com/office/powerpoint/2010/main" val="385699118"/>
+        <p14:creationId xmlns:p14="http://schemas.microsoft.com/office/powerpoint/2010/main" val="2181038550"/>
       </p:ext>
     </p:extLst>
   </p:cSld>
@@ -4077,7 +4073,30 @@
           <a:bodyPr/>
           <a:lstStyle/>
           <a:p>
-            <a:endParaRPr lang="en-US" dirty="0"/>
+            <a:pPr marL="171450" indent="-171450">
+              <a:buFont typeface="Arial" panose="020B0604020202020204" pitchFamily="34" charset="0"/>
+              <a:buChar char="•"/>
+            </a:pPr>
+            <a:r>
+              <a:rPr lang="en-US" dirty="0"/>
+              <a:t>View column profile to reveal that this dummy variable, </a:t>
+            </a:r>
+            <a:r>
+              <a:rPr lang="en-US" dirty="0" err="1"/>
+              <a:t>increased_contribution</a:t>
+            </a:r>
+            <a:r>
+              <a:rPr lang="en-US" dirty="0"/>
+              <a:t>, actually has </a:t>
+            </a:r>
+            <a:r>
+              <a:rPr lang="en-US" dirty="0" err="1"/>
+              <a:t>catetgorical</a:t>
+            </a:r>
+            <a:r>
+              <a:rPr lang="en-US" dirty="0"/>
+              <a:t> (text) values, which is why “closed” were errors in a numeric data type.</a:t>
+            </a:r>
           </a:p>
         </p:txBody>
       </p:sp>
@@ -4107,7 +4126,7 @@
     </p:spTree>
     <p:extLst>
       <p:ext uri="{BB962C8B-B14F-4D97-AF65-F5344CB8AC3E}">
-        <p14:creationId xmlns:p14="http://schemas.microsoft.com/office/powerpoint/2010/main" val="3874809514"/>
+        <p14:creationId xmlns:p14="http://schemas.microsoft.com/office/powerpoint/2010/main" val="385699118"/>
       </p:ext>
     </p:extLst>
   </p:cSld>
@@ -4161,6 +4180,90 @@
           <a:bodyPr/>
           <a:lstStyle/>
           <a:p>
+            <a:endParaRPr lang="en-US" dirty="0"/>
+          </a:p>
+        </p:txBody>
+      </p:sp>
+      <p:sp>
+        <p:nvSpPr>
+          <p:cNvPr id="4" name="Slide Number Placeholder 3"/>
+          <p:cNvSpPr>
+            <a:spLocks noGrp="1"/>
+          </p:cNvSpPr>
+          <p:nvPr>
+            <p:ph type="sldNum" sz="quarter" idx="5"/>
+          </p:nvPr>
+        </p:nvSpPr>
+        <p:spPr/>
+        <p:txBody>
+          <a:bodyPr/>
+          <a:lstStyle/>
+          <a:p>
+            <a:fld id="{B7B3E9D7-7C42-42C9-B073-01B263BBC5B6}" type="slidenum">
+              <a:rPr lang="en-US" smtClean="0"/>
+              <a:t>19</a:t>
+            </a:fld>
+            <a:endParaRPr lang="en-US"/>
+          </a:p>
+        </p:txBody>
+      </p:sp>
+    </p:spTree>
+    <p:extLst>
+      <p:ext uri="{BB962C8B-B14F-4D97-AF65-F5344CB8AC3E}">
+        <p14:creationId xmlns:p14="http://schemas.microsoft.com/office/powerpoint/2010/main" val="3874809514"/>
+      </p:ext>
+    </p:extLst>
+  </p:cSld>
+  <p:clrMapOvr>
+    <a:masterClrMapping/>
+  </p:clrMapOvr>
+</p:notes>
+</file>
+
+<file path=ppt/notesSlides/notesSlide16.xml><?xml version="1.0" encoding="utf-8"?>
+<p:notes xmlns:a="http://schemas.openxmlformats.org/drawingml/2006/main" xmlns:r="http://schemas.openxmlformats.org/officeDocument/2006/relationships" xmlns:p="http://schemas.openxmlformats.org/presentationml/2006/main">
+  <p:cSld>
+    <p:spTree>
+      <p:nvGrpSpPr>
+        <p:cNvPr id="1" name=""/>
+        <p:cNvGrpSpPr/>
+        <p:nvPr/>
+      </p:nvGrpSpPr>
+      <p:grpSpPr>
+        <a:xfrm>
+          <a:off x="0" y="0"/>
+          <a:ext cx="0" cy="0"/>
+          <a:chOff x="0" y="0"/>
+          <a:chExt cx="0" cy="0"/>
+        </a:xfrm>
+      </p:grpSpPr>
+      <p:sp>
+        <p:nvSpPr>
+          <p:cNvPr id="2" name="Slide Image Placeholder 1"/>
+          <p:cNvSpPr>
+            <a:spLocks noGrp="1" noRot="1" noChangeAspect="1"/>
+          </p:cNvSpPr>
+          <p:nvPr>
+            <p:ph type="sldImg"/>
+          </p:nvPr>
+        </p:nvSpPr>
+        <p:spPr/>
+      </p:sp>
+      <p:sp>
+        <p:nvSpPr>
+          <p:cNvPr id="3" name="Notes Placeholder 2"/>
+          <p:cNvSpPr>
+            <a:spLocks noGrp="1"/>
+          </p:cNvSpPr>
+          <p:nvPr>
+            <p:ph type="body" idx="1"/>
+          </p:nvPr>
+        </p:nvSpPr>
+        <p:spPr/>
+        <p:txBody>
+          <a:bodyPr/>
+          <a:lstStyle/>
+          <a:p>
             <a:pPr marL="171450" indent="-171450">
               <a:buFont typeface="Arial" panose="020B0604020202020204" pitchFamily="34" charset="0"/>
               <a:buChar char="•"/>
@@ -4270,7 +4373,7 @@
           <a:p>
             <a:fld id="{B7B3E9D7-7C42-42C9-B073-01B263BBC5B6}" type="slidenum">
               <a:rPr lang="en-US" smtClean="0"/>
-              <a:t>19</a:t>
+              <a:t>20</a:t>
             </a:fld>
             <a:endParaRPr lang="en-US"/>
           </a:p>
@@ -4289,7 +4392,7 @@
 </p:notes>
 </file>
 
-<file path=ppt/notesSlides/notesSlide16.xml><?xml version="1.0" encoding="utf-8"?>
+<file path=ppt/notesSlides/notesSlide17.xml><?xml version="1.0" encoding="utf-8"?>
 <p:notes xmlns:a="http://schemas.openxmlformats.org/drawingml/2006/main" xmlns:r="http://schemas.openxmlformats.org/officeDocument/2006/relationships" xmlns:p="http://schemas.openxmlformats.org/presentationml/2006/main">
   <p:cSld>
     <p:spTree>
@@ -4613,7 +4716,7 @@
           <a:p>
             <a:fld id="{B7B3E9D7-7C42-42C9-B073-01B263BBC5B6}" type="slidenum">
               <a:rPr lang="en-US" smtClean="0"/>
-              <a:t>20</a:t>
+              <a:t>21</a:t>
             </a:fld>
             <a:endParaRPr lang="en-US"/>
           </a:p>
@@ -4623,97 +4726,6 @@
     <p:extLst>
       <p:ext uri="{BB962C8B-B14F-4D97-AF65-F5344CB8AC3E}">
         <p14:creationId xmlns:p14="http://schemas.microsoft.com/office/powerpoint/2010/main" val="93049090"/>
-      </p:ext>
-    </p:extLst>
-  </p:cSld>
-  <p:clrMapOvr>
-    <a:masterClrMapping/>
-  </p:clrMapOvr>
-</p:notes>
-</file>
-
-<file path=ppt/notesSlides/notesSlide17.xml><?xml version="1.0" encoding="utf-8"?>
-<p:notes xmlns:a="http://schemas.openxmlformats.org/drawingml/2006/main" xmlns:r="http://schemas.openxmlformats.org/officeDocument/2006/relationships" xmlns:p="http://schemas.openxmlformats.org/presentationml/2006/main">
-  <p:cSld>
-    <p:spTree>
-      <p:nvGrpSpPr>
-        <p:cNvPr id="1" name=""/>
-        <p:cNvGrpSpPr/>
-        <p:nvPr/>
-      </p:nvGrpSpPr>
-      <p:grpSpPr>
-        <a:xfrm>
-          <a:off x="0" y="0"/>
-          <a:ext cx="0" cy="0"/>
-          <a:chOff x="0" y="0"/>
-          <a:chExt cx="0" cy="0"/>
-        </a:xfrm>
-      </p:grpSpPr>
-      <p:sp>
-        <p:nvSpPr>
-          <p:cNvPr id="2" name="Slide Image Placeholder 1"/>
-          <p:cNvSpPr>
-            <a:spLocks noGrp="1" noRot="1" noChangeAspect="1"/>
-          </p:cNvSpPr>
-          <p:nvPr>
-            <p:ph type="sldImg"/>
-          </p:nvPr>
-        </p:nvSpPr>
-        <p:spPr/>
-      </p:sp>
-      <p:sp>
-        <p:nvSpPr>
-          <p:cNvPr id="3" name="Notes Placeholder 2"/>
-          <p:cNvSpPr>
-            <a:spLocks noGrp="1"/>
-          </p:cNvSpPr>
-          <p:nvPr>
-            <p:ph type="body" idx="1"/>
-          </p:nvPr>
-        </p:nvSpPr>
-        <p:spPr/>
-        <p:txBody>
-          <a:bodyPr/>
-          <a:lstStyle/>
-          <a:p>
-            <a:pPr marL="171450" indent="-171450">
-              <a:buFont typeface="Arial" panose="020B0604020202020204" pitchFamily="34" charset="0"/>
-              <a:buChar char="•"/>
-            </a:pPr>
-            <a:r>
-              <a:rPr lang="en-US" dirty="0"/>
-              <a:t>Expand just the new columns added.</a:t>
-            </a:r>
-          </a:p>
-        </p:txBody>
-      </p:sp>
-      <p:sp>
-        <p:nvSpPr>
-          <p:cNvPr id="4" name="Slide Number Placeholder 3"/>
-          <p:cNvSpPr>
-            <a:spLocks noGrp="1"/>
-          </p:cNvSpPr>
-          <p:nvPr>
-            <p:ph type="sldNum" sz="quarter" idx="5"/>
-          </p:nvPr>
-        </p:nvSpPr>
-        <p:spPr/>
-        <p:txBody>
-          <a:bodyPr/>
-          <a:lstStyle/>
-          <a:p>
-            <a:fld id="{B7B3E9D7-7C42-42C9-B073-01B263BBC5B6}" type="slidenum">
-              <a:rPr lang="en-US" smtClean="0"/>
-              <a:t>21</a:t>
-            </a:fld>
-            <a:endParaRPr lang="en-US"/>
-          </a:p>
-        </p:txBody>
-      </p:sp>
-    </p:spTree>
-    <p:extLst>
-      <p:ext uri="{BB962C8B-B14F-4D97-AF65-F5344CB8AC3E}">
-        <p14:creationId xmlns:p14="http://schemas.microsoft.com/office/powerpoint/2010/main" val="1683546214"/>
       </p:ext>
     </p:extLst>
   </p:cSld>
@@ -4773,7 +4785,7 @@
             </a:pPr>
             <a:r>
               <a:rPr lang="en-US" dirty="0"/>
-              <a:t>Remove duplicate identifiers.</a:t>
+              <a:t>Expand just the new columns added.</a:t>
             </a:r>
           </a:p>
         </p:txBody>
@@ -4804,7 +4816,7 @@
     </p:spTree>
     <p:extLst>
       <p:ext uri="{BB962C8B-B14F-4D97-AF65-F5344CB8AC3E}">
-        <p14:creationId xmlns:p14="http://schemas.microsoft.com/office/powerpoint/2010/main" val="188788455"/>
+        <p14:creationId xmlns:p14="http://schemas.microsoft.com/office/powerpoint/2010/main" val="1683546214"/>
       </p:ext>
     </p:extLst>
   </p:cSld>
@@ -4864,7 +4876,7 @@
             </a:pPr>
             <a:r>
               <a:rPr lang="en-US" dirty="0"/>
-              <a:t>Only include cases with an experimental condition.</a:t>
+              <a:t>Remove duplicate identifiers.</a:t>
             </a:r>
           </a:p>
         </p:txBody>
@@ -4895,7 +4907,7 @@
     </p:spTree>
     <p:extLst>
       <p:ext uri="{BB962C8B-B14F-4D97-AF65-F5344CB8AC3E}">
-        <p14:creationId xmlns:p14="http://schemas.microsoft.com/office/powerpoint/2010/main" val="871266187"/>
+        <p14:creationId xmlns:p14="http://schemas.microsoft.com/office/powerpoint/2010/main" val="188788455"/>
       </p:ext>
     </p:extLst>
   </p:cSld>
@@ -4906,6 +4918,114 @@
 </file>
 
 <file path=ppt/notesSlides/notesSlide2.xml><?xml version="1.0" encoding="utf-8"?>
+<p:notes xmlns:a="http://schemas.openxmlformats.org/drawingml/2006/main" xmlns:r="http://schemas.openxmlformats.org/officeDocument/2006/relationships" xmlns:p="http://schemas.openxmlformats.org/presentationml/2006/main">
+  <p:cSld>
+    <p:spTree>
+      <p:nvGrpSpPr>
+        <p:cNvPr id="1" name="">
+          <a:extLst>
+            <a:ext uri="{FF2B5EF4-FFF2-40B4-BE49-F238E27FC236}">
+              <a16:creationId xmlns:a16="http://schemas.microsoft.com/office/drawing/2014/main" id="{BEE36AFA-E265-E57A-BB7F-7411D766B0D9}"/>
+            </a:ext>
+          </a:extLst>
+        </p:cNvPr>
+        <p:cNvGrpSpPr/>
+        <p:nvPr/>
+      </p:nvGrpSpPr>
+      <p:grpSpPr>
+        <a:xfrm>
+          <a:off x="0" y="0"/>
+          <a:ext cx="0" cy="0"/>
+          <a:chOff x="0" y="0"/>
+          <a:chExt cx="0" cy="0"/>
+        </a:xfrm>
+      </p:grpSpPr>
+      <p:sp>
+        <p:nvSpPr>
+          <p:cNvPr id="2" name="Slide Image Placeholder 1">
+            <a:extLst>
+              <a:ext uri="{FF2B5EF4-FFF2-40B4-BE49-F238E27FC236}">
+                <a16:creationId xmlns:a16="http://schemas.microsoft.com/office/drawing/2014/main" id="{178B546C-E89A-B92A-1F60-D01679B2AE79}"/>
+              </a:ext>
+            </a:extLst>
+          </p:cNvPr>
+          <p:cNvSpPr>
+            <a:spLocks noGrp="1" noRot="1" noChangeAspect="1"/>
+          </p:cNvSpPr>
+          <p:nvPr>
+            <p:ph type="sldImg"/>
+          </p:nvPr>
+        </p:nvSpPr>
+        <p:spPr/>
+      </p:sp>
+      <p:sp>
+        <p:nvSpPr>
+          <p:cNvPr id="3" name="Notes Placeholder 2">
+            <a:extLst>
+              <a:ext uri="{FF2B5EF4-FFF2-40B4-BE49-F238E27FC236}">
+                <a16:creationId xmlns:a16="http://schemas.microsoft.com/office/drawing/2014/main" id="{DEE7C7E5-0C40-36A2-52AC-A6BFEC02510F}"/>
+              </a:ext>
+            </a:extLst>
+          </p:cNvPr>
+          <p:cNvSpPr>
+            <a:spLocks noGrp="1"/>
+          </p:cNvSpPr>
+          <p:nvPr>
+            <p:ph type="body" idx="1"/>
+          </p:nvPr>
+        </p:nvSpPr>
+        <p:spPr/>
+        <p:txBody>
+          <a:bodyPr/>
+          <a:lstStyle/>
+          <a:p>
+            <a:endParaRPr lang="en-US" dirty="0"/>
+          </a:p>
+        </p:txBody>
+      </p:sp>
+      <p:sp>
+        <p:nvSpPr>
+          <p:cNvPr id="4" name="Slide Number Placeholder 3">
+            <a:extLst>
+              <a:ext uri="{FF2B5EF4-FFF2-40B4-BE49-F238E27FC236}">
+                <a16:creationId xmlns:a16="http://schemas.microsoft.com/office/drawing/2014/main" id="{37C7E735-63C7-1A1F-85F8-052DAE0F1F4F}"/>
+              </a:ext>
+            </a:extLst>
+          </p:cNvPr>
+          <p:cNvSpPr>
+            <a:spLocks noGrp="1"/>
+          </p:cNvSpPr>
+          <p:nvPr>
+            <p:ph type="sldNum" sz="quarter" idx="5"/>
+          </p:nvPr>
+        </p:nvSpPr>
+        <p:spPr/>
+        <p:txBody>
+          <a:bodyPr/>
+          <a:lstStyle/>
+          <a:p>
+            <a:fld id="{B7B3E9D7-7C42-42C9-B073-01B263BBC5B6}" type="slidenum">
+              <a:rPr lang="en-US" smtClean="0"/>
+              <a:t>4</a:t>
+            </a:fld>
+            <a:endParaRPr lang="en-US"/>
+          </a:p>
+        </p:txBody>
+      </p:sp>
+    </p:spTree>
+    <p:extLst>
+      <p:ext uri="{BB962C8B-B14F-4D97-AF65-F5344CB8AC3E}">
+        <p14:creationId xmlns:p14="http://schemas.microsoft.com/office/powerpoint/2010/main" val="585274361"/>
+      </p:ext>
+    </p:extLst>
+  </p:cSld>
+  <p:clrMapOvr>
+    <a:masterClrMapping/>
+  </p:clrMapOvr>
+</p:notes>
+</file>
+
+<file path=ppt/notesSlides/notesSlide20.xml><?xml version="1.0" encoding="utf-8"?>
 <p:notes xmlns:a="http://schemas.openxmlformats.org/drawingml/2006/main" xmlns:r="http://schemas.openxmlformats.org/officeDocument/2006/relationships" xmlns:p="http://schemas.openxmlformats.org/presentationml/2006/main">
   <p:cSld>
     <p:spTree>
@@ -4955,25 +5075,8 @@
             </a:pPr>
             <a:r>
               <a:rPr lang="en-US" dirty="0"/>
-              <a:t>Sign in to GitHub.</a:t>
+              <a:t>Only include cases with an experimental condition.</a:t>
             </a:r>
-          </a:p>
-          <a:p>
-            <a:pPr marL="171450" indent="-171450">
-              <a:buFont typeface="Arial" panose="020B0604020202020204" pitchFamily="34" charset="0"/>
-              <a:buChar char="•"/>
-            </a:pPr>
-            <a:r>
-              <a:rPr lang="en-US" dirty="0"/>
-              <a:t>Create a new repository.</a:t>
-            </a:r>
-          </a:p>
-          <a:p>
-            <a:pPr marL="171450" indent="-171450">
-              <a:buFont typeface="Arial" panose="020B0604020202020204" pitchFamily="34" charset="0"/>
-              <a:buChar char="•"/>
-            </a:pPr>
-            <a:endParaRPr lang="en-US" dirty="0"/>
           </a:p>
         </p:txBody>
       </p:sp>
@@ -4994,7 +5097,7 @@
           <a:p>
             <a:fld id="{B7B3E9D7-7C42-42C9-B073-01B263BBC5B6}" type="slidenum">
               <a:rPr lang="en-US" smtClean="0"/>
-              <a:t>4</a:t>
+              <a:t>24</a:t>
             </a:fld>
             <a:endParaRPr lang="en-US"/>
           </a:p>
@@ -5003,7 +5106,7 @@
     </p:spTree>
     <p:extLst>
       <p:ext uri="{BB962C8B-B14F-4D97-AF65-F5344CB8AC3E}">
-        <p14:creationId xmlns:p14="http://schemas.microsoft.com/office/powerpoint/2010/main" val="977678013"/>
+        <p14:creationId xmlns:p14="http://schemas.microsoft.com/office/powerpoint/2010/main" val="871266187"/>
       </p:ext>
     </p:extLst>
   </p:cSld>
@@ -5013,7 +5116,7 @@
 </p:notes>
 </file>
 
-<file path=ppt/notesSlides/notesSlide20.xml><?xml version="1.0" encoding="utf-8"?>
+<file path=ppt/notesSlides/notesSlide21.xml><?xml version="1.0" encoding="utf-8"?>
 <p:notes xmlns:a="http://schemas.openxmlformats.org/drawingml/2006/main" xmlns:r="http://schemas.openxmlformats.org/officeDocument/2006/relationships" xmlns:p="http://schemas.openxmlformats.org/presentationml/2006/main">
   <p:cSld>
     <p:spTree>
@@ -5102,7 +5205,7 @@
           <a:p>
             <a:fld id="{B7B3E9D7-7C42-42C9-B073-01B263BBC5B6}" type="slidenum">
               <a:rPr lang="en-US" smtClean="0"/>
-              <a:t>24</a:t>
+              <a:t>25</a:t>
             </a:fld>
             <a:endParaRPr lang="en-US"/>
           </a:p>
@@ -5171,7 +5274,7 @@
             </a:pPr>
             <a:r>
               <a:rPr lang="en-US" dirty="0"/>
-              <a:t>Name the repository.</a:t>
+              <a:t>Sign in to GitHub.</a:t>
             </a:r>
           </a:p>
           <a:p>
@@ -5181,7 +5284,7 @@
             </a:pPr>
             <a:r>
               <a:rPr lang="en-US" dirty="0"/>
-              <a:t>Add a README file.</a:t>
+              <a:t>Create a new repository.</a:t>
             </a:r>
           </a:p>
           <a:p>
@@ -5189,10 +5292,7 @@
               <a:buFont typeface="Arial" panose="020B0604020202020204" pitchFamily="34" charset="0"/>
               <a:buChar char="•"/>
             </a:pPr>
-            <a:r>
-              <a:rPr lang="en-US" dirty="0"/>
-              <a:t>Choose a license.</a:t>
-            </a:r>
+            <a:endParaRPr lang="en-US" dirty="0"/>
           </a:p>
         </p:txBody>
       </p:sp>
@@ -5222,6 +5322,117 @@
     </p:spTree>
     <p:extLst>
       <p:ext uri="{BB962C8B-B14F-4D97-AF65-F5344CB8AC3E}">
+        <p14:creationId xmlns:p14="http://schemas.microsoft.com/office/powerpoint/2010/main" val="977678013"/>
+      </p:ext>
+    </p:extLst>
+  </p:cSld>
+  <p:clrMapOvr>
+    <a:masterClrMapping/>
+  </p:clrMapOvr>
+</p:notes>
+</file>
+
+<file path=ppt/notesSlides/notesSlide4.xml><?xml version="1.0" encoding="utf-8"?>
+<p:notes xmlns:a="http://schemas.openxmlformats.org/drawingml/2006/main" xmlns:r="http://schemas.openxmlformats.org/officeDocument/2006/relationships" xmlns:p="http://schemas.openxmlformats.org/presentationml/2006/main">
+  <p:cSld>
+    <p:spTree>
+      <p:nvGrpSpPr>
+        <p:cNvPr id="1" name=""/>
+        <p:cNvGrpSpPr/>
+        <p:nvPr/>
+      </p:nvGrpSpPr>
+      <p:grpSpPr>
+        <a:xfrm>
+          <a:off x="0" y="0"/>
+          <a:ext cx="0" cy="0"/>
+          <a:chOff x="0" y="0"/>
+          <a:chExt cx="0" cy="0"/>
+        </a:xfrm>
+      </p:grpSpPr>
+      <p:sp>
+        <p:nvSpPr>
+          <p:cNvPr id="2" name="Slide Image Placeholder 1"/>
+          <p:cNvSpPr>
+            <a:spLocks noGrp="1" noRot="1" noChangeAspect="1"/>
+          </p:cNvSpPr>
+          <p:nvPr>
+            <p:ph type="sldImg"/>
+          </p:nvPr>
+        </p:nvSpPr>
+        <p:spPr/>
+      </p:sp>
+      <p:sp>
+        <p:nvSpPr>
+          <p:cNvPr id="3" name="Notes Placeholder 2"/>
+          <p:cNvSpPr>
+            <a:spLocks noGrp="1"/>
+          </p:cNvSpPr>
+          <p:nvPr>
+            <p:ph type="body" idx="1"/>
+          </p:nvPr>
+        </p:nvSpPr>
+        <p:spPr/>
+        <p:txBody>
+          <a:bodyPr/>
+          <a:lstStyle/>
+          <a:p>
+            <a:pPr marL="171450" indent="-171450">
+              <a:buFont typeface="Arial" panose="020B0604020202020204" pitchFamily="34" charset="0"/>
+              <a:buChar char="•"/>
+            </a:pPr>
+            <a:r>
+              <a:rPr lang="en-US" dirty="0"/>
+              <a:t>Name the repository.</a:t>
+            </a:r>
+          </a:p>
+          <a:p>
+            <a:pPr marL="171450" indent="-171450">
+              <a:buFont typeface="Arial" panose="020B0604020202020204" pitchFamily="34" charset="0"/>
+              <a:buChar char="•"/>
+            </a:pPr>
+            <a:r>
+              <a:rPr lang="en-US" dirty="0"/>
+              <a:t>Add a README file.</a:t>
+            </a:r>
+          </a:p>
+          <a:p>
+            <a:pPr marL="171450" indent="-171450">
+              <a:buFont typeface="Arial" panose="020B0604020202020204" pitchFamily="34" charset="0"/>
+              <a:buChar char="•"/>
+            </a:pPr>
+            <a:r>
+              <a:rPr lang="en-US" dirty="0"/>
+              <a:t>Choose a license.</a:t>
+            </a:r>
+          </a:p>
+        </p:txBody>
+      </p:sp>
+      <p:sp>
+        <p:nvSpPr>
+          <p:cNvPr id="4" name="Slide Number Placeholder 3"/>
+          <p:cNvSpPr>
+            <a:spLocks noGrp="1"/>
+          </p:cNvSpPr>
+          <p:nvPr>
+            <p:ph type="sldNum" sz="quarter" idx="5"/>
+          </p:nvPr>
+        </p:nvSpPr>
+        <p:spPr/>
+        <p:txBody>
+          <a:bodyPr/>
+          <a:lstStyle/>
+          <a:p>
+            <a:fld id="{B7B3E9D7-7C42-42C9-B073-01B263BBC5B6}" type="slidenum">
+              <a:rPr lang="en-US" smtClean="0"/>
+              <a:t>6</a:t>
+            </a:fld>
+            <a:endParaRPr lang="en-US"/>
+          </a:p>
+        </p:txBody>
+      </p:sp>
+    </p:spTree>
+    <p:extLst>
+      <p:ext uri="{BB962C8B-B14F-4D97-AF65-F5344CB8AC3E}">
         <p14:creationId xmlns:p14="http://schemas.microsoft.com/office/powerpoint/2010/main" val="1627808153"/>
       </p:ext>
     </p:extLst>
@@ -5232,7 +5443,7 @@
 </p:notes>
 </file>
 
-<file path=ppt/notesSlides/notesSlide4.xml><?xml version="1.0" encoding="utf-8"?>
+<file path=ppt/notesSlides/notesSlide5.xml><?xml version="1.0" encoding="utf-8"?>
 <p:notes xmlns:a="http://schemas.openxmlformats.org/drawingml/2006/main" xmlns:r="http://schemas.openxmlformats.org/officeDocument/2006/relationships" xmlns:p="http://schemas.openxmlformats.org/presentationml/2006/main">
   <p:cSld>
     <p:spTree>
@@ -5321,7 +5532,7 @@
           <a:p>
             <a:fld id="{B7B3E9D7-7C42-42C9-B073-01B263BBC5B6}" type="slidenum">
               <a:rPr lang="en-US" smtClean="0"/>
-              <a:t>6</a:t>
+              <a:t>7</a:t>
             </a:fld>
             <a:endParaRPr lang="en-US"/>
           </a:p>
@@ -5331,134 +5542,6 @@
     <p:extLst>
       <p:ext uri="{BB962C8B-B14F-4D97-AF65-F5344CB8AC3E}">
         <p14:creationId xmlns:p14="http://schemas.microsoft.com/office/powerpoint/2010/main" val="3104298284"/>
-      </p:ext>
-    </p:extLst>
-  </p:cSld>
-  <p:clrMapOvr>
-    <a:masterClrMapping/>
-  </p:clrMapOvr>
-</p:notes>
-</file>
-
-<file path=ppt/notesSlides/notesSlide5.xml><?xml version="1.0" encoding="utf-8"?>
-<p:notes xmlns:a="http://schemas.openxmlformats.org/drawingml/2006/main" xmlns:r="http://schemas.openxmlformats.org/officeDocument/2006/relationships" xmlns:p="http://schemas.openxmlformats.org/presentationml/2006/main">
-  <p:cSld>
-    <p:spTree>
-      <p:nvGrpSpPr>
-        <p:cNvPr id="1" name=""/>
-        <p:cNvGrpSpPr/>
-        <p:nvPr/>
-      </p:nvGrpSpPr>
-      <p:grpSpPr>
-        <a:xfrm>
-          <a:off x="0" y="0"/>
-          <a:ext cx="0" cy="0"/>
-          <a:chOff x="0" y="0"/>
-          <a:chExt cx="0" cy="0"/>
-        </a:xfrm>
-      </p:grpSpPr>
-      <p:sp>
-        <p:nvSpPr>
-          <p:cNvPr id="2" name="Slide Image Placeholder 1"/>
-          <p:cNvSpPr>
-            <a:spLocks noGrp="1" noRot="1" noChangeAspect="1"/>
-          </p:cNvSpPr>
-          <p:nvPr>
-            <p:ph type="sldImg"/>
-          </p:nvPr>
-        </p:nvSpPr>
-        <p:spPr/>
-      </p:sp>
-      <p:sp>
-        <p:nvSpPr>
-          <p:cNvPr id="3" name="Notes Placeholder 2"/>
-          <p:cNvSpPr>
-            <a:spLocks noGrp="1"/>
-          </p:cNvSpPr>
-          <p:nvPr>
-            <p:ph type="body" idx="1"/>
-          </p:nvPr>
-        </p:nvSpPr>
-        <p:spPr/>
-        <p:txBody>
-          <a:bodyPr/>
-          <a:lstStyle/>
-          <a:p>
-            <a:pPr marL="171450" indent="-171450">
-              <a:buFont typeface="Arial" panose="020B0604020202020204" pitchFamily="34" charset="0"/>
-              <a:buChar char="•"/>
-            </a:pPr>
-            <a:r>
-              <a:rPr lang="en-US" dirty="0"/>
-              <a:t>Create a New Project.</a:t>
-            </a:r>
-          </a:p>
-          <a:p>
-            <a:pPr marL="628650" lvl="1" indent="-171450">
-              <a:buFont typeface="Arial" panose="020B0604020202020204" pitchFamily="34" charset="0"/>
-              <a:buChar char="•"/>
-            </a:pPr>
-            <a:r>
-              <a:rPr lang="en-US" dirty="0"/>
-              <a:t>Checkout a project from a Version Control repository.</a:t>
-            </a:r>
-          </a:p>
-          <a:p>
-            <a:pPr marL="628650" lvl="1" indent="-171450">
-              <a:buFont typeface="Arial" panose="020B0604020202020204" pitchFamily="34" charset="0"/>
-              <a:buChar char="•"/>
-            </a:pPr>
-            <a:r>
-              <a:rPr lang="en-US" dirty="0"/>
-              <a:t>Clone a project from a Git repository.</a:t>
-            </a:r>
-          </a:p>
-          <a:p>
-            <a:pPr marL="628650" lvl="1" indent="-171450">
-              <a:buFont typeface="Arial" panose="020B0604020202020204" pitchFamily="34" charset="0"/>
-              <a:buChar char="•"/>
-            </a:pPr>
-            <a:r>
-              <a:rPr lang="en-US" dirty="0"/>
-              <a:t>Use the URL for the repository you just created in GitHub.</a:t>
-            </a:r>
-          </a:p>
-          <a:p>
-            <a:pPr marL="628650" lvl="1" indent="-171450">
-              <a:buFont typeface="Arial" panose="020B0604020202020204" pitchFamily="34" charset="0"/>
-              <a:buChar char="•"/>
-            </a:pPr>
-            <a:endParaRPr lang="en-US" dirty="0"/>
-          </a:p>
-        </p:txBody>
-      </p:sp>
-      <p:sp>
-        <p:nvSpPr>
-          <p:cNvPr id="4" name="Slide Number Placeholder 3"/>
-          <p:cNvSpPr>
-            <a:spLocks noGrp="1"/>
-          </p:cNvSpPr>
-          <p:nvPr>
-            <p:ph type="sldNum" sz="quarter" idx="5"/>
-          </p:nvPr>
-        </p:nvSpPr>
-        <p:spPr/>
-        <p:txBody>
-          <a:bodyPr/>
-          <a:lstStyle/>
-          <a:p>
-            <a:fld id="{B7B3E9D7-7C42-42C9-B073-01B263BBC5B6}" type="slidenum">
-              <a:rPr lang="en-US" smtClean="0"/>
-              <a:t>7</a:t>
-            </a:fld>
-            <a:endParaRPr lang="en-US"/>
-          </a:p>
-        </p:txBody>
-      </p:sp>
-    </p:spTree>
-    <p:extLst>
-      <p:ext uri="{BB962C8B-B14F-4D97-AF65-F5344CB8AC3E}">
-        <p14:creationId xmlns:p14="http://schemas.microsoft.com/office/powerpoint/2010/main" val="2429561332"/>
       </p:ext>
     </p:extLst>
   </p:cSld>
@@ -5518,38 +5601,41 @@
             </a:pPr>
             <a:r>
               <a:rPr lang="en-US" dirty="0"/>
-              <a:t>Save task files to local repository (i.e., the relevant folder created in My Documents folder).</a:t>
+              <a:t>Create a New Project.</a:t>
             </a:r>
           </a:p>
           <a:p>
-            <a:pPr marL="171450" indent="-171450">
+            <a:pPr marL="628650" lvl="1" indent="-171450">
               <a:buFont typeface="Arial" panose="020B0604020202020204" pitchFamily="34" charset="0"/>
               <a:buChar char="•"/>
             </a:pPr>
             <a:r>
               <a:rPr lang="en-US" dirty="0"/>
-              <a:t>In the Git window, select changes to Commit (or save).</a:t>
+              <a:t>Checkout a project from a Version Control repository.</a:t>
             </a:r>
           </a:p>
           <a:p>
-            <a:pPr marL="171450" indent="-171450">
+            <a:pPr marL="628650" lvl="1" indent="-171450">
               <a:buFont typeface="Arial" panose="020B0604020202020204" pitchFamily="34" charset="0"/>
               <a:buChar char="•"/>
             </a:pPr>
             <a:r>
               <a:rPr lang="en-US" dirty="0"/>
-              <a:t>Describe changes, Commit changes, and Push changes to GitHub.</a:t>
+              <a:t>Clone a project from a Git repository.</a:t>
             </a:r>
           </a:p>
           <a:p>
-            <a:pPr marL="171450" indent="-171450">
+            <a:pPr marL="628650" lvl="1" indent="-171450">
               <a:buFont typeface="Arial" panose="020B0604020202020204" pitchFamily="34" charset="0"/>
               <a:buChar char="•"/>
             </a:pPr>
-            <a:endParaRPr lang="en-US" dirty="0"/>
-          </a:p>
-          <a:p>
-            <a:pPr marL="171450" indent="-171450">
+            <a:r>
+              <a:rPr lang="en-US" dirty="0"/>
+              <a:t>Use the URL for the repository you just created in GitHub.</a:t>
+            </a:r>
+          </a:p>
+          <a:p>
+            <a:pPr marL="628650" lvl="1" indent="-171450">
               <a:buFont typeface="Arial" panose="020B0604020202020204" pitchFamily="34" charset="0"/>
               <a:buChar char="•"/>
             </a:pPr>
@@ -5583,7 +5669,7 @@
     </p:spTree>
     <p:extLst>
       <p:ext uri="{BB962C8B-B14F-4D97-AF65-F5344CB8AC3E}">
-        <p14:creationId xmlns:p14="http://schemas.microsoft.com/office/powerpoint/2010/main" val="2591061018"/>
+        <p14:creationId xmlns:p14="http://schemas.microsoft.com/office/powerpoint/2010/main" val="2429561332"/>
       </p:ext>
     </p:extLst>
   </p:cSld>
@@ -5637,6 +5723,47 @@
           <a:bodyPr/>
           <a:lstStyle/>
           <a:p>
+            <a:pPr marL="171450" indent="-171450">
+              <a:buFont typeface="Arial" panose="020B0604020202020204" pitchFamily="34" charset="0"/>
+              <a:buChar char="•"/>
+            </a:pPr>
+            <a:r>
+              <a:rPr lang="en-US" dirty="0"/>
+              <a:t>Save task files to local repository (i.e., the relevant folder created in My Documents folder).</a:t>
+            </a:r>
+          </a:p>
+          <a:p>
+            <a:pPr marL="171450" indent="-171450">
+              <a:buFont typeface="Arial" panose="020B0604020202020204" pitchFamily="34" charset="0"/>
+              <a:buChar char="•"/>
+            </a:pPr>
+            <a:r>
+              <a:rPr lang="en-US" dirty="0"/>
+              <a:t>In the Git window, select changes to Commit (or save).</a:t>
+            </a:r>
+          </a:p>
+          <a:p>
+            <a:pPr marL="171450" indent="-171450">
+              <a:buFont typeface="Arial" panose="020B0604020202020204" pitchFamily="34" charset="0"/>
+              <a:buChar char="•"/>
+            </a:pPr>
+            <a:r>
+              <a:rPr lang="en-US" dirty="0"/>
+              <a:t>Describe changes, Commit changes, and Push changes to GitHub.</a:t>
+            </a:r>
+          </a:p>
+          <a:p>
+            <a:pPr marL="171450" indent="-171450">
+              <a:buFont typeface="Arial" panose="020B0604020202020204" pitchFamily="34" charset="0"/>
+              <a:buChar char="•"/>
+            </a:pPr>
+            <a:endParaRPr lang="en-US" dirty="0"/>
+          </a:p>
+          <a:p>
+            <a:pPr marL="171450" indent="-171450">
+              <a:buFont typeface="Arial" panose="020B0604020202020204" pitchFamily="34" charset="0"/>
+              <a:buChar char="•"/>
+            </a:pPr>
             <a:endParaRPr lang="en-US" dirty="0"/>
           </a:p>
         </p:txBody>
@@ -5667,7 +5794,7 @@
     </p:spTree>
     <p:extLst>
       <p:ext uri="{BB962C8B-B14F-4D97-AF65-F5344CB8AC3E}">
-        <p14:creationId xmlns:p14="http://schemas.microsoft.com/office/powerpoint/2010/main" val="2295977379"/>
+        <p14:creationId xmlns:p14="http://schemas.microsoft.com/office/powerpoint/2010/main" val="2591061018"/>
       </p:ext>
     </p:extLst>
   </p:cSld>
@@ -5721,68 +5848,7 @@
           <a:bodyPr/>
           <a:lstStyle/>
           <a:p>
-            <a:pPr marL="171450" indent="-171450">
-              <a:buFont typeface="Arial" panose="020B0604020202020204" pitchFamily="34" charset="0"/>
-              <a:buChar char="•"/>
-            </a:pPr>
-            <a:r>
-              <a:rPr lang="en-US" dirty="0" err="1"/>
-              <a:t>PowerBI</a:t>
-            </a:r>
-            <a:r>
-              <a:rPr lang="en-US" dirty="0"/>
-              <a:t>: Get data from other sources</a:t>
-            </a:r>
-          </a:p>
-          <a:p>
-            <a:pPr marL="628650" lvl="1" indent="-171450">
-              <a:buFont typeface="Arial" panose="020B0604020202020204" pitchFamily="34" charset="0"/>
-              <a:buChar char="•"/>
-            </a:pPr>
-            <a:r>
-              <a:rPr lang="en-US" dirty="0"/>
-              <a:t>GitHub: </a:t>
-            </a:r>
-          </a:p>
-          <a:p>
-            <a:pPr marL="1085850" lvl="2" indent="-171450">
-              <a:buFont typeface="Arial" panose="020B0604020202020204" pitchFamily="34" charset="0"/>
-              <a:buChar char="•"/>
-            </a:pPr>
-            <a:r>
-              <a:rPr lang="en-US" dirty="0"/>
-              <a:t>Enter username for Owner and Repository Name.</a:t>
-            </a:r>
-          </a:p>
-          <a:p>
-            <a:pPr marL="1085850" lvl="2" indent="-171450">
-              <a:buFont typeface="Arial" panose="020B0604020202020204" pitchFamily="34" charset="0"/>
-              <a:buChar char="•"/>
-            </a:pPr>
-            <a:r>
-              <a:rPr lang="en-US" dirty="0"/>
-              <a:t>Sign in.</a:t>
-            </a:r>
-          </a:p>
-          <a:p>
-            <a:pPr marL="1085850" lvl="2" indent="-171450">
-              <a:buFont typeface="Arial" panose="020B0604020202020204" pitchFamily="34" charset="0"/>
-              <a:buChar char="•"/>
-            </a:pPr>
-            <a:r>
-              <a:rPr lang="en-US" dirty="0"/>
-              <a:t>Authorize.</a:t>
-            </a:r>
-          </a:p>
-          <a:p>
-            <a:pPr marL="1085850" lvl="2" indent="-171450">
-              <a:buFont typeface="Arial" panose="020B0604020202020204" pitchFamily="34" charset="0"/>
-              <a:buChar char="•"/>
-            </a:pPr>
-            <a:r>
-              <a:rPr lang="en-US" dirty="0"/>
-              <a:t>Connect.</a:t>
-            </a:r>
+            <a:endParaRPr lang="en-US" dirty="0"/>
           </a:p>
         </p:txBody>
       </p:sp>
@@ -5812,7 +5878,7 @@
     </p:spTree>
     <p:extLst>
       <p:ext uri="{BB962C8B-B14F-4D97-AF65-F5344CB8AC3E}">
-        <p14:creationId xmlns:p14="http://schemas.microsoft.com/office/powerpoint/2010/main" val="1377252040"/>
+        <p14:creationId xmlns:p14="http://schemas.microsoft.com/office/powerpoint/2010/main" val="2295977379"/>
       </p:ext>
     </p:extLst>
   </p:cSld>
@@ -5827,13 +5893,7 @@
   <p:cSld>
     <p:spTree>
       <p:nvGrpSpPr>
-        <p:cNvPr id="1" name="">
-          <a:extLst>
-            <a:ext uri="{FF2B5EF4-FFF2-40B4-BE49-F238E27FC236}">
-              <a16:creationId xmlns:a16="http://schemas.microsoft.com/office/drawing/2014/main" id="{189F7BE7-857D-81DE-8F1C-041C44DB27DC}"/>
-            </a:ext>
-          </a:extLst>
-        </p:cNvPr>
+        <p:cNvPr id="1" name=""/>
         <p:cNvGrpSpPr/>
         <p:nvPr/>
       </p:nvGrpSpPr>
@@ -5847,13 +5907,7 @@
       </p:grpSpPr>
       <p:sp>
         <p:nvSpPr>
-          <p:cNvPr id="2" name="Slide Image Placeholder 1">
-            <a:extLst>
-              <a:ext uri="{FF2B5EF4-FFF2-40B4-BE49-F238E27FC236}">
-                <a16:creationId xmlns:a16="http://schemas.microsoft.com/office/drawing/2014/main" id="{4B6E823C-7693-479F-BDF3-0130A4DB4FDB}"/>
-              </a:ext>
-            </a:extLst>
-          </p:cNvPr>
+          <p:cNvPr id="2" name="Slide Image Placeholder 1"/>
           <p:cNvSpPr>
             <a:spLocks noGrp="1" noRot="1" noChangeAspect="1"/>
           </p:cNvSpPr>
@@ -5865,13 +5919,7 @@
       </p:sp>
       <p:sp>
         <p:nvSpPr>
-          <p:cNvPr id="3" name="Notes Placeholder 2">
-            <a:extLst>
-              <a:ext uri="{FF2B5EF4-FFF2-40B4-BE49-F238E27FC236}">
-                <a16:creationId xmlns:a16="http://schemas.microsoft.com/office/drawing/2014/main" id="{2EB54F32-1D24-C118-2E37-FD9B1BF92285}"/>
-              </a:ext>
-            </a:extLst>
-          </p:cNvPr>
+          <p:cNvPr id="3" name="Notes Placeholder 2"/>
           <p:cNvSpPr>
             <a:spLocks noGrp="1"/>
           </p:cNvSpPr>
@@ -5884,19 +5932,74 @@
           <a:bodyPr/>
           <a:lstStyle/>
           <a:p>
-            <a:endParaRPr lang="en-US" dirty="0"/>
+            <a:pPr marL="171450" indent="-171450">
+              <a:buFont typeface="Arial" panose="020B0604020202020204" pitchFamily="34" charset="0"/>
+              <a:buChar char="•"/>
+            </a:pPr>
+            <a:r>
+              <a:rPr lang="en-US" dirty="0" err="1"/>
+              <a:t>PowerBI</a:t>
+            </a:r>
+            <a:r>
+              <a:rPr lang="en-US" dirty="0"/>
+              <a:t>: Get data from other sources</a:t>
+            </a:r>
+          </a:p>
+          <a:p>
+            <a:pPr marL="628650" lvl="1" indent="-171450">
+              <a:buFont typeface="Arial" panose="020B0604020202020204" pitchFamily="34" charset="0"/>
+              <a:buChar char="•"/>
+            </a:pPr>
+            <a:r>
+              <a:rPr lang="en-US" dirty="0"/>
+              <a:t>GitHub: </a:t>
+            </a:r>
+          </a:p>
+          <a:p>
+            <a:pPr marL="1085850" lvl="2" indent="-171450">
+              <a:buFont typeface="Arial" panose="020B0604020202020204" pitchFamily="34" charset="0"/>
+              <a:buChar char="•"/>
+            </a:pPr>
+            <a:r>
+              <a:rPr lang="en-US" dirty="0"/>
+              <a:t>Enter username for Owner and Repository Name.</a:t>
+            </a:r>
+          </a:p>
+          <a:p>
+            <a:pPr marL="1085850" lvl="2" indent="-171450">
+              <a:buFont typeface="Arial" panose="020B0604020202020204" pitchFamily="34" charset="0"/>
+              <a:buChar char="•"/>
+            </a:pPr>
+            <a:r>
+              <a:rPr lang="en-US" dirty="0"/>
+              <a:t>Sign in.</a:t>
+            </a:r>
+          </a:p>
+          <a:p>
+            <a:pPr marL="1085850" lvl="2" indent="-171450">
+              <a:buFont typeface="Arial" panose="020B0604020202020204" pitchFamily="34" charset="0"/>
+              <a:buChar char="•"/>
+            </a:pPr>
+            <a:r>
+              <a:rPr lang="en-US" dirty="0"/>
+              <a:t>Authorize.</a:t>
+            </a:r>
+          </a:p>
+          <a:p>
+            <a:pPr marL="1085850" lvl="2" indent="-171450">
+              <a:buFont typeface="Arial" panose="020B0604020202020204" pitchFamily="34" charset="0"/>
+              <a:buChar char="•"/>
+            </a:pPr>
+            <a:r>
+              <a:rPr lang="en-US" dirty="0"/>
+              <a:t>Connect.</a:t>
+            </a:r>
           </a:p>
         </p:txBody>
       </p:sp>
       <p:sp>
         <p:nvSpPr>
-          <p:cNvPr id="4" name="Slide Number Placeholder 3">
-            <a:extLst>
-              <a:ext uri="{FF2B5EF4-FFF2-40B4-BE49-F238E27FC236}">
-                <a16:creationId xmlns:a16="http://schemas.microsoft.com/office/drawing/2014/main" id="{642301A1-EAE1-F696-FDCA-78DD789AEE89}"/>
-              </a:ext>
-            </a:extLst>
-          </p:cNvPr>
+          <p:cNvPr id="4" name="Slide Number Placeholder 3"/>
           <p:cNvSpPr>
             <a:spLocks noGrp="1"/>
           </p:cNvSpPr>
@@ -5911,7 +6014,7 @@
           <a:p>
             <a:fld id="{B7B3E9D7-7C42-42C9-B073-01B263BBC5B6}" type="slidenum">
               <a:rPr lang="en-US" smtClean="0"/>
-              <a:t>12</a:t>
+              <a:t>11</a:t>
             </a:fld>
             <a:endParaRPr lang="en-US"/>
           </a:p>
@@ -5920,7 +6023,7 @@
     </p:spTree>
     <p:extLst>
       <p:ext uri="{BB962C8B-B14F-4D97-AF65-F5344CB8AC3E}">
-        <p14:creationId xmlns:p14="http://schemas.microsoft.com/office/powerpoint/2010/main" val="2540584262"/>
+        <p14:creationId xmlns:p14="http://schemas.microsoft.com/office/powerpoint/2010/main" val="1377252040"/>
       </p:ext>
     </p:extLst>
   </p:cSld>
@@ -9376,7 +9479,10 @@
           </a:bodyPr>
           <a:lstStyle/>
           <a:p>
-            <a:endParaRPr lang="en-US"/>
+            <a:r>
+              <a:rPr lang="en-US" dirty="0"/>
+              <a:t>How-To</a:t>
+            </a:r>
           </a:p>
         </p:txBody>
       </p:sp>
@@ -9408,7 +9514,10 @@
           </a:bodyPr>
           <a:lstStyle/>
           <a:p>
-            <a:endParaRPr lang="en-US"/>
+            <a:r>
+              <a:rPr lang="en-US" dirty="0"/>
+              <a:t>Center for Advanced Analytics: Behavioral Science Task</a:t>
+            </a:r>
           </a:p>
         </p:txBody>
       </p:sp>
@@ -9874,6 +9983,700 @@
 </file>
 
 <file path=ppt/slides/slide10.xml><?xml version="1.0" encoding="utf-8"?>
+<p:sld xmlns:a="http://schemas.openxmlformats.org/drawingml/2006/main" xmlns:r="http://schemas.openxmlformats.org/officeDocument/2006/relationships" xmlns:p="http://schemas.openxmlformats.org/presentationml/2006/main">
+  <p:cSld>
+    <p:bg>
+      <p:bgPr>
+        <a:solidFill>
+          <a:schemeClr val="bg1"/>
+        </a:solidFill>
+        <a:effectLst/>
+      </p:bgPr>
+    </p:bg>
+    <p:spTree>
+      <p:nvGrpSpPr>
+        <p:cNvPr id="1" name=""/>
+        <p:cNvGrpSpPr/>
+        <p:nvPr/>
+      </p:nvGrpSpPr>
+      <p:grpSpPr>
+        <a:xfrm>
+          <a:off x="0" y="0"/>
+          <a:ext cx="0" cy="0"/>
+          <a:chOff x="0" y="0"/>
+          <a:chExt cx="0" cy="0"/>
+        </a:xfrm>
+      </p:grpSpPr>
+      <p:sp>
+        <p:nvSpPr>
+          <p:cNvPr id="50" name="Freeform: Shape 49">
+            <a:extLst>
+              <a:ext uri="{FF2B5EF4-FFF2-40B4-BE49-F238E27FC236}">
+                <a16:creationId xmlns:a16="http://schemas.microsoft.com/office/drawing/2014/main" id="{AE192E3E-68A9-4F36-936C-1C8D0B9EF132}"/>
+              </a:ext>
+              <a:ext uri="{C183D7F6-B498-43B3-948B-1728B52AA6E4}">
+                <adec:decorative xmlns:adec="http://schemas.microsoft.com/office/drawing/2017/decorative" val="1"/>
+              </a:ext>
+            </a:extLst>
+          </p:cNvPr>
+          <p:cNvSpPr>
+            <a:spLocks noGrp="1" noRot="1" noChangeAspect="1" noMove="1" noResize="1" noEditPoints="1" noAdjustHandles="1" noChangeArrowheads="1" noChangeShapeType="1" noTextEdit="1"/>
+          </p:cNvSpPr>
+          <p:nvPr>
+            <p:extLst>
+              <p:ext uri="{386F3935-93C4-4BCD-93E2-E3B085C9AB24}">
+                <p16:designElem xmlns:p16="http://schemas.microsoft.com/office/powerpoint/2015/main" val="1"/>
+              </p:ext>
+            </p:extLst>
+          </p:nvPr>
+        </p:nvSpPr>
+        <p:spPr>
+          <a:xfrm>
+            <a:off x="8803792" y="3455896"/>
+            <a:ext cx="3388208" cy="3406341"/>
+          </a:xfrm>
+          <a:custGeom>
+            <a:avLst/>
+            <a:gdLst>
+              <a:gd name="connsiteX0" fmla="*/ 3388058 w 3388208"/>
+              <a:gd name="connsiteY0" fmla="*/ 0 h 3406341"/>
+              <a:gd name="connsiteX1" fmla="*/ 3388208 w 3388208"/>
+              <a:gd name="connsiteY1" fmla="*/ 0 h 3406341"/>
+              <a:gd name="connsiteX2" fmla="*/ 3388208 w 3388208"/>
+              <a:gd name="connsiteY2" fmla="*/ 3406341 h 3406341"/>
+              <a:gd name="connsiteX3" fmla="*/ 0 w 3388208"/>
+              <a:gd name="connsiteY3" fmla="*/ 3406341 h 3406341"/>
+              <a:gd name="connsiteX4" fmla="*/ 79006 w 3388208"/>
+              <a:gd name="connsiteY4" fmla="*/ 3404386 h 3406341"/>
+              <a:gd name="connsiteX5" fmla="*/ 3383947 w 3388208"/>
+              <a:gd name="connsiteY5" fmla="*/ 164274 h 3406341"/>
+            </a:gdLst>
+            <a:ahLst/>
+            <a:cxnLst>
+              <a:cxn ang="0">
+                <a:pos x="connsiteX0" y="connsiteY0"/>
+              </a:cxn>
+              <a:cxn ang="0">
+                <a:pos x="connsiteX1" y="connsiteY1"/>
+              </a:cxn>
+              <a:cxn ang="0">
+                <a:pos x="connsiteX2" y="connsiteY2"/>
+              </a:cxn>
+              <a:cxn ang="0">
+                <a:pos x="connsiteX3" y="connsiteY3"/>
+              </a:cxn>
+              <a:cxn ang="0">
+                <a:pos x="connsiteX4" y="connsiteY4"/>
+              </a:cxn>
+              <a:cxn ang="0">
+                <a:pos x="connsiteX5" y="connsiteY5"/>
+              </a:cxn>
+            </a:cxnLst>
+            <a:rect l="l" t="t" r="r" b="b"/>
+            <a:pathLst>
+              <a:path w="3388208" h="3406341">
+                <a:moveTo>
+                  <a:pt x="3388058" y="0"/>
+                </a:moveTo>
+                <a:lnTo>
+                  <a:pt x="3388208" y="0"/>
+                </a:lnTo>
+                <a:lnTo>
+                  <a:pt x="3388208" y="3406341"/>
+                </a:lnTo>
+                <a:lnTo>
+                  <a:pt x="0" y="3406341"/>
+                </a:lnTo>
+                <a:lnTo>
+                  <a:pt x="79006" y="3404386"/>
+                </a:lnTo>
+                <a:cubicBezTo>
+                  <a:pt x="1864742" y="3315784"/>
+                  <a:pt x="3296223" y="1912901"/>
+                  <a:pt x="3383947" y="164274"/>
+                </a:cubicBezTo>
+                <a:close/>
+              </a:path>
+            </a:pathLst>
+          </a:custGeom>
+          <a:solidFill>
+            <a:schemeClr val="accent5"/>
+          </a:solidFill>
+          <a:ln>
+            <a:noFill/>
+          </a:ln>
+        </p:spPr>
+        <p:style>
+          <a:lnRef idx="2">
+            <a:schemeClr val="accent1">
+              <a:shade val="50000"/>
+            </a:schemeClr>
+          </a:lnRef>
+          <a:fillRef idx="1">
+            <a:schemeClr val="accent1"/>
+          </a:fillRef>
+          <a:effectRef idx="0">
+            <a:schemeClr val="accent1"/>
+          </a:effectRef>
+          <a:fontRef idx="minor">
+            <a:schemeClr val="lt1"/>
+          </a:fontRef>
+        </p:style>
+        <p:txBody>
+          <a:bodyPr wrap="square" rtlCol="0" anchor="ctr">
+            <a:noAutofit/>
+          </a:bodyPr>
+          <a:lstStyle/>
+          <a:p>
+            <a:pPr algn="ctr"/>
+            <a:endParaRPr lang="en-US"/>
+          </a:p>
+        </p:txBody>
+      </p:sp>
+      <p:sp useBgFill="1">
+        <p:nvSpPr>
+          <p:cNvPr id="52" name="Rectangle 51">
+            <a:extLst>
+              <a:ext uri="{FF2B5EF4-FFF2-40B4-BE49-F238E27FC236}">
+                <a16:creationId xmlns:a16="http://schemas.microsoft.com/office/drawing/2014/main" id="{AA447381-A1D4-4821-B1C9-7370B36F28B5}"/>
+              </a:ext>
+              <a:ext uri="{C183D7F6-B498-43B3-948B-1728B52AA6E4}">
+                <adec:decorative xmlns:adec="http://schemas.microsoft.com/office/drawing/2017/decorative" val="1"/>
+              </a:ext>
+            </a:extLst>
+          </p:cNvPr>
+          <p:cNvSpPr>
+            <a:spLocks noGrp="1" noRot="1" noChangeAspect="1" noMove="1" noResize="1" noEditPoints="1" noAdjustHandles="1" noChangeArrowheads="1" noChangeShapeType="1" noTextEdit="1"/>
+          </p:cNvSpPr>
+          <p:nvPr>
+            <p:extLst>
+              <p:ext uri="{386F3935-93C4-4BCD-93E2-E3B085C9AB24}">
+                <p16:designElem xmlns:p16="http://schemas.microsoft.com/office/powerpoint/2015/main" val="1"/>
+              </p:ext>
+            </p:extLst>
+          </p:nvPr>
+        </p:nvSpPr>
+        <p:spPr>
+          <a:xfrm>
+            <a:off x="0" y="0"/>
+            <a:ext cx="12192000" cy="6858000"/>
+          </a:xfrm>
+          <a:prstGeom prst="rect">
+            <a:avLst/>
+          </a:prstGeom>
+          <a:ln w="12700" cap="flat" cmpd="sng" algn="ctr">
+            <a:noFill/>
+            <a:prstDash val="solid"/>
+            <a:miter lim="800000"/>
+          </a:ln>
+          <a:effectLst/>
+          <a:extLst>
+            <a:ext uri="{91240B29-F687-4F45-9708-019B960494DF}">
+              <a14:hiddenLine xmlns:a14="http://schemas.microsoft.com/office/drawing/2010/main" w="12700" cap="flat" cmpd="sng" algn="ctr">
+                <a:solidFill>
+                  <a:schemeClr val="accent1">
+                    <a:shade val="50000"/>
+                  </a:schemeClr>
+                </a:solidFill>
+                <a:prstDash val="solid"/>
+                <a:miter lim="800000"/>
+              </a14:hiddenLine>
+            </a:ext>
+          </a:extLst>
+        </p:spPr>
+        <p:style>
+          <a:lnRef idx="2">
+            <a:schemeClr val="accent1">
+              <a:shade val="50000"/>
+            </a:schemeClr>
+          </a:lnRef>
+          <a:fillRef idx="1">
+            <a:schemeClr val="accent1"/>
+          </a:fillRef>
+          <a:effectRef idx="0">
+            <a:schemeClr val="accent1"/>
+          </a:effectRef>
+          <a:fontRef idx="minor">
+            <a:schemeClr val="lt1"/>
+          </a:fontRef>
+        </p:style>
+        <p:txBody>
+          <a:bodyPr rtlCol="0" anchor="ctr"/>
+          <a:lstStyle/>
+          <a:p>
+            <a:pPr algn="ctr"/>
+            <a:endParaRPr lang="en-US"/>
+          </a:p>
+        </p:txBody>
+      </p:sp>
+      <p:sp>
+        <p:nvSpPr>
+          <p:cNvPr id="54" name="Rectangle 53">
+            <a:extLst>
+              <a:ext uri="{FF2B5EF4-FFF2-40B4-BE49-F238E27FC236}">
+                <a16:creationId xmlns:a16="http://schemas.microsoft.com/office/drawing/2014/main" id="{B36BA507-8EBB-41BC-B10D-D9ED7F17EE89}"/>
+              </a:ext>
+              <a:ext uri="{C183D7F6-B498-43B3-948B-1728B52AA6E4}">
+                <adec:decorative xmlns:adec="http://schemas.microsoft.com/office/drawing/2017/decorative" val="1"/>
+              </a:ext>
+            </a:extLst>
+          </p:cNvPr>
+          <p:cNvSpPr>
+            <a:spLocks noGrp="1" noRot="1" noChangeAspect="1" noMove="1" noResize="1" noEditPoints="1" noAdjustHandles="1" noChangeArrowheads="1" noChangeShapeType="1" noTextEdit="1"/>
+          </p:cNvSpPr>
+          <p:nvPr>
+            <p:extLst>
+              <p:ext uri="{386F3935-93C4-4BCD-93E2-E3B085C9AB24}">
+                <p16:designElem xmlns:p16="http://schemas.microsoft.com/office/powerpoint/2015/main" val="1"/>
+              </p:ext>
+            </p:extLst>
+          </p:nvPr>
+        </p:nvSpPr>
+        <p:spPr>
+          <a:xfrm rot="10800000" flipH="1" flipV="1">
+            <a:off x="-4099" y="3429001"/>
+            <a:ext cx="3483870" cy="3428999"/>
+          </a:xfrm>
+          <a:prstGeom prst="rect">
+            <a:avLst/>
+          </a:prstGeom>
+          <a:solidFill>
+            <a:schemeClr val="accent4">
+              <a:lumMod val="40000"/>
+              <a:lumOff val="60000"/>
+            </a:schemeClr>
+          </a:solidFill>
+          <a:ln>
+            <a:noFill/>
+          </a:ln>
+        </p:spPr>
+        <p:style>
+          <a:lnRef idx="2">
+            <a:schemeClr val="accent1">
+              <a:shade val="50000"/>
+            </a:schemeClr>
+          </a:lnRef>
+          <a:fillRef idx="1">
+            <a:schemeClr val="accent1"/>
+          </a:fillRef>
+          <a:effectRef idx="0">
+            <a:schemeClr val="accent1"/>
+          </a:effectRef>
+          <a:fontRef idx="minor">
+            <a:schemeClr val="lt1"/>
+          </a:fontRef>
+        </p:style>
+        <p:txBody>
+          <a:bodyPr rtlCol="0" anchor="ctr"/>
+          <a:lstStyle/>
+          <a:p>
+            <a:pPr algn="ctr"/>
+            <a:endParaRPr lang="en-US" dirty="0"/>
+          </a:p>
+        </p:txBody>
+      </p:sp>
+      <p:sp>
+        <p:nvSpPr>
+          <p:cNvPr id="56" name="Freeform: Shape 55">
+            <a:extLst>
+              <a:ext uri="{FF2B5EF4-FFF2-40B4-BE49-F238E27FC236}">
+                <a16:creationId xmlns:a16="http://schemas.microsoft.com/office/drawing/2014/main" id="{D8A12D28-1F38-4C3F-8519-C9BF0D95735C}"/>
+              </a:ext>
+              <a:ext uri="{C183D7F6-B498-43B3-948B-1728B52AA6E4}">
+                <adec:decorative xmlns:adec="http://schemas.microsoft.com/office/drawing/2017/decorative" val="1"/>
+              </a:ext>
+            </a:extLst>
+          </p:cNvPr>
+          <p:cNvSpPr>
+            <a:spLocks noGrp="1" noRot="1" noChangeAspect="1" noMove="1" noResize="1" noEditPoints="1" noAdjustHandles="1" noChangeArrowheads="1" noChangeShapeType="1" noTextEdit="1"/>
+          </p:cNvSpPr>
+          <p:nvPr>
+            <p:extLst>
+              <p:ext uri="{386F3935-93C4-4BCD-93E2-E3B085C9AB24}">
+                <p16:designElem xmlns:p16="http://schemas.microsoft.com/office/powerpoint/2015/main" val="1"/>
+              </p:ext>
+            </p:extLst>
+          </p:nvPr>
+        </p:nvSpPr>
+        <p:spPr>
+          <a:xfrm flipH="1">
+            <a:off x="0" y="3427750"/>
+            <a:ext cx="3479772" cy="3430249"/>
+          </a:xfrm>
+          <a:custGeom>
+            <a:avLst/>
+            <a:gdLst>
+              <a:gd name="connsiteX0" fmla="*/ 0 w 2559050"/>
+              <a:gd name="connsiteY0" fmla="*/ 0 h 2559050"/>
+              <a:gd name="connsiteX1" fmla="*/ 2559050 w 2559050"/>
+              <a:gd name="connsiteY1" fmla="*/ 0 h 2559050"/>
+              <a:gd name="connsiteX2" fmla="*/ 0 w 2559050"/>
+              <a:gd name="connsiteY2" fmla="*/ 2559050 h 2559050"/>
+            </a:gdLst>
+            <a:ahLst/>
+            <a:cxnLst>
+              <a:cxn ang="0">
+                <a:pos x="connsiteX0" y="connsiteY0"/>
+              </a:cxn>
+              <a:cxn ang="0">
+                <a:pos x="connsiteX1" y="connsiteY1"/>
+              </a:cxn>
+              <a:cxn ang="0">
+                <a:pos x="connsiteX2" y="connsiteY2"/>
+              </a:cxn>
+            </a:cxnLst>
+            <a:rect l="l" t="t" r="r" b="b"/>
+            <a:pathLst>
+              <a:path w="2559050" h="2559050">
+                <a:moveTo>
+                  <a:pt x="0" y="0"/>
+                </a:moveTo>
+                <a:lnTo>
+                  <a:pt x="2559050" y="0"/>
+                </a:lnTo>
+                <a:cubicBezTo>
+                  <a:pt x="2559050" y="1413324"/>
+                  <a:pt x="1413324" y="2559050"/>
+                  <a:pt x="0" y="2559050"/>
+                </a:cubicBezTo>
+                <a:close/>
+              </a:path>
+            </a:pathLst>
+          </a:custGeom>
+          <a:solidFill>
+            <a:schemeClr val="accent5"/>
+          </a:solidFill>
+          <a:ln>
+            <a:noFill/>
+          </a:ln>
+        </p:spPr>
+        <p:style>
+          <a:lnRef idx="2">
+            <a:schemeClr val="accent1">
+              <a:shade val="50000"/>
+            </a:schemeClr>
+          </a:lnRef>
+          <a:fillRef idx="1">
+            <a:schemeClr val="accent1"/>
+          </a:fillRef>
+          <a:effectRef idx="0">
+            <a:schemeClr val="accent1"/>
+          </a:effectRef>
+          <a:fontRef idx="minor">
+            <a:schemeClr val="lt1"/>
+          </a:fontRef>
+        </p:style>
+        <p:txBody>
+          <a:bodyPr wrap="square" rtlCol="0" anchor="ctr">
+            <a:noAutofit/>
+          </a:bodyPr>
+          <a:lstStyle/>
+          <a:p>
+            <a:pPr algn="ctr"/>
+            <a:endParaRPr lang="en-US">
+              <a:solidFill>
+                <a:schemeClr val="tx1"/>
+              </a:solidFill>
+            </a:endParaRPr>
+          </a:p>
+        </p:txBody>
+      </p:sp>
+      <p:sp>
+        <p:nvSpPr>
+          <p:cNvPr id="58" name="Rectangle 57">
+            <a:extLst>
+              <a:ext uri="{FF2B5EF4-FFF2-40B4-BE49-F238E27FC236}">
+                <a16:creationId xmlns:a16="http://schemas.microsoft.com/office/drawing/2014/main" id="{F6B5EBAF-DB0B-4E76-8845-85F43B5033DD}"/>
+              </a:ext>
+              <a:ext uri="{C183D7F6-B498-43B3-948B-1728B52AA6E4}">
+                <adec:decorative xmlns:adec="http://schemas.microsoft.com/office/drawing/2017/decorative" val="1"/>
+              </a:ext>
+            </a:extLst>
+          </p:cNvPr>
+          <p:cNvSpPr>
+            <a:spLocks noGrp="1" noRot="1" noChangeAspect="1" noMove="1" noResize="1" noEditPoints="1" noAdjustHandles="1" noChangeArrowheads="1" noChangeShapeType="1" noTextEdit="1"/>
+          </p:cNvSpPr>
+          <p:nvPr>
+            <p:extLst>
+              <p:ext uri="{386F3935-93C4-4BCD-93E2-E3B085C9AB24}">
+                <p16:designElem xmlns:p16="http://schemas.microsoft.com/office/powerpoint/2015/main" val="1"/>
+              </p:ext>
+            </p:extLst>
+          </p:nvPr>
+        </p:nvSpPr>
+        <p:spPr>
+          <a:xfrm rot="10800000" flipH="1" flipV="1">
+            <a:off x="3479772" y="3429001"/>
+            <a:ext cx="8712227" cy="3428999"/>
+          </a:xfrm>
+          <a:prstGeom prst="rect">
+            <a:avLst/>
+          </a:prstGeom>
+          <a:solidFill>
+            <a:schemeClr val="accent1">
+              <a:lumMod val="60000"/>
+              <a:lumOff val="40000"/>
+            </a:schemeClr>
+          </a:solidFill>
+          <a:ln>
+            <a:noFill/>
+          </a:ln>
+        </p:spPr>
+        <p:style>
+          <a:lnRef idx="2">
+            <a:schemeClr val="accent1">
+              <a:shade val="50000"/>
+            </a:schemeClr>
+          </a:lnRef>
+          <a:fillRef idx="1">
+            <a:schemeClr val="accent1"/>
+          </a:fillRef>
+          <a:effectRef idx="0">
+            <a:schemeClr val="accent1"/>
+          </a:effectRef>
+          <a:fontRef idx="minor">
+            <a:schemeClr val="lt1"/>
+          </a:fontRef>
+        </p:style>
+        <p:txBody>
+          <a:bodyPr rtlCol="0" anchor="ctr"/>
+          <a:lstStyle/>
+          <a:p>
+            <a:pPr algn="ctr"/>
+            <a:endParaRPr lang="en-US" dirty="0"/>
+          </a:p>
+        </p:txBody>
+      </p:sp>
+      <p:sp>
+        <p:nvSpPr>
+          <p:cNvPr id="60" name="Rectangle 34">
+            <a:extLst>
+              <a:ext uri="{FF2B5EF4-FFF2-40B4-BE49-F238E27FC236}">
+                <a16:creationId xmlns:a16="http://schemas.microsoft.com/office/drawing/2014/main" id="{7C3391C8-8289-499C-B830-A3EACA618EE4}"/>
+              </a:ext>
+              <a:ext uri="{C183D7F6-B498-43B3-948B-1728B52AA6E4}">
+                <adec:decorative xmlns:adec="http://schemas.microsoft.com/office/drawing/2017/decorative" val="1"/>
+              </a:ext>
+            </a:extLst>
+          </p:cNvPr>
+          <p:cNvSpPr>
+            <a:spLocks noGrp="1" noRot="1" noChangeAspect="1" noMove="1" noResize="1" noEditPoints="1" noAdjustHandles="1" noChangeArrowheads="1" noChangeShapeType="1" noTextEdit="1"/>
+          </p:cNvSpPr>
+          <p:nvPr>
+            <p:extLst>
+              <p:ext uri="{386F3935-93C4-4BCD-93E2-E3B085C9AB24}">
+                <p16:designElem xmlns:p16="http://schemas.microsoft.com/office/powerpoint/2015/main" val="1"/>
+              </p:ext>
+            </p:extLst>
+          </p:nvPr>
+        </p:nvSpPr>
+        <p:spPr>
+          <a:xfrm rot="5400000" flipH="1" flipV="1">
+            <a:off x="3502418" y="3405102"/>
+            <a:ext cx="3429002" cy="3474296"/>
+          </a:xfrm>
+          <a:custGeom>
+            <a:avLst/>
+            <a:gdLst>
+              <a:gd name="connsiteX0" fmla="*/ 0 w 3484819"/>
+              <a:gd name="connsiteY0" fmla="*/ 0 h 3430264"/>
+              <a:gd name="connsiteX1" fmla="*/ 3484819 w 3484819"/>
+              <a:gd name="connsiteY1" fmla="*/ 0 h 3430264"/>
+              <a:gd name="connsiteX2" fmla="*/ 3484819 w 3484819"/>
+              <a:gd name="connsiteY2" fmla="*/ 3430264 h 3430264"/>
+              <a:gd name="connsiteX3" fmla="*/ 0 w 3484819"/>
+              <a:gd name="connsiteY3" fmla="*/ 3430264 h 3430264"/>
+              <a:gd name="connsiteX4" fmla="*/ 0 w 3484819"/>
+              <a:gd name="connsiteY4" fmla="*/ 0 h 3430264"/>
+              <a:gd name="connsiteX0" fmla="*/ 0 w 3484819"/>
+              <a:gd name="connsiteY0" fmla="*/ 0 h 3430264"/>
+              <a:gd name="connsiteX1" fmla="*/ 3484819 w 3484819"/>
+              <a:gd name="connsiteY1" fmla="*/ 0 h 3430264"/>
+              <a:gd name="connsiteX2" fmla="*/ 0 w 3484819"/>
+              <a:gd name="connsiteY2" fmla="*/ 3430264 h 3430264"/>
+              <a:gd name="connsiteX3" fmla="*/ 0 w 3484819"/>
+              <a:gd name="connsiteY3" fmla="*/ 0 h 3430264"/>
+            </a:gdLst>
+            <a:ahLst/>
+            <a:cxnLst>
+              <a:cxn ang="0">
+                <a:pos x="connsiteX0" y="connsiteY0"/>
+              </a:cxn>
+              <a:cxn ang="0">
+                <a:pos x="connsiteX1" y="connsiteY1"/>
+              </a:cxn>
+              <a:cxn ang="0">
+                <a:pos x="connsiteX2" y="connsiteY2"/>
+              </a:cxn>
+              <a:cxn ang="0">
+                <a:pos x="connsiteX3" y="connsiteY3"/>
+              </a:cxn>
+            </a:cxnLst>
+            <a:rect l="l" t="t" r="r" b="b"/>
+            <a:pathLst>
+              <a:path w="3484819" h="3430264">
+                <a:moveTo>
+                  <a:pt x="0" y="0"/>
+                </a:moveTo>
+                <a:lnTo>
+                  <a:pt x="3484819" y="0"/>
+                </a:lnTo>
+                <a:lnTo>
+                  <a:pt x="0" y="3430264"/>
+                </a:lnTo>
+                <a:lnTo>
+                  <a:pt x="0" y="0"/>
+                </a:lnTo>
+                <a:close/>
+              </a:path>
+            </a:pathLst>
+          </a:custGeom>
+          <a:solidFill>
+            <a:schemeClr val="accent2"/>
+          </a:solidFill>
+          <a:ln>
+            <a:noFill/>
+          </a:ln>
+        </p:spPr>
+        <p:style>
+          <a:lnRef idx="2">
+            <a:schemeClr val="accent1">
+              <a:shade val="50000"/>
+            </a:schemeClr>
+          </a:lnRef>
+          <a:fillRef idx="1">
+            <a:schemeClr val="accent1"/>
+          </a:fillRef>
+          <a:effectRef idx="0">
+            <a:schemeClr val="accent1"/>
+          </a:effectRef>
+          <a:fontRef idx="minor">
+            <a:schemeClr val="lt1"/>
+          </a:fontRef>
+        </p:style>
+        <p:txBody>
+          <a:bodyPr rtlCol="0" anchor="ctr"/>
+          <a:lstStyle/>
+          <a:p>
+            <a:pPr algn="ctr"/>
+            <a:endParaRPr lang="en-US" dirty="0"/>
+          </a:p>
+        </p:txBody>
+      </p:sp>
+      <p:sp>
+        <p:nvSpPr>
+          <p:cNvPr id="62" name="Oval 61">
+            <a:extLst>
+              <a:ext uri="{FF2B5EF4-FFF2-40B4-BE49-F238E27FC236}">
+                <a16:creationId xmlns:a16="http://schemas.microsoft.com/office/drawing/2014/main" id="{7C7FAD3D-CE22-4C88-85EA-13FC95D289DD}"/>
+              </a:ext>
+              <a:ext uri="{C183D7F6-B498-43B3-948B-1728B52AA6E4}">
+                <adec:decorative xmlns:adec="http://schemas.microsoft.com/office/drawing/2017/decorative" val="1"/>
+              </a:ext>
+            </a:extLst>
+          </p:cNvPr>
+          <p:cNvSpPr>
+            <a:spLocks noGrp="1" noRot="1" noChangeAspect="1" noMove="1" noResize="1" noEditPoints="1" noAdjustHandles="1" noChangeArrowheads="1" noChangeShapeType="1" noTextEdit="1"/>
+          </p:cNvSpPr>
+          <p:nvPr>
+            <p:extLst>
+              <p:ext uri="{386F3935-93C4-4BCD-93E2-E3B085C9AB24}">
+                <p16:designElem xmlns:p16="http://schemas.microsoft.com/office/powerpoint/2015/main" val="1"/>
+              </p:ext>
+            </p:extLst>
+          </p:nvPr>
+        </p:nvSpPr>
+        <p:spPr>
+          <a:xfrm>
+            <a:off x="8922467" y="3607646"/>
+            <a:ext cx="3070455" cy="3070455"/>
+          </a:xfrm>
+          <a:prstGeom prst="ellipse">
+            <a:avLst/>
+          </a:prstGeom>
+          <a:solidFill>
+            <a:srgbClr val="FFFFFF"/>
+          </a:solidFill>
+          <a:ln>
+            <a:noFill/>
+          </a:ln>
+        </p:spPr>
+        <p:style>
+          <a:lnRef idx="2">
+            <a:schemeClr val="accent1">
+              <a:shade val="50000"/>
+            </a:schemeClr>
+          </a:lnRef>
+          <a:fillRef idx="1">
+            <a:schemeClr val="accent1"/>
+          </a:fillRef>
+          <a:effectRef idx="0">
+            <a:schemeClr val="accent1"/>
+          </a:effectRef>
+          <a:fontRef idx="minor">
+            <a:schemeClr val="lt1"/>
+          </a:fontRef>
+        </p:style>
+        <p:txBody>
+          <a:bodyPr rtlCol="0" anchor="ctr"/>
+          <a:lstStyle/>
+          <a:p>
+            <a:pPr algn="ctr"/>
+            <a:endParaRPr lang="en-US"/>
+          </a:p>
+        </p:txBody>
+      </p:sp>
+      <p:pic>
+        <p:nvPicPr>
+          <p:cNvPr id="7" name="Picture 6" descr="A yellow bar chart with black background&#10;&#10;AI-generated content may be incorrect.">
+            <a:extLst>
+              <a:ext uri="{FF2B5EF4-FFF2-40B4-BE49-F238E27FC236}">
+                <a16:creationId xmlns:a16="http://schemas.microsoft.com/office/drawing/2014/main" id="{0F76F279-31D0-658B-A032-9A5077391A22}"/>
+              </a:ext>
+            </a:extLst>
+          </p:cNvPr>
+          <p:cNvPicPr>
+            <a:picLocks noChangeAspect="1"/>
+          </p:cNvPicPr>
+          <p:nvPr/>
+        </p:nvPicPr>
+        <p:blipFill>
+          <a:blip r:embed="rId3">
+            <a:extLst>
+              <a:ext uri="{28A0092B-C50C-407E-A947-70E740481C1C}">
+                <a14:useLocalDpi xmlns:a14="http://schemas.microsoft.com/office/drawing/2010/main" val="0"/>
+              </a:ext>
+            </a:extLst>
+          </a:blip>
+          <a:srcRect t="24448" b="26176"/>
+          <a:stretch>
+            <a:fillRect/>
+          </a:stretch>
+        </p:blipFill>
+        <p:spPr>
+          <a:xfrm>
+            <a:off x="9086094" y="4465010"/>
+            <a:ext cx="2743200" cy="1354479"/>
+          </a:xfrm>
+          <a:prstGeom prst="rect">
+            <a:avLst/>
+          </a:prstGeom>
+        </p:spPr>
+      </p:pic>
+    </p:spTree>
+    <p:extLst>
+      <p:ext uri="{BB962C8B-B14F-4D97-AF65-F5344CB8AC3E}">
+        <p14:creationId xmlns:p14="http://schemas.microsoft.com/office/powerpoint/2010/main" val="637506734"/>
+      </p:ext>
+    </p:extLst>
+  </p:cSld>
+  <p:clrMapOvr>
+    <a:masterClrMapping/>
+  </p:clrMapOvr>
+</p:sld>
+</file>
+
+<file path=ppt/slides/slide11.xml><?xml version="1.0" encoding="utf-8"?>
 <p:sld xmlns:a="http://schemas.openxmlformats.org/drawingml/2006/main" xmlns:r="http://schemas.openxmlformats.org/officeDocument/2006/relationships" xmlns:p="http://schemas.openxmlformats.org/presentationml/2006/main">
   <p:cSld>
     <p:spTree>
@@ -10251,7 +11054,7 @@
 </p:sld>
 </file>
 
-<file path=ppt/slides/slide11.xml><?xml version="1.0" encoding="utf-8"?>
+<file path=ppt/slides/slide12.xml><?xml version="1.0" encoding="utf-8"?>
 <p:sld xmlns:a="http://schemas.openxmlformats.org/drawingml/2006/main" xmlns:r="http://schemas.openxmlformats.org/officeDocument/2006/relationships" xmlns:p="http://schemas.openxmlformats.org/presentationml/2006/main">
   <p:cSld>
     <p:bg>
@@ -10351,7 +11154,7 @@
 </p:sld>
 </file>
 
-<file path=ppt/slides/slide12.xml><?xml version="1.0" encoding="utf-8"?>
+<file path=ppt/slides/slide13.xml><?xml version="1.0" encoding="utf-8"?>
 <p:sld xmlns:a="http://schemas.openxmlformats.org/drawingml/2006/main" xmlns:r="http://schemas.openxmlformats.org/officeDocument/2006/relationships" xmlns:p="http://schemas.openxmlformats.org/presentationml/2006/main">
   <p:cSld>
     <p:bg>
@@ -11051,7 +11854,7 @@
 </p:sld>
 </file>
 
-<file path=ppt/slides/slide13.xml><?xml version="1.0" encoding="utf-8"?>
+<file path=ppt/slides/slide14.xml><?xml version="1.0" encoding="utf-8"?>
 <p:sld xmlns:a="http://schemas.openxmlformats.org/drawingml/2006/main" xmlns:r="http://schemas.openxmlformats.org/officeDocument/2006/relationships" xmlns:p="http://schemas.openxmlformats.org/presentationml/2006/main">
   <p:cSld>
     <p:spTree>
@@ -11296,7 +12099,7 @@
 </p:sld>
 </file>
 
-<file path=ppt/slides/slide14.xml><?xml version="1.0" encoding="utf-8"?>
+<file path=ppt/slides/slide15.xml><?xml version="1.0" encoding="utf-8"?>
 <p:sld xmlns:a="http://schemas.openxmlformats.org/drawingml/2006/main" xmlns:r="http://schemas.openxmlformats.org/officeDocument/2006/relationships" xmlns:p="http://schemas.openxmlformats.org/presentationml/2006/main">
   <p:cSld>
     <p:spTree>
@@ -11524,7 +12327,7 @@
 </p:sld>
 </file>
 
-<file path=ppt/slides/slide15.xml><?xml version="1.0" encoding="utf-8"?>
+<file path=ppt/slides/slide16.xml><?xml version="1.0" encoding="utf-8"?>
 <p:sld xmlns:a="http://schemas.openxmlformats.org/drawingml/2006/main" xmlns:r="http://schemas.openxmlformats.org/officeDocument/2006/relationships" xmlns:p="http://schemas.openxmlformats.org/presentationml/2006/main">
   <p:cSld>
     <p:spTree>
@@ -11957,7 +12760,7 @@
 </p:sld>
 </file>
 
-<file path=ppt/slides/slide16.xml><?xml version="1.0" encoding="utf-8"?>
+<file path=ppt/slides/slide17.xml><?xml version="1.0" encoding="utf-8"?>
 <p:sld xmlns:a="http://schemas.openxmlformats.org/drawingml/2006/main" xmlns:r="http://schemas.openxmlformats.org/officeDocument/2006/relationships" xmlns:p="http://schemas.openxmlformats.org/presentationml/2006/main">
   <p:cSld>
     <p:spTree>
@@ -12168,7 +12971,7 @@
 </p:sld>
 </file>
 
-<file path=ppt/slides/slide17.xml><?xml version="1.0" encoding="utf-8"?>
+<file path=ppt/slides/slide18.xml><?xml version="1.0" encoding="utf-8"?>
 <p:sld xmlns:a="http://schemas.openxmlformats.org/drawingml/2006/main" xmlns:r="http://schemas.openxmlformats.org/officeDocument/2006/relationships" xmlns:p="http://schemas.openxmlformats.org/presentationml/2006/main">
   <p:cSld>
     <p:spTree>
@@ -12616,7 +13419,7 @@
 </p:sld>
 </file>
 
-<file path=ppt/slides/slide18.xml><?xml version="1.0" encoding="utf-8"?>
+<file path=ppt/slides/slide19.xml><?xml version="1.0" encoding="utf-8"?>
 <p:sld xmlns:a="http://schemas.openxmlformats.org/drawingml/2006/main" xmlns:r="http://schemas.openxmlformats.org/officeDocument/2006/relationships" xmlns:p="http://schemas.openxmlformats.org/presentationml/2006/main">
   <p:cSld>
     <p:spTree>
@@ -13010,7 +13813,1004 @@
 </p:sld>
 </file>
 
-<file path=ppt/slides/slide19.xml><?xml version="1.0" encoding="utf-8"?>
+<file path=ppt/slides/slide2.xml><?xml version="1.0" encoding="utf-8"?>
+<p:sld xmlns:a="http://schemas.openxmlformats.org/drawingml/2006/main" xmlns:r="http://schemas.openxmlformats.org/officeDocument/2006/relationships" xmlns:p="http://schemas.openxmlformats.org/presentationml/2006/main">
+  <p:cSld>
+    <p:spTree>
+      <p:nvGrpSpPr>
+        <p:cNvPr id="1" name=""/>
+        <p:cNvGrpSpPr/>
+        <p:nvPr/>
+      </p:nvGrpSpPr>
+      <p:grpSpPr>
+        <a:xfrm>
+          <a:off x="0" y="0"/>
+          <a:ext cx="0" cy="0"/>
+          <a:chOff x="0" y="0"/>
+          <a:chExt cx="0" cy="0"/>
+        </a:xfrm>
+      </p:grpSpPr>
+      <p:sp>
+        <p:nvSpPr>
+          <p:cNvPr id="2" name="Title 1">
+            <a:extLst>
+              <a:ext uri="{FF2B5EF4-FFF2-40B4-BE49-F238E27FC236}">
+                <a16:creationId xmlns:a16="http://schemas.microsoft.com/office/drawing/2014/main" id="{F209D3C3-4F46-F7F7-C1E0-8DC8D1FF45F9}"/>
+              </a:ext>
+            </a:extLst>
+          </p:cNvPr>
+          <p:cNvSpPr>
+            <a:spLocks noGrp="1"/>
+          </p:cNvSpPr>
+          <p:nvPr>
+            <p:ph type="title"/>
+          </p:nvPr>
+        </p:nvSpPr>
+        <p:spPr/>
+        <p:txBody>
+          <a:bodyPr/>
+          <a:lstStyle/>
+          <a:p>
+            <a:r>
+              <a:rPr lang="en-US" dirty="0"/>
+              <a:t>Comparisons</a:t>
+            </a:r>
+          </a:p>
+        </p:txBody>
+      </p:sp>
+      <p:graphicFrame>
+        <p:nvGraphicFramePr>
+          <p:cNvPr id="4" name="Content Placeholder 3">
+            <a:extLst>
+              <a:ext uri="{FF2B5EF4-FFF2-40B4-BE49-F238E27FC236}">
+                <a16:creationId xmlns:a16="http://schemas.microsoft.com/office/drawing/2014/main" id="{E4F0AC32-A179-56A5-A4D1-663DEE2734AA}"/>
+              </a:ext>
+            </a:extLst>
+          </p:cNvPr>
+          <p:cNvGraphicFramePr>
+            <a:graphicFrameLocks noGrp="1"/>
+          </p:cNvGraphicFramePr>
+          <p:nvPr>
+            <p:ph idx="1"/>
+            <p:extLst>
+              <p:ext uri="{D42A27DB-BD31-4B8C-83A1-F6EECF244321}">
+                <p14:modId xmlns:p14="http://schemas.microsoft.com/office/powerpoint/2010/main" val="910770295"/>
+              </p:ext>
+            </p:extLst>
+          </p:nvPr>
+        </p:nvGraphicFramePr>
+        <p:xfrm>
+          <a:off x="1961535" y="2093330"/>
+          <a:ext cx="7831394" cy="4450080"/>
+        </p:xfrm>
+        <a:graphic>
+          <a:graphicData uri="http://schemas.openxmlformats.org/drawingml/2006/table">
+            <a:tbl>
+              <a:tblPr firstRow="1" bandRow="1">
+                <a:tableStyleId>{2D5ABB26-0587-4C30-8999-92F81FD0307C}</a:tableStyleId>
+              </a:tblPr>
+              <a:tblGrid>
+                <a:gridCol w="4748981">
+                  <a:extLst>
+                    <a:ext uri="{9D8B030D-6E8A-4147-A177-3AD203B41FA5}">
+                      <a16:colId xmlns:a16="http://schemas.microsoft.com/office/drawing/2014/main" val="677144494"/>
+                    </a:ext>
+                  </a:extLst>
+                </a:gridCol>
+                <a:gridCol w="1027471">
+                  <a:extLst>
+                    <a:ext uri="{9D8B030D-6E8A-4147-A177-3AD203B41FA5}">
+                      <a16:colId xmlns:a16="http://schemas.microsoft.com/office/drawing/2014/main" val="3353587159"/>
+                    </a:ext>
+                  </a:extLst>
+                </a:gridCol>
+                <a:gridCol w="1027471">
+                  <a:extLst>
+                    <a:ext uri="{9D8B030D-6E8A-4147-A177-3AD203B41FA5}">
+                      <a16:colId xmlns:a16="http://schemas.microsoft.com/office/drawing/2014/main" val="3111689607"/>
+                    </a:ext>
+                  </a:extLst>
+                </a:gridCol>
+                <a:gridCol w="1027471">
+                  <a:extLst>
+                    <a:ext uri="{9D8B030D-6E8A-4147-A177-3AD203B41FA5}">
+                      <a16:colId xmlns:a16="http://schemas.microsoft.com/office/drawing/2014/main" val="1944965446"/>
+                    </a:ext>
+                  </a:extLst>
+                </a:gridCol>
+              </a:tblGrid>
+              <a:tr h="370840">
+                <a:tc>
+                  <a:txBody>
+                    <a:bodyPr/>
+                    <a:lstStyle/>
+                    <a:p>
+                      <a:endParaRPr lang="en-US" dirty="0"/>
+                    </a:p>
+                  </a:txBody>
+                  <a:tcPr/>
+                </a:tc>
+                <a:tc>
+                  <a:txBody>
+                    <a:bodyPr/>
+                    <a:lstStyle/>
+                    <a:p>
+                      <a:pPr algn="ctr"/>
+                      <a:r>
+                        <a:rPr lang="en-US" dirty="0"/>
+                        <a:t>Excel</a:t>
+                      </a:r>
+                    </a:p>
+                  </a:txBody>
+                  <a:tcPr/>
+                </a:tc>
+                <a:tc>
+                  <a:txBody>
+                    <a:bodyPr/>
+                    <a:lstStyle/>
+                    <a:p>
+                      <a:pPr algn="ctr"/>
+                      <a:r>
+                        <a:rPr lang="en-US" dirty="0" err="1"/>
+                        <a:t>PowerBI</a:t>
+                      </a:r>
+                      <a:endParaRPr lang="en-US" dirty="0"/>
+                    </a:p>
+                  </a:txBody>
+                  <a:tcPr/>
+                </a:tc>
+                <a:tc>
+                  <a:txBody>
+                    <a:bodyPr/>
+                    <a:lstStyle/>
+                    <a:p>
+                      <a:pPr algn="ctr"/>
+                      <a:r>
+                        <a:rPr lang="en-US" dirty="0"/>
+                        <a:t>R</a:t>
+                      </a:r>
+                    </a:p>
+                  </a:txBody>
+                  <a:tcPr/>
+                </a:tc>
+                <a:extLst>
+                  <a:ext uri="{0D108BD9-81ED-4DB2-BD59-A6C34878D82A}">
+                    <a16:rowId xmlns:a16="http://schemas.microsoft.com/office/drawing/2014/main" val="151360279"/>
+                  </a:ext>
+                </a:extLst>
+              </a:tr>
+              <a:tr h="370840">
+                <a:tc>
+                  <a:txBody>
+                    <a:bodyPr/>
+                    <a:lstStyle/>
+                    <a:p>
+                      <a:r>
+                        <a:rPr lang="en-US" dirty="0"/>
+                        <a:t>Set up project</a:t>
+                      </a:r>
+                    </a:p>
+                  </a:txBody>
+                  <a:tcPr/>
+                </a:tc>
+                <a:tc>
+                  <a:txBody>
+                    <a:bodyPr/>
+                    <a:lstStyle/>
+                    <a:p>
+                      <a:pPr algn="ctr"/>
+                      <a:endParaRPr lang="en-US" dirty="0"/>
+                    </a:p>
+                  </a:txBody>
+                  <a:tcPr>
+                    <a:solidFill>
+                      <a:schemeClr val="tx2">
+                        <a:lumMod val="50000"/>
+                        <a:lumOff val="50000"/>
+                      </a:schemeClr>
+                    </a:solidFill>
+                  </a:tcPr>
+                </a:tc>
+                <a:tc>
+                  <a:txBody>
+                    <a:bodyPr/>
+                    <a:lstStyle/>
+                    <a:p>
+                      <a:pPr algn="ctr"/>
+                      <a:endParaRPr lang="en-US" dirty="0"/>
+                    </a:p>
+                  </a:txBody>
+                  <a:tcPr>
+                    <a:solidFill>
+                      <a:schemeClr val="tx2">
+                        <a:lumMod val="25000"/>
+                        <a:lumOff val="75000"/>
+                      </a:schemeClr>
+                    </a:solidFill>
+                  </a:tcPr>
+                </a:tc>
+                <a:tc>
+                  <a:txBody>
+                    <a:bodyPr/>
+                    <a:lstStyle/>
+                    <a:p>
+                      <a:pPr algn="ctr"/>
+                      <a:endParaRPr lang="en-US" dirty="0"/>
+                    </a:p>
+                  </a:txBody>
+                  <a:tcPr>
+                    <a:solidFill>
+                      <a:schemeClr val="tx2">
+                        <a:lumMod val="10000"/>
+                        <a:lumOff val="90000"/>
+                      </a:schemeClr>
+                    </a:solidFill>
+                  </a:tcPr>
+                </a:tc>
+                <a:extLst>
+                  <a:ext uri="{0D108BD9-81ED-4DB2-BD59-A6C34878D82A}">
+                    <a16:rowId xmlns:a16="http://schemas.microsoft.com/office/drawing/2014/main" val="1054829305"/>
+                  </a:ext>
+                </a:extLst>
+              </a:tr>
+              <a:tr h="370840">
+                <a:tc>
+                  <a:txBody>
+                    <a:bodyPr/>
+                    <a:lstStyle/>
+                    <a:p>
+                      <a:r>
+                        <a:rPr lang="en-US" dirty="0"/>
+                        <a:t>See raw data for diagnosis</a:t>
+                      </a:r>
+                    </a:p>
+                  </a:txBody>
+                  <a:tcPr/>
+                </a:tc>
+                <a:tc>
+                  <a:txBody>
+                    <a:bodyPr/>
+                    <a:lstStyle/>
+                    <a:p>
+                      <a:pPr algn="ctr"/>
+                      <a:endParaRPr lang="en-US" dirty="0"/>
+                    </a:p>
+                  </a:txBody>
+                  <a:tcPr>
+                    <a:solidFill>
+                      <a:schemeClr val="tx2">
+                        <a:lumMod val="50000"/>
+                        <a:lumOff val="50000"/>
+                      </a:schemeClr>
+                    </a:solidFill>
+                  </a:tcPr>
+                </a:tc>
+                <a:tc>
+                  <a:txBody>
+                    <a:bodyPr/>
+                    <a:lstStyle/>
+                    <a:p>
+                      <a:pPr algn="ctr"/>
+                      <a:endParaRPr lang="en-US" dirty="0"/>
+                    </a:p>
+                  </a:txBody>
+                  <a:tcPr>
+                    <a:solidFill>
+                      <a:schemeClr val="tx2">
+                        <a:lumMod val="25000"/>
+                        <a:lumOff val="75000"/>
+                      </a:schemeClr>
+                    </a:solidFill>
+                  </a:tcPr>
+                </a:tc>
+                <a:tc>
+                  <a:txBody>
+                    <a:bodyPr/>
+                    <a:lstStyle/>
+                    <a:p>
+                      <a:pPr algn="ctr"/>
+                      <a:endParaRPr lang="en-US" dirty="0"/>
+                    </a:p>
+                  </a:txBody>
+                  <a:tcPr>
+                    <a:solidFill>
+                      <a:schemeClr val="tx2">
+                        <a:lumMod val="10000"/>
+                        <a:lumOff val="90000"/>
+                      </a:schemeClr>
+                    </a:solidFill>
+                  </a:tcPr>
+                </a:tc>
+                <a:extLst>
+                  <a:ext uri="{0D108BD9-81ED-4DB2-BD59-A6C34878D82A}">
+                    <a16:rowId xmlns:a16="http://schemas.microsoft.com/office/drawing/2014/main" val="939907852"/>
+                  </a:ext>
+                </a:extLst>
+              </a:tr>
+              <a:tr h="370840">
+                <a:tc>
+                  <a:txBody>
+                    <a:bodyPr/>
+                    <a:lstStyle/>
+                    <a:p>
+                      <a:r>
+                        <a:rPr lang="en-US" dirty="0"/>
+                        <a:t>Factor variables</a:t>
+                      </a:r>
+                    </a:p>
+                  </a:txBody>
+                  <a:tcPr/>
+                </a:tc>
+                <a:tc>
+                  <a:txBody>
+                    <a:bodyPr/>
+                    <a:lstStyle/>
+                    <a:p>
+                      <a:pPr algn="ctr"/>
+                      <a:endParaRPr lang="en-US" dirty="0"/>
+                    </a:p>
+                  </a:txBody>
+                  <a:tcPr>
+                    <a:solidFill>
+                      <a:schemeClr val="tx2">
+                        <a:lumMod val="10000"/>
+                        <a:lumOff val="90000"/>
+                      </a:schemeClr>
+                    </a:solidFill>
+                  </a:tcPr>
+                </a:tc>
+                <a:tc>
+                  <a:txBody>
+                    <a:bodyPr/>
+                    <a:lstStyle/>
+                    <a:p>
+                      <a:pPr algn="ctr"/>
+                      <a:endParaRPr lang="en-US" dirty="0"/>
+                    </a:p>
+                  </a:txBody>
+                  <a:tcPr>
+                    <a:solidFill>
+                      <a:schemeClr val="tx2">
+                        <a:lumMod val="25000"/>
+                        <a:lumOff val="75000"/>
+                      </a:schemeClr>
+                    </a:solidFill>
+                  </a:tcPr>
+                </a:tc>
+                <a:tc>
+                  <a:txBody>
+                    <a:bodyPr/>
+                    <a:lstStyle/>
+                    <a:p>
+                      <a:pPr algn="ctr"/>
+                      <a:endParaRPr lang="en-US" dirty="0"/>
+                    </a:p>
+                  </a:txBody>
+                  <a:tcPr>
+                    <a:solidFill>
+                      <a:schemeClr val="tx2">
+                        <a:lumMod val="50000"/>
+                        <a:lumOff val="50000"/>
+                      </a:schemeClr>
+                    </a:solidFill>
+                  </a:tcPr>
+                </a:tc>
+                <a:extLst>
+                  <a:ext uri="{0D108BD9-81ED-4DB2-BD59-A6C34878D82A}">
+                    <a16:rowId xmlns:a16="http://schemas.microsoft.com/office/drawing/2014/main" val="3876122518"/>
+                  </a:ext>
+                </a:extLst>
+              </a:tr>
+              <a:tr h="370840">
+                <a:tc>
+                  <a:txBody>
+                    <a:bodyPr/>
+                    <a:lstStyle/>
+                    <a:p>
+                      <a:r>
+                        <a:rPr lang="en-US" dirty="0"/>
+                        <a:t>Remove empty rows</a:t>
+                      </a:r>
+                    </a:p>
+                  </a:txBody>
+                  <a:tcPr/>
+                </a:tc>
+                <a:tc>
+                  <a:txBody>
+                    <a:bodyPr/>
+                    <a:lstStyle/>
+                    <a:p>
+                      <a:pPr algn="ctr"/>
+                      <a:endParaRPr lang="en-US" dirty="0"/>
+                    </a:p>
+                  </a:txBody>
+                  <a:tcPr>
+                    <a:solidFill>
+                      <a:schemeClr val="tx2">
+                        <a:lumMod val="10000"/>
+                        <a:lumOff val="90000"/>
+                      </a:schemeClr>
+                    </a:solidFill>
+                  </a:tcPr>
+                </a:tc>
+                <a:tc>
+                  <a:txBody>
+                    <a:bodyPr/>
+                    <a:lstStyle/>
+                    <a:p>
+                      <a:pPr algn="ctr"/>
+                      <a:endParaRPr lang="en-US" dirty="0"/>
+                    </a:p>
+                  </a:txBody>
+                  <a:tcPr>
+                    <a:solidFill>
+                      <a:schemeClr val="tx2">
+                        <a:lumMod val="25000"/>
+                        <a:lumOff val="75000"/>
+                      </a:schemeClr>
+                    </a:solidFill>
+                  </a:tcPr>
+                </a:tc>
+                <a:tc>
+                  <a:txBody>
+                    <a:bodyPr/>
+                    <a:lstStyle/>
+                    <a:p>
+                      <a:pPr algn="ctr"/>
+                      <a:endParaRPr lang="en-US" dirty="0"/>
+                    </a:p>
+                  </a:txBody>
+                  <a:tcPr>
+                    <a:solidFill>
+                      <a:schemeClr val="tx2">
+                        <a:lumMod val="50000"/>
+                        <a:lumOff val="50000"/>
+                      </a:schemeClr>
+                    </a:solidFill>
+                  </a:tcPr>
+                </a:tc>
+                <a:extLst>
+                  <a:ext uri="{0D108BD9-81ED-4DB2-BD59-A6C34878D82A}">
+                    <a16:rowId xmlns:a16="http://schemas.microsoft.com/office/drawing/2014/main" val="3376663055"/>
+                  </a:ext>
+                </a:extLst>
+              </a:tr>
+              <a:tr h="370840">
+                <a:tc>
+                  <a:txBody>
+                    <a:bodyPr/>
+                    <a:lstStyle/>
+                    <a:p>
+                      <a:r>
+                        <a:rPr lang="en-US" dirty="0"/>
+                        <a:t>Filter/Select rows</a:t>
+                      </a:r>
+                    </a:p>
+                  </a:txBody>
+                  <a:tcPr/>
+                </a:tc>
+                <a:tc>
+                  <a:txBody>
+                    <a:bodyPr/>
+                    <a:lstStyle/>
+                    <a:p>
+                      <a:pPr algn="ctr"/>
+                      <a:endParaRPr lang="en-US" dirty="0"/>
+                    </a:p>
+                  </a:txBody>
+                  <a:tcPr>
+                    <a:solidFill>
+                      <a:schemeClr val="tx2">
+                        <a:lumMod val="25000"/>
+                        <a:lumOff val="75000"/>
+                      </a:schemeClr>
+                    </a:solidFill>
+                  </a:tcPr>
+                </a:tc>
+                <a:tc>
+                  <a:txBody>
+                    <a:bodyPr/>
+                    <a:lstStyle/>
+                    <a:p>
+                      <a:pPr algn="ctr"/>
+                      <a:endParaRPr lang="en-US" dirty="0"/>
+                    </a:p>
+                  </a:txBody>
+                  <a:tcPr>
+                    <a:solidFill>
+                      <a:schemeClr val="tx2">
+                        <a:lumMod val="25000"/>
+                        <a:lumOff val="75000"/>
+                      </a:schemeClr>
+                    </a:solidFill>
+                  </a:tcPr>
+                </a:tc>
+                <a:tc>
+                  <a:txBody>
+                    <a:bodyPr/>
+                    <a:lstStyle/>
+                    <a:p>
+                      <a:pPr algn="ctr"/>
+                      <a:endParaRPr lang="en-US" dirty="0"/>
+                    </a:p>
+                  </a:txBody>
+                  <a:tcPr>
+                    <a:solidFill>
+                      <a:schemeClr val="tx2">
+                        <a:lumMod val="50000"/>
+                        <a:lumOff val="50000"/>
+                      </a:schemeClr>
+                    </a:solidFill>
+                  </a:tcPr>
+                </a:tc>
+                <a:extLst>
+                  <a:ext uri="{0D108BD9-81ED-4DB2-BD59-A6C34878D82A}">
+                    <a16:rowId xmlns:a16="http://schemas.microsoft.com/office/drawing/2014/main" val="609728765"/>
+                  </a:ext>
+                </a:extLst>
+              </a:tr>
+              <a:tr h="370840">
+                <a:tc>
+                  <a:txBody>
+                    <a:bodyPr/>
+                    <a:lstStyle/>
+                    <a:p>
+                      <a:r>
+                        <a:rPr lang="en-US" dirty="0"/>
+                        <a:t>Subset columns</a:t>
+                      </a:r>
+                    </a:p>
+                  </a:txBody>
+                  <a:tcPr/>
+                </a:tc>
+                <a:tc>
+                  <a:txBody>
+                    <a:bodyPr/>
+                    <a:lstStyle/>
+                    <a:p>
+                      <a:pPr algn="ctr"/>
+                      <a:endParaRPr lang="en-US" dirty="0"/>
+                    </a:p>
+                  </a:txBody>
+                  <a:tcPr>
+                    <a:solidFill>
+                      <a:schemeClr val="tx2">
+                        <a:lumMod val="10000"/>
+                        <a:lumOff val="90000"/>
+                      </a:schemeClr>
+                    </a:solidFill>
+                  </a:tcPr>
+                </a:tc>
+                <a:tc>
+                  <a:txBody>
+                    <a:bodyPr/>
+                    <a:lstStyle/>
+                    <a:p>
+                      <a:pPr algn="ctr"/>
+                      <a:endParaRPr lang="en-US" dirty="0"/>
+                    </a:p>
+                  </a:txBody>
+                  <a:tcPr>
+                    <a:solidFill>
+                      <a:schemeClr val="tx2">
+                        <a:lumMod val="25000"/>
+                        <a:lumOff val="75000"/>
+                      </a:schemeClr>
+                    </a:solidFill>
+                  </a:tcPr>
+                </a:tc>
+                <a:tc>
+                  <a:txBody>
+                    <a:bodyPr/>
+                    <a:lstStyle/>
+                    <a:p>
+                      <a:pPr algn="ctr"/>
+                      <a:endParaRPr lang="en-US" dirty="0"/>
+                    </a:p>
+                  </a:txBody>
+                  <a:tcPr>
+                    <a:solidFill>
+                      <a:schemeClr val="tx2">
+                        <a:lumMod val="50000"/>
+                        <a:lumOff val="50000"/>
+                      </a:schemeClr>
+                    </a:solidFill>
+                  </a:tcPr>
+                </a:tc>
+                <a:extLst>
+                  <a:ext uri="{0D108BD9-81ED-4DB2-BD59-A6C34878D82A}">
+                    <a16:rowId xmlns:a16="http://schemas.microsoft.com/office/drawing/2014/main" val="2569743874"/>
+                  </a:ext>
+                </a:extLst>
+              </a:tr>
+              <a:tr h="370840">
+                <a:tc>
+                  <a:txBody>
+                    <a:bodyPr/>
+                    <a:lstStyle/>
+                    <a:p>
+                      <a:r>
+                        <a:rPr lang="en-US" dirty="0"/>
+                        <a:t>Merge data</a:t>
+                      </a:r>
+                    </a:p>
+                  </a:txBody>
+                  <a:tcPr/>
+                </a:tc>
+                <a:tc>
+                  <a:txBody>
+                    <a:bodyPr/>
+                    <a:lstStyle/>
+                    <a:p>
+                      <a:pPr algn="ctr"/>
+                      <a:endParaRPr lang="en-US" dirty="0"/>
+                    </a:p>
+                  </a:txBody>
+                  <a:tcPr>
+                    <a:solidFill>
+                      <a:schemeClr val="tx2">
+                        <a:lumMod val="10000"/>
+                        <a:lumOff val="90000"/>
+                      </a:schemeClr>
+                    </a:solidFill>
+                  </a:tcPr>
+                </a:tc>
+                <a:tc>
+                  <a:txBody>
+                    <a:bodyPr/>
+                    <a:lstStyle/>
+                    <a:p>
+                      <a:pPr algn="ctr"/>
+                      <a:endParaRPr lang="en-US" dirty="0"/>
+                    </a:p>
+                  </a:txBody>
+                  <a:tcPr>
+                    <a:solidFill>
+                      <a:schemeClr val="tx2">
+                        <a:lumMod val="25000"/>
+                        <a:lumOff val="75000"/>
+                      </a:schemeClr>
+                    </a:solidFill>
+                  </a:tcPr>
+                </a:tc>
+                <a:tc>
+                  <a:txBody>
+                    <a:bodyPr/>
+                    <a:lstStyle/>
+                    <a:p>
+                      <a:pPr algn="ctr"/>
+                      <a:endParaRPr lang="en-US" dirty="0"/>
+                    </a:p>
+                  </a:txBody>
+                  <a:tcPr>
+                    <a:solidFill>
+                      <a:schemeClr val="tx2">
+                        <a:lumMod val="50000"/>
+                        <a:lumOff val="50000"/>
+                      </a:schemeClr>
+                    </a:solidFill>
+                  </a:tcPr>
+                </a:tc>
+                <a:extLst>
+                  <a:ext uri="{0D108BD9-81ED-4DB2-BD59-A6C34878D82A}">
+                    <a16:rowId xmlns:a16="http://schemas.microsoft.com/office/drawing/2014/main" val="3872145511"/>
+                  </a:ext>
+                </a:extLst>
+              </a:tr>
+              <a:tr h="370840">
+                <a:tc>
+                  <a:txBody>
+                    <a:bodyPr/>
+                    <a:lstStyle/>
+                    <a:p>
+                      <a:r>
+                        <a:rPr lang="en-US" dirty="0"/>
+                        <a:t>Document/Replicate data cleaning process</a:t>
+                      </a:r>
+                    </a:p>
+                  </a:txBody>
+                  <a:tcPr/>
+                </a:tc>
+                <a:tc>
+                  <a:txBody>
+                    <a:bodyPr/>
+                    <a:lstStyle/>
+                    <a:p>
+                      <a:pPr algn="ctr"/>
+                      <a:endParaRPr lang="en-US" dirty="0"/>
+                    </a:p>
+                  </a:txBody>
+                  <a:tcPr>
+                    <a:solidFill>
+                      <a:schemeClr val="tx2">
+                        <a:lumMod val="10000"/>
+                        <a:lumOff val="90000"/>
+                      </a:schemeClr>
+                    </a:solidFill>
+                  </a:tcPr>
+                </a:tc>
+                <a:tc>
+                  <a:txBody>
+                    <a:bodyPr/>
+                    <a:lstStyle/>
+                    <a:p>
+                      <a:pPr algn="ctr"/>
+                      <a:endParaRPr lang="en-US" dirty="0"/>
+                    </a:p>
+                  </a:txBody>
+                  <a:tcPr>
+                    <a:solidFill>
+                      <a:schemeClr val="tx2">
+                        <a:lumMod val="25000"/>
+                        <a:lumOff val="75000"/>
+                      </a:schemeClr>
+                    </a:solidFill>
+                  </a:tcPr>
+                </a:tc>
+                <a:tc>
+                  <a:txBody>
+                    <a:bodyPr/>
+                    <a:lstStyle/>
+                    <a:p>
+                      <a:pPr algn="ctr"/>
+                      <a:endParaRPr lang="en-US" dirty="0"/>
+                    </a:p>
+                  </a:txBody>
+                  <a:tcPr>
+                    <a:solidFill>
+                      <a:schemeClr val="tx2">
+                        <a:lumMod val="50000"/>
+                        <a:lumOff val="50000"/>
+                      </a:schemeClr>
+                    </a:solidFill>
+                  </a:tcPr>
+                </a:tc>
+                <a:extLst>
+                  <a:ext uri="{0D108BD9-81ED-4DB2-BD59-A6C34878D82A}">
+                    <a16:rowId xmlns:a16="http://schemas.microsoft.com/office/drawing/2014/main" val="2410273550"/>
+                  </a:ext>
+                </a:extLst>
+              </a:tr>
+              <a:tr h="370840">
+                <a:tc>
+                  <a:txBody>
+                    <a:bodyPr/>
+                    <a:lstStyle/>
+                    <a:p>
+                      <a:r>
+                        <a:rPr lang="en-US" dirty="0"/>
+                        <a:t>Descriptive stats, Cross-tabs, Pivot tables</a:t>
+                      </a:r>
+                    </a:p>
+                  </a:txBody>
+                  <a:tcPr/>
+                </a:tc>
+                <a:tc>
+                  <a:txBody>
+                    <a:bodyPr/>
+                    <a:lstStyle/>
+                    <a:p>
+                      <a:pPr algn="ctr"/>
+                      <a:endParaRPr lang="en-US" dirty="0"/>
+                    </a:p>
+                  </a:txBody>
+                  <a:tcPr>
+                    <a:solidFill>
+                      <a:schemeClr val="tx2">
+                        <a:lumMod val="50000"/>
+                        <a:lumOff val="50000"/>
+                      </a:schemeClr>
+                    </a:solidFill>
+                  </a:tcPr>
+                </a:tc>
+                <a:tc>
+                  <a:txBody>
+                    <a:bodyPr/>
+                    <a:lstStyle/>
+                    <a:p>
+                      <a:pPr algn="ctr"/>
+                      <a:endParaRPr lang="en-US" dirty="0"/>
+                    </a:p>
+                  </a:txBody>
+                  <a:tcPr>
+                    <a:solidFill>
+                      <a:schemeClr val="tx2">
+                        <a:lumMod val="10000"/>
+                        <a:lumOff val="90000"/>
+                      </a:schemeClr>
+                    </a:solidFill>
+                  </a:tcPr>
+                </a:tc>
+                <a:tc>
+                  <a:txBody>
+                    <a:bodyPr/>
+                    <a:lstStyle/>
+                    <a:p>
+                      <a:pPr algn="ctr"/>
+                      <a:endParaRPr lang="en-US" dirty="0"/>
+                    </a:p>
+                  </a:txBody>
+                  <a:tcPr>
+                    <a:solidFill>
+                      <a:schemeClr val="tx2">
+                        <a:lumMod val="25000"/>
+                        <a:lumOff val="75000"/>
+                      </a:schemeClr>
+                    </a:solidFill>
+                  </a:tcPr>
+                </a:tc>
+                <a:extLst>
+                  <a:ext uri="{0D108BD9-81ED-4DB2-BD59-A6C34878D82A}">
+                    <a16:rowId xmlns:a16="http://schemas.microsoft.com/office/drawing/2014/main" val="2017705254"/>
+                  </a:ext>
+                </a:extLst>
+              </a:tr>
+              <a:tr h="370840">
+                <a:tc>
+                  <a:txBody>
+                    <a:bodyPr/>
+                    <a:lstStyle/>
+                    <a:p>
+                      <a:r>
+                        <a:rPr lang="en-US" dirty="0"/>
+                        <a:t>Visualize data</a:t>
+                      </a:r>
+                    </a:p>
+                  </a:txBody>
+                  <a:tcPr/>
+                </a:tc>
+                <a:tc>
+                  <a:txBody>
+                    <a:bodyPr/>
+                    <a:lstStyle/>
+                    <a:p>
+                      <a:pPr algn="ctr"/>
+                      <a:endParaRPr lang="en-US" dirty="0"/>
+                    </a:p>
+                  </a:txBody>
+                  <a:tcPr>
+                    <a:solidFill>
+                      <a:schemeClr val="tx2">
+                        <a:lumMod val="50000"/>
+                        <a:lumOff val="50000"/>
+                      </a:schemeClr>
+                    </a:solidFill>
+                  </a:tcPr>
+                </a:tc>
+                <a:tc>
+                  <a:txBody>
+                    <a:bodyPr/>
+                    <a:lstStyle/>
+                    <a:p>
+                      <a:pPr algn="ctr"/>
+                      <a:endParaRPr lang="en-US" dirty="0"/>
+                    </a:p>
+                  </a:txBody>
+                  <a:tcPr>
+                    <a:solidFill>
+                      <a:schemeClr val="tx2">
+                        <a:lumMod val="25000"/>
+                        <a:lumOff val="75000"/>
+                      </a:schemeClr>
+                    </a:solidFill>
+                  </a:tcPr>
+                </a:tc>
+                <a:tc>
+                  <a:txBody>
+                    <a:bodyPr/>
+                    <a:lstStyle/>
+                    <a:p>
+                      <a:pPr algn="ctr"/>
+                      <a:endParaRPr lang="en-US" dirty="0"/>
+                    </a:p>
+                  </a:txBody>
+                  <a:tcPr>
+                    <a:solidFill>
+                      <a:schemeClr val="tx2">
+                        <a:lumMod val="25000"/>
+                        <a:lumOff val="75000"/>
+                      </a:schemeClr>
+                    </a:solidFill>
+                  </a:tcPr>
+                </a:tc>
+                <a:extLst>
+                  <a:ext uri="{0D108BD9-81ED-4DB2-BD59-A6C34878D82A}">
+                    <a16:rowId xmlns:a16="http://schemas.microsoft.com/office/drawing/2014/main" val="3001367966"/>
+                  </a:ext>
+                </a:extLst>
+              </a:tr>
+              <a:tr h="370840">
+                <a:tc>
+                  <a:txBody>
+                    <a:bodyPr/>
+                    <a:lstStyle/>
+                    <a:p>
+                      <a:r>
+                        <a:rPr lang="en-US" dirty="0"/>
+                        <a:t>Run statistical tests</a:t>
+                      </a:r>
+                    </a:p>
+                  </a:txBody>
+                  <a:tcPr/>
+                </a:tc>
+                <a:tc>
+                  <a:txBody>
+                    <a:bodyPr/>
+                    <a:lstStyle/>
+                    <a:p>
+                      <a:pPr algn="ctr"/>
+                      <a:endParaRPr lang="en-US" dirty="0"/>
+                    </a:p>
+                  </a:txBody>
+                  <a:tcPr>
+                    <a:solidFill>
+                      <a:schemeClr val="tx2">
+                        <a:lumMod val="25000"/>
+                        <a:lumOff val="75000"/>
+                      </a:schemeClr>
+                    </a:solidFill>
+                  </a:tcPr>
+                </a:tc>
+                <a:tc>
+                  <a:txBody>
+                    <a:bodyPr/>
+                    <a:lstStyle/>
+                    <a:p>
+                      <a:pPr algn="ctr"/>
+                      <a:endParaRPr lang="en-US" dirty="0"/>
+                    </a:p>
+                  </a:txBody>
+                  <a:tcPr>
+                    <a:solidFill>
+                      <a:schemeClr val="tx2">
+                        <a:lumMod val="10000"/>
+                        <a:lumOff val="90000"/>
+                      </a:schemeClr>
+                    </a:solidFill>
+                  </a:tcPr>
+                </a:tc>
+                <a:tc>
+                  <a:txBody>
+                    <a:bodyPr/>
+                    <a:lstStyle/>
+                    <a:p>
+                      <a:pPr algn="ctr"/>
+                      <a:endParaRPr lang="en-US" dirty="0"/>
+                    </a:p>
+                  </a:txBody>
+                  <a:tcPr>
+                    <a:solidFill>
+                      <a:schemeClr val="tx2">
+                        <a:lumMod val="50000"/>
+                        <a:lumOff val="50000"/>
+                      </a:schemeClr>
+                    </a:solidFill>
+                  </a:tcPr>
+                </a:tc>
+                <a:extLst>
+                  <a:ext uri="{0D108BD9-81ED-4DB2-BD59-A6C34878D82A}">
+                    <a16:rowId xmlns:a16="http://schemas.microsoft.com/office/drawing/2014/main" val="3380477211"/>
+                  </a:ext>
+                </a:extLst>
+              </a:tr>
+            </a:tbl>
+          </a:graphicData>
+        </a:graphic>
+      </p:graphicFrame>
+    </p:spTree>
+    <p:extLst>
+      <p:ext uri="{BB962C8B-B14F-4D97-AF65-F5344CB8AC3E}">
+        <p14:creationId xmlns:p14="http://schemas.microsoft.com/office/powerpoint/2010/main" val="987300906"/>
+      </p:ext>
+    </p:extLst>
+  </p:cSld>
+  <p:clrMapOvr>
+    <a:masterClrMapping/>
+  </p:clrMapOvr>
+</p:sld>
+</file>
+
+<file path=ppt/slides/slide20.xml><?xml version="1.0" encoding="utf-8"?>
 <p:sld xmlns:a="http://schemas.openxmlformats.org/drawingml/2006/main" xmlns:r="http://schemas.openxmlformats.org/officeDocument/2006/relationships" xmlns:p="http://schemas.openxmlformats.org/presentationml/2006/main">
   <p:cSld>
     <p:spTree>
@@ -13525,101 +15325,7 @@
 </p:sld>
 </file>
 
-<file path=ppt/slides/slide2.xml><?xml version="1.0" encoding="utf-8"?>
-<p:sld xmlns:a="http://schemas.openxmlformats.org/drawingml/2006/main" xmlns:r="http://schemas.openxmlformats.org/officeDocument/2006/relationships" xmlns:p="http://schemas.openxmlformats.org/presentationml/2006/main">
-  <p:cSld>
-    <p:bg>
-      <p:bgPr>
-        <a:solidFill>
-          <a:schemeClr val="accent6">
-            <a:lumMod val="20000"/>
-            <a:lumOff val="80000"/>
-          </a:schemeClr>
-        </a:solidFill>
-        <a:effectLst/>
-      </p:bgPr>
-    </p:bg>
-    <p:spTree>
-      <p:nvGrpSpPr>
-        <p:cNvPr id="1" name=""/>
-        <p:cNvGrpSpPr/>
-        <p:nvPr/>
-      </p:nvGrpSpPr>
-      <p:grpSpPr>
-        <a:xfrm>
-          <a:off x="0" y="0"/>
-          <a:ext cx="0" cy="0"/>
-          <a:chOff x="0" y="0"/>
-          <a:chExt cx="0" cy="0"/>
-        </a:xfrm>
-      </p:grpSpPr>
-      <p:sp>
-        <p:nvSpPr>
-          <p:cNvPr id="6" name="Title 5">
-            <a:extLst>
-              <a:ext uri="{FF2B5EF4-FFF2-40B4-BE49-F238E27FC236}">
-                <a16:creationId xmlns:a16="http://schemas.microsoft.com/office/drawing/2014/main" id="{63884149-B247-1597-BB9F-F0EFE8F4A5EE}"/>
-              </a:ext>
-            </a:extLst>
-          </p:cNvPr>
-          <p:cNvSpPr>
-            <a:spLocks noGrp="1"/>
-          </p:cNvSpPr>
-          <p:nvPr>
-            <p:ph type="title"/>
-          </p:nvPr>
-        </p:nvSpPr>
-        <p:spPr/>
-        <p:txBody>
-          <a:bodyPr/>
-          <a:lstStyle/>
-          <a:p>
-            <a:r>
-              <a:rPr lang="en-US" dirty="0"/>
-              <a:t>Set up Project</a:t>
-            </a:r>
-          </a:p>
-        </p:txBody>
-      </p:sp>
-      <p:sp>
-        <p:nvSpPr>
-          <p:cNvPr id="7" name="Text Placeholder 6">
-            <a:extLst>
-              <a:ext uri="{FF2B5EF4-FFF2-40B4-BE49-F238E27FC236}">
-                <a16:creationId xmlns:a16="http://schemas.microsoft.com/office/drawing/2014/main" id="{CF15E32C-5DB4-3C4B-6369-3C5776A26709}"/>
-              </a:ext>
-            </a:extLst>
-          </p:cNvPr>
-          <p:cNvSpPr>
-            <a:spLocks noGrp="1"/>
-          </p:cNvSpPr>
-          <p:nvPr>
-            <p:ph type="body" idx="1"/>
-          </p:nvPr>
-        </p:nvSpPr>
-        <p:spPr/>
-        <p:txBody>
-          <a:bodyPr/>
-          <a:lstStyle/>
-          <a:p>
-            <a:endParaRPr lang="en-US"/>
-          </a:p>
-        </p:txBody>
-      </p:sp>
-    </p:spTree>
-    <p:extLst>
-      <p:ext uri="{BB962C8B-B14F-4D97-AF65-F5344CB8AC3E}">
-        <p14:creationId xmlns:p14="http://schemas.microsoft.com/office/powerpoint/2010/main" val="3686820540"/>
-      </p:ext>
-    </p:extLst>
-  </p:cSld>
-  <p:clrMapOvr>
-    <a:masterClrMapping/>
-  </p:clrMapOvr>
-</p:sld>
-</file>
-
-<file path=ppt/slides/slide20.xml><?xml version="1.0" encoding="utf-8"?>
+<file path=ppt/slides/slide21.xml><?xml version="1.0" encoding="utf-8"?>
 <p:sld xmlns:a="http://schemas.openxmlformats.org/drawingml/2006/main" xmlns:r="http://schemas.openxmlformats.org/officeDocument/2006/relationships" xmlns:p="http://schemas.openxmlformats.org/presentationml/2006/main">
   <p:cSld>
     <p:spTree>
@@ -14256,7 +15962,7 @@
 </p:sld>
 </file>
 
-<file path=ppt/slides/slide21.xml><?xml version="1.0" encoding="utf-8"?>
+<file path=ppt/slides/slide22.xml><?xml version="1.0" encoding="utf-8"?>
 <p:sld xmlns:a="http://schemas.openxmlformats.org/drawingml/2006/main" xmlns:r="http://schemas.openxmlformats.org/officeDocument/2006/relationships" xmlns:p="http://schemas.openxmlformats.org/presentationml/2006/main">
   <p:cSld>
     <p:spTree>
@@ -14513,7 +16219,7 @@
 </p:sld>
 </file>
 
-<file path=ppt/slides/slide22.xml><?xml version="1.0" encoding="utf-8"?>
+<file path=ppt/slides/slide23.xml><?xml version="1.0" encoding="utf-8"?>
 <p:sld xmlns:a="http://schemas.openxmlformats.org/drawingml/2006/main" xmlns:r="http://schemas.openxmlformats.org/officeDocument/2006/relationships" xmlns:p="http://schemas.openxmlformats.org/presentationml/2006/main">
   <p:cSld>
     <p:spTree>
@@ -14846,7 +16552,7 @@
 </p:sld>
 </file>
 
-<file path=ppt/slides/slide23.xml><?xml version="1.0" encoding="utf-8"?>
+<file path=ppt/slides/slide24.xml><?xml version="1.0" encoding="utf-8"?>
 <p:sld xmlns:a="http://schemas.openxmlformats.org/drawingml/2006/main" xmlns:r="http://schemas.openxmlformats.org/officeDocument/2006/relationships" xmlns:p="http://schemas.openxmlformats.org/presentationml/2006/main">
   <p:cSld>
     <p:spTree>
@@ -15105,7 +16811,7 @@
 </p:sld>
 </file>
 
-<file path=ppt/slides/slide24.xml><?xml version="1.0" encoding="utf-8"?>
+<file path=ppt/slides/slide25.xml><?xml version="1.0" encoding="utf-8"?>
 <p:sld xmlns:a="http://schemas.openxmlformats.org/drawingml/2006/main" xmlns:r="http://schemas.openxmlformats.org/officeDocument/2006/relationships" xmlns:p="http://schemas.openxmlformats.org/presentationml/2006/main">
   <p:cSld>
     <p:bg>
@@ -15803,7 +17509,165 @@
 </p:sld>
 </file>
 
+<file path=ppt/slides/slide26.xml><?xml version="1.0" encoding="utf-8"?>
+<p:sld xmlns:a="http://schemas.openxmlformats.org/drawingml/2006/main" xmlns:r="http://schemas.openxmlformats.org/officeDocument/2006/relationships" xmlns:p="http://schemas.openxmlformats.org/presentationml/2006/main">
+  <p:cSld>
+    <p:spTree>
+      <p:nvGrpSpPr>
+        <p:cNvPr id="1" name=""/>
+        <p:cNvGrpSpPr/>
+        <p:nvPr/>
+      </p:nvGrpSpPr>
+      <p:grpSpPr>
+        <a:xfrm>
+          <a:off x="0" y="0"/>
+          <a:ext cx="0" cy="0"/>
+          <a:chOff x="0" y="0"/>
+          <a:chExt cx="0" cy="0"/>
+        </a:xfrm>
+      </p:grpSpPr>
+      <p:sp>
+        <p:nvSpPr>
+          <p:cNvPr id="4" name="Title 3">
+            <a:extLst>
+              <a:ext uri="{FF2B5EF4-FFF2-40B4-BE49-F238E27FC236}">
+                <a16:creationId xmlns:a16="http://schemas.microsoft.com/office/drawing/2014/main" id="{CD7FD92D-6EFD-E577-F326-05A8E86624D0}"/>
+              </a:ext>
+            </a:extLst>
+          </p:cNvPr>
+          <p:cNvSpPr>
+            <a:spLocks noGrp="1"/>
+          </p:cNvSpPr>
+          <p:nvPr>
+            <p:ph type="title"/>
+          </p:nvPr>
+        </p:nvSpPr>
+        <p:spPr/>
+        <p:txBody>
+          <a:bodyPr/>
+          <a:lstStyle/>
+          <a:p>
+            <a:r>
+              <a:rPr lang="en-US" dirty="0">
+                <a:hlinkClick r:id="rId2"/>
+              </a:rPr>
+              <a:t>https://rpubs.com/josephine-mckelvy/1327359</a:t>
+            </a:r>
+            <a:r>
+              <a:rPr lang="en-US" dirty="0"/>
+              <a:t> </a:t>
+            </a:r>
+          </a:p>
+        </p:txBody>
+      </p:sp>
+    </p:spTree>
+    <p:extLst>
+      <p:ext uri="{BB962C8B-B14F-4D97-AF65-F5344CB8AC3E}">
+        <p14:creationId xmlns:p14="http://schemas.microsoft.com/office/powerpoint/2010/main" val="3380532860"/>
+      </p:ext>
+    </p:extLst>
+  </p:cSld>
+  <p:clrMapOvr>
+    <a:masterClrMapping/>
+  </p:clrMapOvr>
+</p:sld>
+</file>
+
 <file path=ppt/slides/slide3.xml><?xml version="1.0" encoding="utf-8"?>
+<p:sld xmlns:a="http://schemas.openxmlformats.org/drawingml/2006/main" xmlns:r="http://schemas.openxmlformats.org/officeDocument/2006/relationships" xmlns:p="http://schemas.openxmlformats.org/presentationml/2006/main">
+  <p:cSld>
+    <p:bg>
+      <p:bgPr>
+        <a:solidFill>
+          <a:schemeClr val="accent6">
+            <a:lumMod val="20000"/>
+            <a:lumOff val="80000"/>
+          </a:schemeClr>
+        </a:solidFill>
+        <a:effectLst/>
+      </p:bgPr>
+    </p:bg>
+    <p:spTree>
+      <p:nvGrpSpPr>
+        <p:cNvPr id="1" name=""/>
+        <p:cNvGrpSpPr/>
+        <p:nvPr/>
+      </p:nvGrpSpPr>
+      <p:grpSpPr>
+        <a:xfrm>
+          <a:off x="0" y="0"/>
+          <a:ext cx="0" cy="0"/>
+          <a:chOff x="0" y="0"/>
+          <a:chExt cx="0" cy="0"/>
+        </a:xfrm>
+      </p:grpSpPr>
+      <p:sp>
+        <p:nvSpPr>
+          <p:cNvPr id="6" name="Title 5">
+            <a:extLst>
+              <a:ext uri="{FF2B5EF4-FFF2-40B4-BE49-F238E27FC236}">
+                <a16:creationId xmlns:a16="http://schemas.microsoft.com/office/drawing/2014/main" id="{63884149-B247-1597-BB9F-F0EFE8F4A5EE}"/>
+              </a:ext>
+            </a:extLst>
+          </p:cNvPr>
+          <p:cNvSpPr>
+            <a:spLocks noGrp="1"/>
+          </p:cNvSpPr>
+          <p:nvPr>
+            <p:ph type="title"/>
+          </p:nvPr>
+        </p:nvSpPr>
+        <p:spPr/>
+        <p:txBody>
+          <a:bodyPr/>
+          <a:lstStyle/>
+          <a:p>
+            <a:r>
+              <a:rPr lang="en-US" dirty="0"/>
+              <a:t>Set up Project</a:t>
+            </a:r>
+          </a:p>
+        </p:txBody>
+      </p:sp>
+      <p:sp>
+        <p:nvSpPr>
+          <p:cNvPr id="7" name="Text Placeholder 6">
+            <a:extLst>
+              <a:ext uri="{FF2B5EF4-FFF2-40B4-BE49-F238E27FC236}">
+                <a16:creationId xmlns:a16="http://schemas.microsoft.com/office/drawing/2014/main" id="{CF15E32C-5DB4-3C4B-6369-3C5776A26709}"/>
+              </a:ext>
+            </a:extLst>
+          </p:cNvPr>
+          <p:cNvSpPr>
+            <a:spLocks noGrp="1"/>
+          </p:cNvSpPr>
+          <p:nvPr>
+            <p:ph type="body" idx="1"/>
+          </p:nvPr>
+        </p:nvSpPr>
+        <p:spPr/>
+        <p:txBody>
+          <a:bodyPr/>
+          <a:lstStyle/>
+          <a:p>
+            <a:endParaRPr lang="en-US"/>
+          </a:p>
+        </p:txBody>
+      </p:sp>
+    </p:spTree>
+    <p:extLst>
+      <p:ext uri="{BB962C8B-B14F-4D97-AF65-F5344CB8AC3E}">
+        <p14:creationId xmlns:p14="http://schemas.microsoft.com/office/powerpoint/2010/main" val="3686820540"/>
+      </p:ext>
+    </p:extLst>
+  </p:cSld>
+  <p:clrMapOvr>
+    <a:masterClrMapping/>
+  </p:clrMapOvr>
+</p:sld>
+</file>
+
+<file path=ppt/slides/slide4.xml><?xml version="1.0" encoding="utf-8"?>
 <p:sld xmlns:a="http://schemas.openxmlformats.org/drawingml/2006/main" xmlns:r="http://schemas.openxmlformats.org/officeDocument/2006/relationships" xmlns:p="http://schemas.openxmlformats.org/presentationml/2006/main">
   <p:cSld>
     <p:bg>
@@ -16503,7 +18367,7 @@
 </p:sld>
 </file>
 
-<file path=ppt/slides/slide4.xml><?xml version="1.0" encoding="utf-8"?>
+<file path=ppt/slides/slide5.xml><?xml version="1.0" encoding="utf-8"?>
 <p:sld xmlns:a="http://schemas.openxmlformats.org/drawingml/2006/main" xmlns:r="http://schemas.openxmlformats.org/officeDocument/2006/relationships" xmlns:p="http://schemas.openxmlformats.org/presentationml/2006/main">
   <p:cSld>
     <p:spTree>
@@ -16569,9 +18433,7 @@
               <a:avLst/>
             </a:prstGeom>
             <a:ln>
-              <a:solidFill>
-                <a:schemeClr val="tx1"/>
-              </a:solidFill>
+              <a:noFill/>
             </a:ln>
           </p:spPr>
         </p:pic>
@@ -16597,9 +18459,7 @@
             </a:prstGeom>
             <a:noFill/>
             <a:ln w="38100">
-              <a:solidFill>
-                <a:srgbClr val="FFC000"/>
-              </a:solidFill>
+              <a:noFill/>
             </a:ln>
           </p:spPr>
           <p:style>
@@ -16649,9 +18509,7 @@
             </a:prstGeom>
             <a:noFill/>
             <a:ln w="38100">
-              <a:solidFill>
-                <a:srgbClr val="FFC000"/>
-              </a:solidFill>
+              <a:noFill/>
             </a:ln>
           </p:spPr>
           <p:style>
@@ -16693,7 +18551,7 @@
 </p:sld>
 </file>
 
-<file path=ppt/slides/slide5.xml><?xml version="1.0" encoding="utf-8"?>
+<file path=ppt/slides/slide6.xml><?xml version="1.0" encoding="utf-8"?>
 <p:sld xmlns:a="http://schemas.openxmlformats.org/drawingml/2006/main" xmlns:r="http://schemas.openxmlformats.org/officeDocument/2006/relationships" xmlns:p="http://schemas.openxmlformats.org/presentationml/2006/main">
   <p:cSld>
     <p:spTree>
@@ -16935,7 +18793,7 @@
 </p:sld>
 </file>
 
-<file path=ppt/slides/slide6.xml><?xml version="1.0" encoding="utf-8"?>
+<file path=ppt/slides/slide7.xml><?xml version="1.0" encoding="utf-8"?>
 <p:sld xmlns:a="http://schemas.openxmlformats.org/drawingml/2006/main" xmlns:r="http://schemas.openxmlformats.org/officeDocument/2006/relationships" xmlns:p="http://schemas.openxmlformats.org/presentationml/2006/main">
   <p:cSld>
     <p:bg>
@@ -17633,7 +19491,7 @@
 </p:sld>
 </file>
 
-<file path=ppt/slides/slide7.xml><?xml version="1.0" encoding="utf-8"?>
+<file path=ppt/slides/slide8.xml><?xml version="1.0" encoding="utf-8"?>
 <p:sld xmlns:a="http://schemas.openxmlformats.org/drawingml/2006/main" xmlns:r="http://schemas.openxmlformats.org/officeDocument/2006/relationships" xmlns:p="http://schemas.openxmlformats.org/presentationml/2006/main">
   <p:cSld>
     <p:spTree>
@@ -18196,7 +20054,7 @@
 </p:sld>
 </file>
 
-<file path=ppt/slides/slide8.xml><?xml version="1.0" encoding="utf-8"?>
+<file path=ppt/slides/slide9.xml><?xml version="1.0" encoding="utf-8"?>
 <p:sld xmlns:a="http://schemas.openxmlformats.org/drawingml/2006/main" xmlns:r="http://schemas.openxmlformats.org/officeDocument/2006/relationships" xmlns:p="http://schemas.openxmlformats.org/presentationml/2006/main">
   <p:cSld>
     <p:spTree>
@@ -18675,700 +20533,6 @@
     <p:extLst>
       <p:ext uri="{BB962C8B-B14F-4D97-AF65-F5344CB8AC3E}">
         <p14:creationId xmlns:p14="http://schemas.microsoft.com/office/powerpoint/2010/main" val="680315991"/>
-      </p:ext>
-    </p:extLst>
-  </p:cSld>
-  <p:clrMapOvr>
-    <a:masterClrMapping/>
-  </p:clrMapOvr>
-</p:sld>
-</file>
-
-<file path=ppt/slides/slide9.xml><?xml version="1.0" encoding="utf-8"?>
-<p:sld xmlns:a="http://schemas.openxmlformats.org/drawingml/2006/main" xmlns:r="http://schemas.openxmlformats.org/officeDocument/2006/relationships" xmlns:p="http://schemas.openxmlformats.org/presentationml/2006/main">
-  <p:cSld>
-    <p:bg>
-      <p:bgPr>
-        <a:solidFill>
-          <a:schemeClr val="bg1"/>
-        </a:solidFill>
-        <a:effectLst/>
-      </p:bgPr>
-    </p:bg>
-    <p:spTree>
-      <p:nvGrpSpPr>
-        <p:cNvPr id="1" name=""/>
-        <p:cNvGrpSpPr/>
-        <p:nvPr/>
-      </p:nvGrpSpPr>
-      <p:grpSpPr>
-        <a:xfrm>
-          <a:off x="0" y="0"/>
-          <a:ext cx="0" cy="0"/>
-          <a:chOff x="0" y="0"/>
-          <a:chExt cx="0" cy="0"/>
-        </a:xfrm>
-      </p:grpSpPr>
-      <p:sp>
-        <p:nvSpPr>
-          <p:cNvPr id="50" name="Freeform: Shape 49">
-            <a:extLst>
-              <a:ext uri="{FF2B5EF4-FFF2-40B4-BE49-F238E27FC236}">
-                <a16:creationId xmlns:a16="http://schemas.microsoft.com/office/drawing/2014/main" id="{AE192E3E-68A9-4F36-936C-1C8D0B9EF132}"/>
-              </a:ext>
-              <a:ext uri="{C183D7F6-B498-43B3-948B-1728B52AA6E4}">
-                <adec:decorative xmlns:adec="http://schemas.microsoft.com/office/drawing/2017/decorative" val="1"/>
-              </a:ext>
-            </a:extLst>
-          </p:cNvPr>
-          <p:cNvSpPr>
-            <a:spLocks noGrp="1" noRot="1" noChangeAspect="1" noMove="1" noResize="1" noEditPoints="1" noAdjustHandles="1" noChangeArrowheads="1" noChangeShapeType="1" noTextEdit="1"/>
-          </p:cNvSpPr>
-          <p:nvPr>
-            <p:extLst>
-              <p:ext uri="{386F3935-93C4-4BCD-93E2-E3B085C9AB24}">
-                <p16:designElem xmlns:p16="http://schemas.microsoft.com/office/powerpoint/2015/main" val="1"/>
-              </p:ext>
-            </p:extLst>
-          </p:nvPr>
-        </p:nvSpPr>
-        <p:spPr>
-          <a:xfrm>
-            <a:off x="8803792" y="3455896"/>
-            <a:ext cx="3388208" cy="3406341"/>
-          </a:xfrm>
-          <a:custGeom>
-            <a:avLst/>
-            <a:gdLst>
-              <a:gd name="connsiteX0" fmla="*/ 3388058 w 3388208"/>
-              <a:gd name="connsiteY0" fmla="*/ 0 h 3406341"/>
-              <a:gd name="connsiteX1" fmla="*/ 3388208 w 3388208"/>
-              <a:gd name="connsiteY1" fmla="*/ 0 h 3406341"/>
-              <a:gd name="connsiteX2" fmla="*/ 3388208 w 3388208"/>
-              <a:gd name="connsiteY2" fmla="*/ 3406341 h 3406341"/>
-              <a:gd name="connsiteX3" fmla="*/ 0 w 3388208"/>
-              <a:gd name="connsiteY3" fmla="*/ 3406341 h 3406341"/>
-              <a:gd name="connsiteX4" fmla="*/ 79006 w 3388208"/>
-              <a:gd name="connsiteY4" fmla="*/ 3404386 h 3406341"/>
-              <a:gd name="connsiteX5" fmla="*/ 3383947 w 3388208"/>
-              <a:gd name="connsiteY5" fmla="*/ 164274 h 3406341"/>
-            </a:gdLst>
-            <a:ahLst/>
-            <a:cxnLst>
-              <a:cxn ang="0">
-                <a:pos x="connsiteX0" y="connsiteY0"/>
-              </a:cxn>
-              <a:cxn ang="0">
-                <a:pos x="connsiteX1" y="connsiteY1"/>
-              </a:cxn>
-              <a:cxn ang="0">
-                <a:pos x="connsiteX2" y="connsiteY2"/>
-              </a:cxn>
-              <a:cxn ang="0">
-                <a:pos x="connsiteX3" y="connsiteY3"/>
-              </a:cxn>
-              <a:cxn ang="0">
-                <a:pos x="connsiteX4" y="connsiteY4"/>
-              </a:cxn>
-              <a:cxn ang="0">
-                <a:pos x="connsiteX5" y="connsiteY5"/>
-              </a:cxn>
-            </a:cxnLst>
-            <a:rect l="l" t="t" r="r" b="b"/>
-            <a:pathLst>
-              <a:path w="3388208" h="3406341">
-                <a:moveTo>
-                  <a:pt x="3388058" y="0"/>
-                </a:moveTo>
-                <a:lnTo>
-                  <a:pt x="3388208" y="0"/>
-                </a:lnTo>
-                <a:lnTo>
-                  <a:pt x="3388208" y="3406341"/>
-                </a:lnTo>
-                <a:lnTo>
-                  <a:pt x="0" y="3406341"/>
-                </a:lnTo>
-                <a:lnTo>
-                  <a:pt x="79006" y="3404386"/>
-                </a:lnTo>
-                <a:cubicBezTo>
-                  <a:pt x="1864742" y="3315784"/>
-                  <a:pt x="3296223" y="1912901"/>
-                  <a:pt x="3383947" y="164274"/>
-                </a:cubicBezTo>
-                <a:close/>
-              </a:path>
-            </a:pathLst>
-          </a:custGeom>
-          <a:solidFill>
-            <a:schemeClr val="accent5"/>
-          </a:solidFill>
-          <a:ln>
-            <a:noFill/>
-          </a:ln>
-        </p:spPr>
-        <p:style>
-          <a:lnRef idx="2">
-            <a:schemeClr val="accent1">
-              <a:shade val="50000"/>
-            </a:schemeClr>
-          </a:lnRef>
-          <a:fillRef idx="1">
-            <a:schemeClr val="accent1"/>
-          </a:fillRef>
-          <a:effectRef idx="0">
-            <a:schemeClr val="accent1"/>
-          </a:effectRef>
-          <a:fontRef idx="minor">
-            <a:schemeClr val="lt1"/>
-          </a:fontRef>
-        </p:style>
-        <p:txBody>
-          <a:bodyPr wrap="square" rtlCol="0" anchor="ctr">
-            <a:noAutofit/>
-          </a:bodyPr>
-          <a:lstStyle/>
-          <a:p>
-            <a:pPr algn="ctr"/>
-            <a:endParaRPr lang="en-US"/>
-          </a:p>
-        </p:txBody>
-      </p:sp>
-      <p:sp useBgFill="1">
-        <p:nvSpPr>
-          <p:cNvPr id="52" name="Rectangle 51">
-            <a:extLst>
-              <a:ext uri="{FF2B5EF4-FFF2-40B4-BE49-F238E27FC236}">
-                <a16:creationId xmlns:a16="http://schemas.microsoft.com/office/drawing/2014/main" id="{AA447381-A1D4-4821-B1C9-7370B36F28B5}"/>
-              </a:ext>
-              <a:ext uri="{C183D7F6-B498-43B3-948B-1728B52AA6E4}">
-                <adec:decorative xmlns:adec="http://schemas.microsoft.com/office/drawing/2017/decorative" val="1"/>
-              </a:ext>
-            </a:extLst>
-          </p:cNvPr>
-          <p:cNvSpPr>
-            <a:spLocks noGrp="1" noRot="1" noChangeAspect="1" noMove="1" noResize="1" noEditPoints="1" noAdjustHandles="1" noChangeArrowheads="1" noChangeShapeType="1" noTextEdit="1"/>
-          </p:cNvSpPr>
-          <p:nvPr>
-            <p:extLst>
-              <p:ext uri="{386F3935-93C4-4BCD-93E2-E3B085C9AB24}">
-                <p16:designElem xmlns:p16="http://schemas.microsoft.com/office/powerpoint/2015/main" val="1"/>
-              </p:ext>
-            </p:extLst>
-          </p:nvPr>
-        </p:nvSpPr>
-        <p:spPr>
-          <a:xfrm>
-            <a:off x="0" y="0"/>
-            <a:ext cx="12192000" cy="6858000"/>
-          </a:xfrm>
-          <a:prstGeom prst="rect">
-            <a:avLst/>
-          </a:prstGeom>
-          <a:ln w="12700" cap="flat" cmpd="sng" algn="ctr">
-            <a:noFill/>
-            <a:prstDash val="solid"/>
-            <a:miter lim="800000"/>
-          </a:ln>
-          <a:effectLst/>
-          <a:extLst>
-            <a:ext uri="{91240B29-F687-4F45-9708-019B960494DF}">
-              <a14:hiddenLine xmlns:a14="http://schemas.microsoft.com/office/drawing/2010/main" w="12700" cap="flat" cmpd="sng" algn="ctr">
-                <a:solidFill>
-                  <a:schemeClr val="accent1">
-                    <a:shade val="50000"/>
-                  </a:schemeClr>
-                </a:solidFill>
-                <a:prstDash val="solid"/>
-                <a:miter lim="800000"/>
-              </a14:hiddenLine>
-            </a:ext>
-          </a:extLst>
-        </p:spPr>
-        <p:style>
-          <a:lnRef idx="2">
-            <a:schemeClr val="accent1">
-              <a:shade val="50000"/>
-            </a:schemeClr>
-          </a:lnRef>
-          <a:fillRef idx="1">
-            <a:schemeClr val="accent1"/>
-          </a:fillRef>
-          <a:effectRef idx="0">
-            <a:schemeClr val="accent1"/>
-          </a:effectRef>
-          <a:fontRef idx="minor">
-            <a:schemeClr val="lt1"/>
-          </a:fontRef>
-        </p:style>
-        <p:txBody>
-          <a:bodyPr rtlCol="0" anchor="ctr"/>
-          <a:lstStyle/>
-          <a:p>
-            <a:pPr algn="ctr"/>
-            <a:endParaRPr lang="en-US"/>
-          </a:p>
-        </p:txBody>
-      </p:sp>
-      <p:sp>
-        <p:nvSpPr>
-          <p:cNvPr id="54" name="Rectangle 53">
-            <a:extLst>
-              <a:ext uri="{FF2B5EF4-FFF2-40B4-BE49-F238E27FC236}">
-                <a16:creationId xmlns:a16="http://schemas.microsoft.com/office/drawing/2014/main" id="{B36BA507-8EBB-41BC-B10D-D9ED7F17EE89}"/>
-              </a:ext>
-              <a:ext uri="{C183D7F6-B498-43B3-948B-1728B52AA6E4}">
-                <adec:decorative xmlns:adec="http://schemas.microsoft.com/office/drawing/2017/decorative" val="1"/>
-              </a:ext>
-            </a:extLst>
-          </p:cNvPr>
-          <p:cNvSpPr>
-            <a:spLocks noGrp="1" noRot="1" noChangeAspect="1" noMove="1" noResize="1" noEditPoints="1" noAdjustHandles="1" noChangeArrowheads="1" noChangeShapeType="1" noTextEdit="1"/>
-          </p:cNvSpPr>
-          <p:nvPr>
-            <p:extLst>
-              <p:ext uri="{386F3935-93C4-4BCD-93E2-E3B085C9AB24}">
-                <p16:designElem xmlns:p16="http://schemas.microsoft.com/office/powerpoint/2015/main" val="1"/>
-              </p:ext>
-            </p:extLst>
-          </p:nvPr>
-        </p:nvSpPr>
-        <p:spPr>
-          <a:xfrm rot="10800000" flipH="1" flipV="1">
-            <a:off x="-4099" y="3429001"/>
-            <a:ext cx="3483870" cy="3428999"/>
-          </a:xfrm>
-          <a:prstGeom prst="rect">
-            <a:avLst/>
-          </a:prstGeom>
-          <a:solidFill>
-            <a:schemeClr val="accent4">
-              <a:lumMod val="40000"/>
-              <a:lumOff val="60000"/>
-            </a:schemeClr>
-          </a:solidFill>
-          <a:ln>
-            <a:noFill/>
-          </a:ln>
-        </p:spPr>
-        <p:style>
-          <a:lnRef idx="2">
-            <a:schemeClr val="accent1">
-              <a:shade val="50000"/>
-            </a:schemeClr>
-          </a:lnRef>
-          <a:fillRef idx="1">
-            <a:schemeClr val="accent1"/>
-          </a:fillRef>
-          <a:effectRef idx="0">
-            <a:schemeClr val="accent1"/>
-          </a:effectRef>
-          <a:fontRef idx="minor">
-            <a:schemeClr val="lt1"/>
-          </a:fontRef>
-        </p:style>
-        <p:txBody>
-          <a:bodyPr rtlCol="0" anchor="ctr"/>
-          <a:lstStyle/>
-          <a:p>
-            <a:pPr algn="ctr"/>
-            <a:endParaRPr lang="en-US" dirty="0"/>
-          </a:p>
-        </p:txBody>
-      </p:sp>
-      <p:sp>
-        <p:nvSpPr>
-          <p:cNvPr id="56" name="Freeform: Shape 55">
-            <a:extLst>
-              <a:ext uri="{FF2B5EF4-FFF2-40B4-BE49-F238E27FC236}">
-                <a16:creationId xmlns:a16="http://schemas.microsoft.com/office/drawing/2014/main" id="{D8A12D28-1F38-4C3F-8519-C9BF0D95735C}"/>
-              </a:ext>
-              <a:ext uri="{C183D7F6-B498-43B3-948B-1728B52AA6E4}">
-                <adec:decorative xmlns:adec="http://schemas.microsoft.com/office/drawing/2017/decorative" val="1"/>
-              </a:ext>
-            </a:extLst>
-          </p:cNvPr>
-          <p:cNvSpPr>
-            <a:spLocks noGrp="1" noRot="1" noChangeAspect="1" noMove="1" noResize="1" noEditPoints="1" noAdjustHandles="1" noChangeArrowheads="1" noChangeShapeType="1" noTextEdit="1"/>
-          </p:cNvSpPr>
-          <p:nvPr>
-            <p:extLst>
-              <p:ext uri="{386F3935-93C4-4BCD-93E2-E3B085C9AB24}">
-                <p16:designElem xmlns:p16="http://schemas.microsoft.com/office/powerpoint/2015/main" val="1"/>
-              </p:ext>
-            </p:extLst>
-          </p:nvPr>
-        </p:nvSpPr>
-        <p:spPr>
-          <a:xfrm flipH="1">
-            <a:off x="0" y="3427750"/>
-            <a:ext cx="3479772" cy="3430249"/>
-          </a:xfrm>
-          <a:custGeom>
-            <a:avLst/>
-            <a:gdLst>
-              <a:gd name="connsiteX0" fmla="*/ 0 w 2559050"/>
-              <a:gd name="connsiteY0" fmla="*/ 0 h 2559050"/>
-              <a:gd name="connsiteX1" fmla="*/ 2559050 w 2559050"/>
-              <a:gd name="connsiteY1" fmla="*/ 0 h 2559050"/>
-              <a:gd name="connsiteX2" fmla="*/ 0 w 2559050"/>
-              <a:gd name="connsiteY2" fmla="*/ 2559050 h 2559050"/>
-            </a:gdLst>
-            <a:ahLst/>
-            <a:cxnLst>
-              <a:cxn ang="0">
-                <a:pos x="connsiteX0" y="connsiteY0"/>
-              </a:cxn>
-              <a:cxn ang="0">
-                <a:pos x="connsiteX1" y="connsiteY1"/>
-              </a:cxn>
-              <a:cxn ang="0">
-                <a:pos x="connsiteX2" y="connsiteY2"/>
-              </a:cxn>
-            </a:cxnLst>
-            <a:rect l="l" t="t" r="r" b="b"/>
-            <a:pathLst>
-              <a:path w="2559050" h="2559050">
-                <a:moveTo>
-                  <a:pt x="0" y="0"/>
-                </a:moveTo>
-                <a:lnTo>
-                  <a:pt x="2559050" y="0"/>
-                </a:lnTo>
-                <a:cubicBezTo>
-                  <a:pt x="2559050" y="1413324"/>
-                  <a:pt x="1413324" y="2559050"/>
-                  <a:pt x="0" y="2559050"/>
-                </a:cubicBezTo>
-                <a:close/>
-              </a:path>
-            </a:pathLst>
-          </a:custGeom>
-          <a:solidFill>
-            <a:schemeClr val="accent5"/>
-          </a:solidFill>
-          <a:ln>
-            <a:noFill/>
-          </a:ln>
-        </p:spPr>
-        <p:style>
-          <a:lnRef idx="2">
-            <a:schemeClr val="accent1">
-              <a:shade val="50000"/>
-            </a:schemeClr>
-          </a:lnRef>
-          <a:fillRef idx="1">
-            <a:schemeClr val="accent1"/>
-          </a:fillRef>
-          <a:effectRef idx="0">
-            <a:schemeClr val="accent1"/>
-          </a:effectRef>
-          <a:fontRef idx="minor">
-            <a:schemeClr val="lt1"/>
-          </a:fontRef>
-        </p:style>
-        <p:txBody>
-          <a:bodyPr wrap="square" rtlCol="0" anchor="ctr">
-            <a:noAutofit/>
-          </a:bodyPr>
-          <a:lstStyle/>
-          <a:p>
-            <a:pPr algn="ctr"/>
-            <a:endParaRPr lang="en-US">
-              <a:solidFill>
-                <a:schemeClr val="tx1"/>
-              </a:solidFill>
-            </a:endParaRPr>
-          </a:p>
-        </p:txBody>
-      </p:sp>
-      <p:sp>
-        <p:nvSpPr>
-          <p:cNvPr id="58" name="Rectangle 57">
-            <a:extLst>
-              <a:ext uri="{FF2B5EF4-FFF2-40B4-BE49-F238E27FC236}">
-                <a16:creationId xmlns:a16="http://schemas.microsoft.com/office/drawing/2014/main" id="{F6B5EBAF-DB0B-4E76-8845-85F43B5033DD}"/>
-              </a:ext>
-              <a:ext uri="{C183D7F6-B498-43B3-948B-1728B52AA6E4}">
-                <adec:decorative xmlns:adec="http://schemas.microsoft.com/office/drawing/2017/decorative" val="1"/>
-              </a:ext>
-            </a:extLst>
-          </p:cNvPr>
-          <p:cNvSpPr>
-            <a:spLocks noGrp="1" noRot="1" noChangeAspect="1" noMove="1" noResize="1" noEditPoints="1" noAdjustHandles="1" noChangeArrowheads="1" noChangeShapeType="1" noTextEdit="1"/>
-          </p:cNvSpPr>
-          <p:nvPr>
-            <p:extLst>
-              <p:ext uri="{386F3935-93C4-4BCD-93E2-E3B085C9AB24}">
-                <p16:designElem xmlns:p16="http://schemas.microsoft.com/office/powerpoint/2015/main" val="1"/>
-              </p:ext>
-            </p:extLst>
-          </p:nvPr>
-        </p:nvSpPr>
-        <p:spPr>
-          <a:xfrm rot="10800000" flipH="1" flipV="1">
-            <a:off x="3479772" y="3429001"/>
-            <a:ext cx="8712227" cy="3428999"/>
-          </a:xfrm>
-          <a:prstGeom prst="rect">
-            <a:avLst/>
-          </a:prstGeom>
-          <a:solidFill>
-            <a:schemeClr val="accent1">
-              <a:lumMod val="60000"/>
-              <a:lumOff val="40000"/>
-            </a:schemeClr>
-          </a:solidFill>
-          <a:ln>
-            <a:noFill/>
-          </a:ln>
-        </p:spPr>
-        <p:style>
-          <a:lnRef idx="2">
-            <a:schemeClr val="accent1">
-              <a:shade val="50000"/>
-            </a:schemeClr>
-          </a:lnRef>
-          <a:fillRef idx="1">
-            <a:schemeClr val="accent1"/>
-          </a:fillRef>
-          <a:effectRef idx="0">
-            <a:schemeClr val="accent1"/>
-          </a:effectRef>
-          <a:fontRef idx="minor">
-            <a:schemeClr val="lt1"/>
-          </a:fontRef>
-        </p:style>
-        <p:txBody>
-          <a:bodyPr rtlCol="0" anchor="ctr"/>
-          <a:lstStyle/>
-          <a:p>
-            <a:pPr algn="ctr"/>
-            <a:endParaRPr lang="en-US" dirty="0"/>
-          </a:p>
-        </p:txBody>
-      </p:sp>
-      <p:sp>
-        <p:nvSpPr>
-          <p:cNvPr id="60" name="Rectangle 34">
-            <a:extLst>
-              <a:ext uri="{FF2B5EF4-FFF2-40B4-BE49-F238E27FC236}">
-                <a16:creationId xmlns:a16="http://schemas.microsoft.com/office/drawing/2014/main" id="{7C3391C8-8289-499C-B830-A3EACA618EE4}"/>
-              </a:ext>
-              <a:ext uri="{C183D7F6-B498-43B3-948B-1728B52AA6E4}">
-                <adec:decorative xmlns:adec="http://schemas.microsoft.com/office/drawing/2017/decorative" val="1"/>
-              </a:ext>
-            </a:extLst>
-          </p:cNvPr>
-          <p:cNvSpPr>
-            <a:spLocks noGrp="1" noRot="1" noChangeAspect="1" noMove="1" noResize="1" noEditPoints="1" noAdjustHandles="1" noChangeArrowheads="1" noChangeShapeType="1" noTextEdit="1"/>
-          </p:cNvSpPr>
-          <p:nvPr>
-            <p:extLst>
-              <p:ext uri="{386F3935-93C4-4BCD-93E2-E3B085C9AB24}">
-                <p16:designElem xmlns:p16="http://schemas.microsoft.com/office/powerpoint/2015/main" val="1"/>
-              </p:ext>
-            </p:extLst>
-          </p:nvPr>
-        </p:nvSpPr>
-        <p:spPr>
-          <a:xfrm rot="5400000" flipH="1" flipV="1">
-            <a:off x="3502418" y="3405102"/>
-            <a:ext cx="3429002" cy="3474296"/>
-          </a:xfrm>
-          <a:custGeom>
-            <a:avLst/>
-            <a:gdLst>
-              <a:gd name="connsiteX0" fmla="*/ 0 w 3484819"/>
-              <a:gd name="connsiteY0" fmla="*/ 0 h 3430264"/>
-              <a:gd name="connsiteX1" fmla="*/ 3484819 w 3484819"/>
-              <a:gd name="connsiteY1" fmla="*/ 0 h 3430264"/>
-              <a:gd name="connsiteX2" fmla="*/ 3484819 w 3484819"/>
-              <a:gd name="connsiteY2" fmla="*/ 3430264 h 3430264"/>
-              <a:gd name="connsiteX3" fmla="*/ 0 w 3484819"/>
-              <a:gd name="connsiteY3" fmla="*/ 3430264 h 3430264"/>
-              <a:gd name="connsiteX4" fmla="*/ 0 w 3484819"/>
-              <a:gd name="connsiteY4" fmla="*/ 0 h 3430264"/>
-              <a:gd name="connsiteX0" fmla="*/ 0 w 3484819"/>
-              <a:gd name="connsiteY0" fmla="*/ 0 h 3430264"/>
-              <a:gd name="connsiteX1" fmla="*/ 3484819 w 3484819"/>
-              <a:gd name="connsiteY1" fmla="*/ 0 h 3430264"/>
-              <a:gd name="connsiteX2" fmla="*/ 0 w 3484819"/>
-              <a:gd name="connsiteY2" fmla="*/ 3430264 h 3430264"/>
-              <a:gd name="connsiteX3" fmla="*/ 0 w 3484819"/>
-              <a:gd name="connsiteY3" fmla="*/ 0 h 3430264"/>
-            </a:gdLst>
-            <a:ahLst/>
-            <a:cxnLst>
-              <a:cxn ang="0">
-                <a:pos x="connsiteX0" y="connsiteY0"/>
-              </a:cxn>
-              <a:cxn ang="0">
-                <a:pos x="connsiteX1" y="connsiteY1"/>
-              </a:cxn>
-              <a:cxn ang="0">
-                <a:pos x="connsiteX2" y="connsiteY2"/>
-              </a:cxn>
-              <a:cxn ang="0">
-                <a:pos x="connsiteX3" y="connsiteY3"/>
-              </a:cxn>
-            </a:cxnLst>
-            <a:rect l="l" t="t" r="r" b="b"/>
-            <a:pathLst>
-              <a:path w="3484819" h="3430264">
-                <a:moveTo>
-                  <a:pt x="0" y="0"/>
-                </a:moveTo>
-                <a:lnTo>
-                  <a:pt x="3484819" y="0"/>
-                </a:lnTo>
-                <a:lnTo>
-                  <a:pt x="0" y="3430264"/>
-                </a:lnTo>
-                <a:lnTo>
-                  <a:pt x="0" y="0"/>
-                </a:lnTo>
-                <a:close/>
-              </a:path>
-            </a:pathLst>
-          </a:custGeom>
-          <a:solidFill>
-            <a:schemeClr val="accent2"/>
-          </a:solidFill>
-          <a:ln>
-            <a:noFill/>
-          </a:ln>
-        </p:spPr>
-        <p:style>
-          <a:lnRef idx="2">
-            <a:schemeClr val="accent1">
-              <a:shade val="50000"/>
-            </a:schemeClr>
-          </a:lnRef>
-          <a:fillRef idx="1">
-            <a:schemeClr val="accent1"/>
-          </a:fillRef>
-          <a:effectRef idx="0">
-            <a:schemeClr val="accent1"/>
-          </a:effectRef>
-          <a:fontRef idx="minor">
-            <a:schemeClr val="lt1"/>
-          </a:fontRef>
-        </p:style>
-        <p:txBody>
-          <a:bodyPr rtlCol="0" anchor="ctr"/>
-          <a:lstStyle/>
-          <a:p>
-            <a:pPr algn="ctr"/>
-            <a:endParaRPr lang="en-US" dirty="0"/>
-          </a:p>
-        </p:txBody>
-      </p:sp>
-      <p:sp>
-        <p:nvSpPr>
-          <p:cNvPr id="62" name="Oval 61">
-            <a:extLst>
-              <a:ext uri="{FF2B5EF4-FFF2-40B4-BE49-F238E27FC236}">
-                <a16:creationId xmlns:a16="http://schemas.microsoft.com/office/drawing/2014/main" id="{7C7FAD3D-CE22-4C88-85EA-13FC95D289DD}"/>
-              </a:ext>
-              <a:ext uri="{C183D7F6-B498-43B3-948B-1728B52AA6E4}">
-                <adec:decorative xmlns:adec="http://schemas.microsoft.com/office/drawing/2017/decorative" val="1"/>
-              </a:ext>
-            </a:extLst>
-          </p:cNvPr>
-          <p:cNvSpPr>
-            <a:spLocks noGrp="1" noRot="1" noChangeAspect="1" noMove="1" noResize="1" noEditPoints="1" noAdjustHandles="1" noChangeArrowheads="1" noChangeShapeType="1" noTextEdit="1"/>
-          </p:cNvSpPr>
-          <p:nvPr>
-            <p:extLst>
-              <p:ext uri="{386F3935-93C4-4BCD-93E2-E3B085C9AB24}">
-                <p16:designElem xmlns:p16="http://schemas.microsoft.com/office/powerpoint/2015/main" val="1"/>
-              </p:ext>
-            </p:extLst>
-          </p:nvPr>
-        </p:nvSpPr>
-        <p:spPr>
-          <a:xfrm>
-            <a:off x="8922467" y="3607646"/>
-            <a:ext cx="3070455" cy="3070455"/>
-          </a:xfrm>
-          <a:prstGeom prst="ellipse">
-            <a:avLst/>
-          </a:prstGeom>
-          <a:solidFill>
-            <a:srgbClr val="FFFFFF"/>
-          </a:solidFill>
-          <a:ln>
-            <a:noFill/>
-          </a:ln>
-        </p:spPr>
-        <p:style>
-          <a:lnRef idx="2">
-            <a:schemeClr val="accent1">
-              <a:shade val="50000"/>
-            </a:schemeClr>
-          </a:lnRef>
-          <a:fillRef idx="1">
-            <a:schemeClr val="accent1"/>
-          </a:fillRef>
-          <a:effectRef idx="0">
-            <a:schemeClr val="accent1"/>
-          </a:effectRef>
-          <a:fontRef idx="minor">
-            <a:schemeClr val="lt1"/>
-          </a:fontRef>
-        </p:style>
-        <p:txBody>
-          <a:bodyPr rtlCol="0" anchor="ctr"/>
-          <a:lstStyle/>
-          <a:p>
-            <a:pPr algn="ctr"/>
-            <a:endParaRPr lang="en-US"/>
-          </a:p>
-        </p:txBody>
-      </p:sp>
-      <p:pic>
-        <p:nvPicPr>
-          <p:cNvPr id="7" name="Picture 6" descr="A yellow bar chart with black background&#10;&#10;AI-generated content may be incorrect.">
-            <a:extLst>
-              <a:ext uri="{FF2B5EF4-FFF2-40B4-BE49-F238E27FC236}">
-                <a16:creationId xmlns:a16="http://schemas.microsoft.com/office/drawing/2014/main" id="{0F76F279-31D0-658B-A032-9A5077391A22}"/>
-              </a:ext>
-            </a:extLst>
-          </p:cNvPr>
-          <p:cNvPicPr>
-            <a:picLocks noChangeAspect="1"/>
-          </p:cNvPicPr>
-          <p:nvPr/>
-        </p:nvPicPr>
-        <p:blipFill>
-          <a:blip r:embed="rId3">
-            <a:extLst>
-              <a:ext uri="{28A0092B-C50C-407E-A947-70E740481C1C}">
-                <a14:useLocalDpi xmlns:a14="http://schemas.microsoft.com/office/drawing/2010/main" val="0"/>
-              </a:ext>
-            </a:extLst>
-          </a:blip>
-          <a:srcRect t="24448" b="26176"/>
-          <a:stretch>
-            <a:fillRect/>
-          </a:stretch>
-        </p:blipFill>
-        <p:spPr>
-          <a:xfrm>
-            <a:off x="9086094" y="4465010"/>
-            <a:ext cx="2743200" cy="1354479"/>
-          </a:xfrm>
-          <a:prstGeom prst="rect">
-            <a:avLst/>
-          </a:prstGeom>
-        </p:spPr>
-      </p:pic>
-    </p:spTree>
-    <p:extLst>
-      <p:ext uri="{BB962C8B-B14F-4D97-AF65-F5344CB8AC3E}">
-        <p14:creationId xmlns:p14="http://schemas.microsoft.com/office/powerpoint/2010/main" val="637506734"/>
       </p:ext>
     </p:extLst>
   </p:cSld>

</xml_diff>